<commit_message>
allow us stocks lookup
</commit_message>
<xml_diff>
--- a/doc/Project Idea Introdution.pptx
+++ b/doc/Project Idea Introdution.pptx
@@ -13493,7 +13493,7 @@
           <a:p>
             <a:fld id="{AC8CEC3D-96F7-401F-9673-3EE7F75C9C5B}" type="datetimeFigureOut">
               <a:rPr lang="en-US"/>
-              <a:t>7/31/2018</a:t>
+              <a:t>8/1/2018</a:t>
             </a:fld>
             <a:endParaRPr dirty="0"/>
           </a:p>
@@ -13658,7 +13658,7 @@
           <a:p>
             <a:fld id="{F032BCF4-D26D-4DAF-9F57-FE1E61FE7935}" type="datetimeFigureOut">
               <a:rPr lang="en-US"/>
-              <a:t>7/31/2018</a:t>
+              <a:t>8/1/2018</a:t>
             </a:fld>
             <a:endParaRPr dirty="0"/>
           </a:p>
@@ -14401,7 +14401,7 @@
           <a:p>
             <a:fld id="{DAD2365B-5397-4552-89D2-3C31D6B894C4}" type="datetime1">
               <a:rPr lang="en-US" smtClean="0"/>
-              <a:t>7/31/2018</a:t>
+              <a:t>8/1/2018</a:t>
             </a:fld>
             <a:endParaRPr lang="en-US" dirty="0"/>
           </a:p>
@@ -14630,7 +14630,7 @@
           <a:p>
             <a:fld id="{3718D474-84CF-40A5-B032-DFFDE135438A}" type="datetime1">
               <a:rPr lang="en-US" smtClean="0"/>
-              <a:t>7/31/2018</a:t>
+              <a:t>8/1/2018</a:t>
             </a:fld>
             <a:endParaRPr lang="en-US" dirty="0"/>
           </a:p>
@@ -14852,7 +14852,7 @@
           <a:p>
             <a:fld id="{7067C6EF-6B90-465F-AC36-47BDECADBD65}" type="datetime1">
               <a:rPr lang="en-US" smtClean="0"/>
-              <a:t>7/31/2018</a:t>
+              <a:t>8/1/2018</a:t>
             </a:fld>
             <a:endParaRPr lang="en-US" dirty="0"/>
           </a:p>
@@ -15069,7 +15069,7 @@
           <a:p>
             <a:fld id="{ED1E4A86-2703-4937-ABF7-D8FBDB5C3D3E}" type="datetime1">
               <a:rPr lang="en-US" smtClean="0"/>
-              <a:t>7/31/2018</a:t>
+              <a:t>8/1/2018</a:t>
             </a:fld>
             <a:endParaRPr lang="en-US" dirty="0"/>
           </a:p>
@@ -15335,7 +15335,7 @@
           <a:p>
             <a:fld id="{12E02F23-BD92-4B7B-9DFF-42EEC8F21ED4}" type="datetime1">
               <a:rPr lang="en-US" smtClean="0"/>
-              <a:t>7/31/2018</a:t>
+              <a:t>8/1/2018</a:t>
             </a:fld>
             <a:endParaRPr lang="en-US" dirty="0"/>
           </a:p>
@@ -15637,7 +15637,7 @@
           <a:p>
             <a:fld id="{8814B7EA-8738-442B-ADC7-3A7E6F5C49CD}" type="datetime1">
               <a:rPr lang="en-US" smtClean="0"/>
-              <a:t>7/31/2018</a:t>
+              <a:t>8/1/2018</a:t>
             </a:fld>
             <a:endParaRPr lang="en-US" dirty="0"/>
           </a:p>
@@ -16087,7 +16087,7 @@
           <a:p>
             <a:fld id="{8FE5692D-78A6-499F-901A-E660774CC8EE}" type="datetime1">
               <a:rPr lang="en-US" smtClean="0"/>
-              <a:t>7/31/2018</a:t>
+              <a:t>8/1/2018</a:t>
             </a:fld>
             <a:endParaRPr lang="en-US" dirty="0"/>
           </a:p>
@@ -16220,7 +16220,7 @@
           <a:p>
             <a:fld id="{6776F355-F21B-43C0-ABBD-B5AEBBE279A6}" type="datetime1">
               <a:rPr lang="en-US" smtClean="0"/>
-              <a:t>7/31/2018</a:t>
+              <a:t>8/1/2018</a:t>
             </a:fld>
             <a:endParaRPr lang="en-US" dirty="0"/>
           </a:p>
@@ -16330,7 +16330,7 @@
           <a:p>
             <a:fld id="{C0AB95E7-F437-40FB-91EE-0B08B57CB523}" type="datetime1">
               <a:rPr lang="en-US" smtClean="0"/>
-              <a:t>7/31/2018</a:t>
+              <a:t>8/1/2018</a:t>
             </a:fld>
             <a:endParaRPr lang="en-US" dirty="0"/>
           </a:p>
@@ -16630,7 +16630,7 @@
           <a:p>
             <a:fld id="{67709EEF-87D9-4049-9A5D-A2B5E4C83A85}" type="datetime1">
               <a:rPr lang="en-US" smtClean="0"/>
-              <a:t>7/31/2018</a:t>
+              <a:t>8/1/2018</a:t>
             </a:fld>
             <a:endParaRPr lang="en-US" dirty="0"/>
           </a:p>
@@ -16919,7 +16919,7 @@
           <a:p>
             <a:fld id="{CAEBD992-82F2-4752-BCD7-4BDCCFA26099}" type="datetime1">
               <a:rPr lang="en-US" smtClean="0"/>
-              <a:t>7/31/2018</a:t>
+              <a:t>8/1/2018</a:t>
             </a:fld>
             <a:endParaRPr lang="en-US" dirty="0"/>
           </a:p>
@@ -17217,7 +17217,7 @@
             <a:fld id="{7590C4DA-EDE6-465C-B91D-0B6D7078AFBA}" type="datetime1">
               <a:rPr lang="en-US" smtClean="0"/>
               <a:pPr/>
-              <a:t>7/31/2018</a:t>
+              <a:t>8/1/2018</a:t>
             </a:fld>
             <a:endParaRPr lang="en-US" dirty="0"/>
           </a:p>
@@ -23046,6 +23046,45 @@
           </a:p>
         </p:txBody>
       </p:sp>
+      <p:sp>
+        <p:nvSpPr>
+          <p:cNvPr id="3" name="TextBox 2">
+            <a:extLst>
+              <a:ext uri="{FF2B5EF4-FFF2-40B4-BE49-F238E27FC236}">
+                <a16:creationId xmlns:a16="http://schemas.microsoft.com/office/drawing/2014/main" id="{7278877D-E0E8-4B56-AAD5-9CFA18DDE900}"/>
+              </a:ext>
+            </a:extLst>
+          </p:cNvPr>
+          <p:cNvSpPr txBox="1"/>
+          <p:nvPr/>
+        </p:nvSpPr>
+        <p:spPr>
+          <a:xfrm>
+            <a:off x="5027612" y="4393168"/>
+            <a:ext cx="3429000" cy="369332"/>
+          </a:xfrm>
+          <a:prstGeom prst="rect">
+            <a:avLst/>
+          </a:prstGeom>
+          <a:noFill/>
+          <a:ln>
+            <a:noFill/>
+          </a:ln>
+        </p:spPr>
+        <p:txBody>
+          <a:bodyPr wrap="square" rtlCol="0" anchor="ctr" anchorCtr="1">
+            <a:spAutoFit/>
+          </a:bodyPr>
+          <a:lstStyle/>
+          <a:p>
+            <a:r>
+              <a:rPr lang="en-US" dirty="0"/>
+              <a:t>* B: Buy S: Sell</a:t>
+            </a:r>
+            <a:endParaRPr lang="en-HK" dirty="0"/>
+          </a:p>
+        </p:txBody>
+      </p:sp>
     </p:spTree>
     <p:extLst>
       <p:ext uri="{BB962C8B-B14F-4D97-AF65-F5344CB8AC3E}">
@@ -23334,7 +23373,7 @@
         </p:nvSpPr>
         <p:spPr>
           <a:xfrm>
-            <a:off x="912812" y="533400"/>
+            <a:off x="760412" y="609600"/>
             <a:ext cx="4418171" cy="685800"/>
           </a:xfrm>
         </p:spPr>
@@ -23407,10 +23446,9 @@
           <a:lstStyle/>
           <a:p>
             <a:r>
-              <a:rPr lang="en-US"/>
-              <a:t>Our Strengths</a:t>
+              <a:rPr lang="en-US" dirty="0"/>
+              <a:t>RSI</a:t>
             </a:r>
-            <a:endParaRPr lang="en-US" dirty="0"/>
           </a:p>
         </p:txBody>
       </p:sp>

</xml_diff>

<commit_message>
built RSI and improved plotting
</commit_message>
<xml_diff>
--- a/doc/Project Idea Introdution.pptx
+++ b/doc/Project Idea Introdution.pptx
@@ -5,10 +5,10 @@
     <p:sldMasterId id="2147483660" r:id="rId1"/>
   </p:sldMasterIdLst>
   <p:notesMasterIdLst>
-    <p:notesMasterId r:id="rId10"/>
+    <p:notesMasterId r:id="rId11"/>
   </p:notesMasterIdLst>
   <p:handoutMasterIdLst>
-    <p:handoutMasterId r:id="rId11"/>
+    <p:handoutMasterId r:id="rId12"/>
   </p:handoutMasterIdLst>
   <p:sldIdLst>
     <p:sldId id="256" r:id="rId2"/>
@@ -18,7 +18,8 @@
     <p:sldId id="260" r:id="rId6"/>
     <p:sldId id="263" r:id="rId7"/>
     <p:sldId id="264" r:id="rId8"/>
-    <p:sldId id="262" r:id="rId9"/>
+    <p:sldId id="265" r:id="rId9"/>
+    <p:sldId id="262" r:id="rId10"/>
   </p:sldIdLst>
   <p:sldSz cx="12188825" cy="6858000"/>
   <p:notesSz cx="6858000" cy="9144000"/>
@@ -13493,7 +13494,7 @@
           <a:p>
             <a:fld id="{AC8CEC3D-96F7-401F-9673-3EE7F75C9C5B}" type="datetimeFigureOut">
               <a:rPr lang="en-US"/>
-              <a:t>8/1/2018</a:t>
+              <a:t>8/2/2018</a:t>
             </a:fld>
             <a:endParaRPr dirty="0"/>
           </a:p>
@@ -13658,7 +13659,7 @@
           <a:p>
             <a:fld id="{F032BCF4-D26D-4DAF-9F57-FE1E61FE7935}" type="datetimeFigureOut">
               <a:rPr lang="en-US"/>
-              <a:t>8/1/2018</a:t>
+              <a:t>8/2/2018</a:t>
             </a:fld>
             <a:endParaRPr dirty="0"/>
           </a:p>
@@ -14401,7 +14402,7 @@
           <a:p>
             <a:fld id="{DAD2365B-5397-4552-89D2-3C31D6B894C4}" type="datetime1">
               <a:rPr lang="en-US" smtClean="0"/>
-              <a:t>8/1/2018</a:t>
+              <a:t>8/2/2018</a:t>
             </a:fld>
             <a:endParaRPr lang="en-US" dirty="0"/>
           </a:p>
@@ -14630,7 +14631,7 @@
           <a:p>
             <a:fld id="{3718D474-84CF-40A5-B032-DFFDE135438A}" type="datetime1">
               <a:rPr lang="en-US" smtClean="0"/>
-              <a:t>8/1/2018</a:t>
+              <a:t>8/2/2018</a:t>
             </a:fld>
             <a:endParaRPr lang="en-US" dirty="0"/>
           </a:p>
@@ -14852,7 +14853,7 @@
           <a:p>
             <a:fld id="{7067C6EF-6B90-465F-AC36-47BDECADBD65}" type="datetime1">
               <a:rPr lang="en-US" smtClean="0"/>
-              <a:t>8/1/2018</a:t>
+              <a:t>8/2/2018</a:t>
             </a:fld>
             <a:endParaRPr lang="en-US" dirty="0"/>
           </a:p>
@@ -15069,7 +15070,7 @@
           <a:p>
             <a:fld id="{ED1E4A86-2703-4937-ABF7-D8FBDB5C3D3E}" type="datetime1">
               <a:rPr lang="en-US" smtClean="0"/>
-              <a:t>8/1/2018</a:t>
+              <a:t>8/2/2018</a:t>
             </a:fld>
             <a:endParaRPr lang="en-US" dirty="0"/>
           </a:p>
@@ -15335,7 +15336,7 @@
           <a:p>
             <a:fld id="{12E02F23-BD92-4B7B-9DFF-42EEC8F21ED4}" type="datetime1">
               <a:rPr lang="en-US" smtClean="0"/>
-              <a:t>8/1/2018</a:t>
+              <a:t>8/2/2018</a:t>
             </a:fld>
             <a:endParaRPr lang="en-US" dirty="0"/>
           </a:p>
@@ -15637,7 +15638,7 @@
           <a:p>
             <a:fld id="{8814B7EA-8738-442B-ADC7-3A7E6F5C49CD}" type="datetime1">
               <a:rPr lang="en-US" smtClean="0"/>
-              <a:t>8/1/2018</a:t>
+              <a:t>8/2/2018</a:t>
             </a:fld>
             <a:endParaRPr lang="en-US" dirty="0"/>
           </a:p>
@@ -16087,7 +16088,7 @@
           <a:p>
             <a:fld id="{8FE5692D-78A6-499F-901A-E660774CC8EE}" type="datetime1">
               <a:rPr lang="en-US" smtClean="0"/>
-              <a:t>8/1/2018</a:t>
+              <a:t>8/2/2018</a:t>
             </a:fld>
             <a:endParaRPr lang="en-US" dirty="0"/>
           </a:p>
@@ -16220,7 +16221,7 @@
           <a:p>
             <a:fld id="{6776F355-F21B-43C0-ABBD-B5AEBBE279A6}" type="datetime1">
               <a:rPr lang="en-US" smtClean="0"/>
-              <a:t>8/1/2018</a:t>
+              <a:t>8/2/2018</a:t>
             </a:fld>
             <a:endParaRPr lang="en-US" dirty="0"/>
           </a:p>
@@ -16330,7 +16331,7 @@
           <a:p>
             <a:fld id="{C0AB95E7-F437-40FB-91EE-0B08B57CB523}" type="datetime1">
               <a:rPr lang="en-US" smtClean="0"/>
-              <a:t>8/1/2018</a:t>
+              <a:t>8/2/2018</a:t>
             </a:fld>
             <a:endParaRPr lang="en-US" dirty="0"/>
           </a:p>
@@ -16630,7 +16631,7 @@
           <a:p>
             <a:fld id="{67709EEF-87D9-4049-9A5D-A2B5E4C83A85}" type="datetime1">
               <a:rPr lang="en-US" smtClean="0"/>
-              <a:t>8/1/2018</a:t>
+              <a:t>8/2/2018</a:t>
             </a:fld>
             <a:endParaRPr lang="en-US" dirty="0"/>
           </a:p>
@@ -16919,7 +16920,7 @@
           <a:p>
             <a:fld id="{CAEBD992-82F2-4752-BCD7-4BDCCFA26099}" type="datetime1">
               <a:rPr lang="en-US" smtClean="0"/>
-              <a:t>8/1/2018</a:t>
+              <a:t>8/2/2018</a:t>
             </a:fld>
             <a:endParaRPr lang="en-US" dirty="0"/>
           </a:p>
@@ -17217,7 +17218,7 @@
             <a:fld id="{7590C4DA-EDE6-465C-B91D-0B6D7078AFBA}" type="datetime1">
               <a:rPr lang="en-US" smtClean="0"/>
               <a:pPr/>
-              <a:t>8/1/2018</a:t>
+              <a:t>8/2/2018</a:t>
             </a:fld>
             <a:endParaRPr lang="en-US" dirty="0"/>
           </a:p>
@@ -23145,8 +23146,8 @@
         </p:nvSpPr>
         <p:spPr>
           <a:xfrm>
-            <a:off x="476604" y="685800"/>
-            <a:ext cx="2496309" cy="1524000"/>
+            <a:off x="314953" y="1887929"/>
+            <a:ext cx="2194116" cy="1066800"/>
           </a:xfrm>
         </p:spPr>
         <p:txBody>
@@ -23171,10 +23172,10 @@
       </p:sp>
       <p:pic>
         <p:nvPicPr>
-          <p:cNvPr id="7" name="Picture 6">
+          <p:cNvPr id="9" name="Picture 8">
             <a:extLst>
               <a:ext uri="{FF2B5EF4-FFF2-40B4-BE49-F238E27FC236}">
-                <a16:creationId xmlns:a16="http://schemas.microsoft.com/office/drawing/2014/main" id="{512677D3-9A6D-4AAC-BE52-E1A260FF1659}"/>
+                <a16:creationId xmlns:a16="http://schemas.microsoft.com/office/drawing/2014/main" id="{8E4D357C-51DC-408F-B451-3FC347BF6BD1}"/>
               </a:ext>
             </a:extLst>
           </p:cNvPr>
@@ -23197,8 +23198,8 @@
         </p:blipFill>
         <p:spPr>
           <a:xfrm>
-            <a:off x="3198812" y="228600"/>
-            <a:ext cx="8807438" cy="4344085"/>
+            <a:off x="182575" y="4495800"/>
+            <a:ext cx="5325218" cy="2314898"/>
           </a:xfrm>
           <a:prstGeom prst="rect">
             <a:avLst/>
@@ -23207,10 +23208,10 @@
       </p:pic>
       <p:pic>
         <p:nvPicPr>
-          <p:cNvPr id="9" name="Picture 8">
+          <p:cNvPr id="3" name="Picture 2">
             <a:extLst>
               <a:ext uri="{FF2B5EF4-FFF2-40B4-BE49-F238E27FC236}">
-                <a16:creationId xmlns:a16="http://schemas.microsoft.com/office/drawing/2014/main" id="{8E4D357C-51DC-408F-B451-3FC347BF6BD1}"/>
+                <a16:creationId xmlns:a16="http://schemas.microsoft.com/office/drawing/2014/main" id="{CDE0CC41-7343-45B7-BD07-64F9D6ECED30}"/>
               </a:ext>
             </a:extLst>
           </p:cNvPr>
@@ -23233,8 +23234,8 @@
         </p:blipFill>
         <p:spPr>
           <a:xfrm>
-            <a:off x="182575" y="4495800"/>
-            <a:ext cx="5325218" cy="2314898"/>
+            <a:off x="2641447" y="118258"/>
+            <a:ext cx="9338747" cy="4606142"/>
           </a:xfrm>
           <a:prstGeom prst="rect">
             <a:avLst/>
@@ -23283,12 +23284,45 @@
           <a:chExt cx="0" cy="0"/>
         </a:xfrm>
       </p:grpSpPr>
+      <p:sp>
+        <p:nvSpPr>
+          <p:cNvPr id="6" name="Title 1">
+            <a:extLst>
+              <a:ext uri="{FF2B5EF4-FFF2-40B4-BE49-F238E27FC236}">
+                <a16:creationId xmlns:a16="http://schemas.microsoft.com/office/drawing/2014/main" id="{9D122AD5-290E-412C-B57A-7CBDC3A2BF66}"/>
+              </a:ext>
+            </a:extLst>
+          </p:cNvPr>
+          <p:cNvSpPr>
+            <a:spLocks noGrp="1"/>
+          </p:cNvSpPr>
+          <p:nvPr>
+            <p:ph type="title"/>
+          </p:nvPr>
+        </p:nvSpPr>
+        <p:spPr>
+          <a:xfrm>
+            <a:off x="2589212" y="762000"/>
+            <a:ext cx="1447800" cy="685800"/>
+          </a:xfrm>
+        </p:spPr>
+        <p:txBody>
+          <a:bodyPr/>
+          <a:lstStyle/>
+          <a:p>
+            <a:r>
+              <a:rPr lang="en-US" b="1" dirty="0"/>
+              <a:t>MACD</a:t>
+            </a:r>
+          </a:p>
+        </p:txBody>
+      </p:sp>
       <p:pic>
         <p:nvPicPr>
-          <p:cNvPr id="3" name="Picture 2">
+          <p:cNvPr id="4" name="Picture 3">
             <a:extLst>
               <a:ext uri="{FF2B5EF4-FFF2-40B4-BE49-F238E27FC236}">
-                <a16:creationId xmlns:a16="http://schemas.microsoft.com/office/drawing/2014/main" id="{7AC6B854-526B-40DB-A1C0-297D815FF90E}"/>
+                <a16:creationId xmlns:a16="http://schemas.microsoft.com/office/drawing/2014/main" id="{1FA5CEDA-555B-443E-87D0-0E4534F88039}"/>
               </a:ext>
             </a:extLst>
           </p:cNvPr>
@@ -23311,8 +23345,8 @@
         </p:blipFill>
         <p:spPr>
           <a:xfrm>
-            <a:off x="455612" y="2362200"/>
-            <a:ext cx="8566286" cy="4225142"/>
+            <a:off x="55278" y="2412513"/>
+            <a:ext cx="8858534" cy="4369287"/>
           </a:xfrm>
           <a:prstGeom prst="rect">
             <a:avLst/>
@@ -23347,47 +23381,14 @@
         </p:blipFill>
         <p:spPr>
           <a:xfrm>
-            <a:off x="7694611" y="76200"/>
-            <a:ext cx="4345555" cy="2742333"/>
+            <a:off x="7786618" y="76200"/>
+            <a:ext cx="4346929" cy="2743200"/>
           </a:xfrm>
           <a:prstGeom prst="rect">
             <a:avLst/>
           </a:prstGeom>
         </p:spPr>
       </p:pic>
-      <p:sp>
-        <p:nvSpPr>
-          <p:cNvPr id="6" name="Title 1">
-            <a:extLst>
-              <a:ext uri="{FF2B5EF4-FFF2-40B4-BE49-F238E27FC236}">
-                <a16:creationId xmlns:a16="http://schemas.microsoft.com/office/drawing/2014/main" id="{9D122AD5-290E-412C-B57A-7CBDC3A2BF66}"/>
-              </a:ext>
-            </a:extLst>
-          </p:cNvPr>
-          <p:cNvSpPr>
-            <a:spLocks noGrp="1"/>
-          </p:cNvSpPr>
-          <p:nvPr>
-            <p:ph type="title"/>
-          </p:nvPr>
-        </p:nvSpPr>
-        <p:spPr>
-          <a:xfrm>
-            <a:off x="760412" y="609600"/>
-            <a:ext cx="4418171" cy="685800"/>
-          </a:xfrm>
-        </p:spPr>
-        <p:txBody>
-          <a:bodyPr/>
-          <a:lstStyle/>
-          <a:p>
-            <a:r>
-              <a:rPr lang="en-US" b="1" dirty="0"/>
-              <a:t>MACD</a:t>
-            </a:r>
-          </a:p>
-        </p:txBody>
-      </p:sp>
     </p:spTree>
     <p:extLst>
       <p:ext uri="{BB962C8B-B14F-4D97-AF65-F5344CB8AC3E}">
@@ -23432,7 +23433,13 @@
       </p:grpSpPr>
       <p:sp>
         <p:nvSpPr>
-          <p:cNvPr id="6" name="Title 5"/>
+          <p:cNvPr id="5" name="Title 5">
+            <a:extLst>
+              <a:ext uri="{FF2B5EF4-FFF2-40B4-BE49-F238E27FC236}">
+                <a16:creationId xmlns:a16="http://schemas.microsoft.com/office/drawing/2014/main" id="{700B750C-252C-490B-8400-63790969BAC4}"/>
+              </a:ext>
+            </a:extLst>
+          </p:cNvPr>
           <p:cNvSpPr>
             <a:spLocks noGrp="1"/>
           </p:cNvSpPr>
@@ -23440,18 +23447,103 @@
             <p:ph type="title"/>
           </p:nvPr>
         </p:nvSpPr>
-        <p:spPr/>
+        <p:spPr>
+          <a:xfrm>
+            <a:off x="5676026" y="228600"/>
+            <a:ext cx="836771" cy="609600"/>
+          </a:xfrm>
+        </p:spPr>
         <p:txBody>
-          <a:bodyPr/>
+          <a:bodyPr>
+            <a:normAutofit fontScale="90000"/>
+          </a:bodyPr>
           <a:lstStyle/>
           <a:p>
             <a:r>
-              <a:rPr lang="en-US" dirty="0"/>
+              <a:rPr lang="en-US" b="1" dirty="0"/>
               <a:t>RSI</a:t>
             </a:r>
           </a:p>
         </p:txBody>
       </p:sp>
+      <p:pic>
+        <p:nvPicPr>
+          <p:cNvPr id="7" name="Picture 6">
+            <a:extLst>
+              <a:ext uri="{FF2B5EF4-FFF2-40B4-BE49-F238E27FC236}">
+                <a16:creationId xmlns:a16="http://schemas.microsoft.com/office/drawing/2014/main" id="{00E334E2-0A43-4543-99DA-2A51BB4999A2}"/>
+              </a:ext>
+            </a:extLst>
+          </p:cNvPr>
+          <p:cNvPicPr>
+            <a:picLocks noChangeAspect="1"/>
+          </p:cNvPicPr>
+          <p:nvPr/>
+        </p:nvPicPr>
+        <p:blipFill>
+          <a:blip r:embed="rId2">
+            <a:extLst>
+              <a:ext uri="{28A0092B-C50C-407E-A947-70E740481C1C}">
+                <a14:useLocalDpi xmlns:a14="http://schemas.microsoft.com/office/drawing/2010/main" val="0"/>
+              </a:ext>
+            </a:extLst>
+          </a:blip>
+          <a:stretch>
+            <a:fillRect/>
+          </a:stretch>
+        </p:blipFill>
+        <p:spPr>
+          <a:xfrm>
+            <a:off x="379412" y="1030448"/>
+            <a:ext cx="11506116" cy="5675152"/>
+          </a:xfrm>
+          <a:prstGeom prst="rect">
+            <a:avLst/>
+          </a:prstGeom>
+        </p:spPr>
+      </p:pic>
+    </p:spTree>
+    <p:extLst>
+      <p:ext uri="{BB962C8B-B14F-4D97-AF65-F5344CB8AC3E}">
+        <p14:creationId xmlns:p14="http://schemas.microsoft.com/office/powerpoint/2010/main" val="2350167425"/>
+      </p:ext>
+    </p:extLst>
+  </p:cSld>
+  <p:clrMapOvr>
+    <a:masterClrMapping/>
+  </p:clrMapOvr>
+  <mc:AlternateContent xmlns:mc="http://schemas.openxmlformats.org/markup-compatibility/2006" xmlns:p14="http://schemas.microsoft.com/office/powerpoint/2010/main">
+    <mc:Choice Requires="p14">
+      <p:transition spd="med" p14:dur="700">
+        <p:fade/>
+      </p:transition>
+    </mc:Choice>
+    <mc:Fallback xmlns="">
+      <p:transition spd="med">
+        <p:fade/>
+      </p:transition>
+    </mc:Fallback>
+  </mc:AlternateContent>
+</p:sld>
+</file>
+
+<file path=ppt/slides/slide9.xml><?xml version="1.0" encoding="utf-8"?>
+<p:sld xmlns:a="http://schemas.openxmlformats.org/drawingml/2006/main" xmlns:r="http://schemas.openxmlformats.org/officeDocument/2006/relationships" xmlns:p="http://schemas.openxmlformats.org/presentationml/2006/main">
+  <p:cSld>
+    <p:spTree>
+      <p:nvGrpSpPr>
+        <p:cNvPr id="1" name=""/>
+        <p:cNvGrpSpPr/>
+        <p:nvPr/>
+      </p:nvGrpSpPr>
+      <p:grpSpPr>
+        <a:xfrm>
+          <a:off x="0" y="0"/>
+          <a:ext cx="0" cy="0"/>
+          <a:chOff x="0" y="0"/>
+          <a:chExt cx="0" cy="0"/>
+        </a:xfrm>
+      </p:grpSpPr>
       <p:grpSp>
         <p:nvGrpSpPr>
           <p:cNvPr id="10" name="Group 9" descr="Three separate radial cycle charts showing the relationship between 4 or 5 tasks in a group"/>
@@ -23460,7 +23552,7 @@
         </p:nvGrpSpPr>
         <p:grpSpPr>
           <a:xfrm>
-            <a:off x="303212" y="609600"/>
+            <a:off x="379412" y="609600"/>
             <a:ext cx="11283930" cy="4800600"/>
             <a:chOff x="303212" y="609600"/>
             <a:chExt cx="11283930" cy="4800600"/>
@@ -23533,6 +23625,31 @@
           </a:graphic>
         </p:graphicFrame>
       </p:grpSp>
+      <p:sp>
+        <p:nvSpPr>
+          <p:cNvPr id="2" name="Title 1">
+            <a:extLst>
+              <a:ext uri="{FF2B5EF4-FFF2-40B4-BE49-F238E27FC236}">
+                <a16:creationId xmlns:a16="http://schemas.microsoft.com/office/drawing/2014/main" id="{400EF727-FAA0-4BE2-9210-6A8BDBA055E1}"/>
+              </a:ext>
+            </a:extLst>
+          </p:cNvPr>
+          <p:cNvSpPr>
+            <a:spLocks noGrp="1"/>
+          </p:cNvSpPr>
+          <p:nvPr>
+            <p:ph type="title"/>
+          </p:nvPr>
+        </p:nvSpPr>
+        <p:spPr/>
+        <p:txBody>
+          <a:bodyPr/>
+          <a:lstStyle/>
+          <a:p>
+            <a:endParaRPr lang="en-HK"/>
+          </a:p>
+        </p:txBody>
+      </p:sp>
     </p:spTree>
     <p:extLst>
       <p:ext uri="{BB962C8B-B14F-4D97-AF65-F5344CB8AC3E}">

</xml_diff>

<commit_message>
obv done and imprv doc
</commit_message>
<xml_diff>
--- a/doc/Project Idea Introdution.pptx
+++ b/doc/Project Idea Introdution.pptx
@@ -5,10 +5,10 @@
     <p:sldMasterId id="2147483660" r:id="rId1"/>
   </p:sldMasterIdLst>
   <p:notesMasterIdLst>
-    <p:notesMasterId r:id="rId13"/>
+    <p:notesMasterId r:id="rId15"/>
   </p:notesMasterIdLst>
   <p:handoutMasterIdLst>
-    <p:handoutMasterId r:id="rId14"/>
+    <p:handoutMasterId r:id="rId16"/>
   </p:handoutMasterIdLst>
   <p:sldIdLst>
     <p:sldId id="256" r:id="rId2"/>
@@ -18,10 +18,12 @@
     <p:sldId id="267" r:id="rId6"/>
     <p:sldId id="260" r:id="rId7"/>
     <p:sldId id="263" r:id="rId8"/>
-    <p:sldId id="264" r:id="rId9"/>
-    <p:sldId id="265" r:id="rId10"/>
-    <p:sldId id="266" r:id="rId11"/>
-    <p:sldId id="262" r:id="rId12"/>
+    <p:sldId id="268" r:id="rId9"/>
+    <p:sldId id="269" r:id="rId10"/>
+    <p:sldId id="264" r:id="rId11"/>
+    <p:sldId id="270" r:id="rId12"/>
+    <p:sldId id="265" r:id="rId13"/>
+    <p:sldId id="262" r:id="rId14"/>
   </p:sldIdLst>
   <p:sldSz cx="12188825" cy="6858000"/>
   <p:notesSz cx="6858000" cy="9144000"/>
@@ -17779,10 +17781,10 @@
       </p:grpSpPr>
       <p:sp>
         <p:nvSpPr>
-          <p:cNvPr id="2" name="Title 1">
+          <p:cNvPr id="6" name="Title 1">
             <a:extLst>
               <a:ext uri="{FF2B5EF4-FFF2-40B4-BE49-F238E27FC236}">
-                <a16:creationId xmlns:a16="http://schemas.microsoft.com/office/drawing/2014/main" id="{529D350A-DE11-4464-8FC2-C0A5B571CFF7}"/>
+                <a16:creationId xmlns:a16="http://schemas.microsoft.com/office/drawing/2014/main" id="{9D122AD5-290E-412C-B57A-7CBDC3A2BF66}"/>
               </a:ext>
             </a:extLst>
           </p:cNvPr>
@@ -17795,28 +17797,36 @@
         </p:nvSpPr>
         <p:spPr>
           <a:xfrm>
-            <a:off x="5332412" y="118258"/>
-            <a:ext cx="989171" cy="609600"/>
+            <a:off x="836612" y="533400"/>
+            <a:ext cx="4953000" cy="1295400"/>
           </a:xfrm>
         </p:spPr>
         <p:txBody>
-          <a:bodyPr/>
+          <a:bodyPr>
+            <a:normAutofit fontScale="90000"/>
+          </a:bodyPr>
           <a:lstStyle/>
           <a:p>
             <a:r>
               <a:rPr lang="en-US" b="1" dirty="0"/>
-              <a:t>KDJ</a:t>
+              <a:t>Moving Average Convergence/Divergence</a:t>
             </a:r>
-            <a:endParaRPr lang="en-HK" b="1" dirty="0"/>
+            <a:br>
+              <a:rPr lang="en-US" b="1" dirty="0"/>
+            </a:br>
+            <a:r>
+              <a:rPr lang="en-US" b="1" dirty="0"/>
+              <a:t>MACD</a:t>
+            </a:r>
           </a:p>
         </p:txBody>
       </p:sp>
       <p:pic>
         <p:nvPicPr>
-          <p:cNvPr id="6" name="Picture 5">
+          <p:cNvPr id="4" name="Picture 3">
             <a:extLst>
               <a:ext uri="{FF2B5EF4-FFF2-40B4-BE49-F238E27FC236}">
-                <a16:creationId xmlns:a16="http://schemas.microsoft.com/office/drawing/2014/main" id="{9459756D-BAD5-4C79-95D8-8C0DC9522DFF}"/>
+                <a16:creationId xmlns:a16="http://schemas.microsoft.com/office/drawing/2014/main" id="{1FA5CEDA-555B-443E-87D0-0E4534F88039}"/>
               </a:ext>
             </a:extLst>
           </p:cNvPr>
@@ -17839,8 +17849,44 @@
         </p:blipFill>
         <p:spPr>
           <a:xfrm>
-            <a:off x="142426" y="838200"/>
-            <a:ext cx="11965112" cy="5901542"/>
+            <a:off x="55278" y="2412513"/>
+            <a:ext cx="8858534" cy="4369287"/>
+          </a:xfrm>
+          <a:prstGeom prst="rect">
+            <a:avLst/>
+          </a:prstGeom>
+        </p:spPr>
+      </p:pic>
+      <p:pic>
+        <p:nvPicPr>
+          <p:cNvPr id="5" name="Picture 4">
+            <a:extLst>
+              <a:ext uri="{FF2B5EF4-FFF2-40B4-BE49-F238E27FC236}">
+                <a16:creationId xmlns:a16="http://schemas.microsoft.com/office/drawing/2014/main" id="{9B4F7368-F564-4D27-B119-C4BBFEAE19EE}"/>
+              </a:ext>
+            </a:extLst>
+          </p:cNvPr>
+          <p:cNvPicPr>
+            <a:picLocks noChangeAspect="1"/>
+          </p:cNvPicPr>
+          <p:nvPr/>
+        </p:nvPicPr>
+        <p:blipFill>
+          <a:blip r:embed="rId3">
+            <a:extLst>
+              <a:ext uri="{28A0092B-C50C-407E-A947-70E740481C1C}">
+                <a14:useLocalDpi xmlns:a14="http://schemas.microsoft.com/office/drawing/2010/main" val="0"/>
+              </a:ext>
+            </a:extLst>
+          </a:blip>
+          <a:stretch>
+            <a:fillRect/>
+          </a:stretch>
+        </p:blipFill>
+        <p:spPr>
+          <a:xfrm>
+            <a:off x="7786618" y="76200"/>
+            <a:ext cx="4346929" cy="2743200"/>
           </a:xfrm>
           <a:prstGeom prst="rect">
             <a:avLst/>
@@ -17850,7 +17896,7 @@
     </p:spTree>
     <p:extLst>
       <p:ext uri="{BB962C8B-B14F-4D97-AF65-F5344CB8AC3E}">
-        <p14:creationId xmlns:p14="http://schemas.microsoft.com/office/powerpoint/2010/main" val="1086931436"/>
+        <p14:creationId xmlns:p14="http://schemas.microsoft.com/office/powerpoint/2010/main" val="136994050"/>
       </p:ext>
     </p:extLst>
   </p:cSld>
@@ -17873,6 +17919,256 @@
 </file>
 
 <file path=ppt/slides/slide11.xml><?xml version="1.0" encoding="utf-8"?>
+<p:sld xmlns:a="http://schemas.openxmlformats.org/drawingml/2006/main" xmlns:r="http://schemas.openxmlformats.org/officeDocument/2006/relationships" xmlns:p="http://schemas.openxmlformats.org/presentationml/2006/main">
+  <p:cSld>
+    <p:spTree>
+      <p:nvGrpSpPr>
+        <p:cNvPr id="1" name=""/>
+        <p:cNvGrpSpPr/>
+        <p:nvPr/>
+      </p:nvGrpSpPr>
+      <p:grpSpPr>
+        <a:xfrm>
+          <a:off x="0" y="0"/>
+          <a:ext cx="0" cy="0"/>
+          <a:chOff x="0" y="0"/>
+          <a:chExt cx="0" cy="0"/>
+        </a:xfrm>
+      </p:grpSpPr>
+      <p:sp>
+        <p:nvSpPr>
+          <p:cNvPr id="5" name="Title 5">
+            <a:extLst>
+              <a:ext uri="{FF2B5EF4-FFF2-40B4-BE49-F238E27FC236}">
+                <a16:creationId xmlns:a16="http://schemas.microsoft.com/office/drawing/2014/main" id="{A8B0888D-FA90-4C7A-9775-CE567A65857A}"/>
+              </a:ext>
+            </a:extLst>
+          </p:cNvPr>
+          <p:cNvSpPr>
+            <a:spLocks noGrp="1"/>
+          </p:cNvSpPr>
+          <p:nvPr>
+            <p:ph type="title"/>
+          </p:nvPr>
+        </p:nvSpPr>
+        <p:spPr>
+          <a:xfrm>
+            <a:off x="3273843" y="149604"/>
+            <a:ext cx="5641137" cy="609600"/>
+          </a:xfrm>
+        </p:spPr>
+        <p:txBody>
+          <a:bodyPr>
+            <a:normAutofit/>
+          </a:bodyPr>
+          <a:lstStyle/>
+          <a:p>
+            <a:r>
+              <a:rPr lang="en-US" b="1" dirty="0"/>
+              <a:t>On </a:t>
+            </a:r>
+            <a:r>
+              <a:rPr lang="en-US" altLang="zh-TW" b="1" dirty="0"/>
+              <a:t>B</a:t>
+            </a:r>
+            <a:r>
+              <a:rPr lang="en-HK" altLang="zh-TW" b="1" dirty="0" err="1"/>
+              <a:t>alance</a:t>
+            </a:r>
+            <a:r>
+              <a:rPr lang="zh-TW" altLang="en-US" b="1" dirty="0"/>
+              <a:t> </a:t>
+            </a:r>
+            <a:r>
+              <a:rPr lang="en-HK" altLang="zh-TW" b="1" dirty="0"/>
+              <a:t>Volume</a:t>
+            </a:r>
+            <a:r>
+              <a:rPr lang="zh-TW" altLang="en-US" b="1" dirty="0"/>
+              <a:t> </a:t>
+            </a:r>
+            <a:r>
+              <a:rPr lang="en-US" b="1" dirty="0"/>
+              <a:t>- OBV</a:t>
+            </a:r>
+          </a:p>
+        </p:txBody>
+      </p:sp>
+      <p:pic>
+        <p:nvPicPr>
+          <p:cNvPr id="4" name="Picture 3">
+            <a:extLst>
+              <a:ext uri="{FF2B5EF4-FFF2-40B4-BE49-F238E27FC236}">
+                <a16:creationId xmlns:a16="http://schemas.microsoft.com/office/drawing/2014/main" id="{9BA0ADD8-DB82-4AF7-A4BF-48026BC8DE28}"/>
+              </a:ext>
+            </a:extLst>
+          </p:cNvPr>
+          <p:cNvPicPr>
+            <a:picLocks noChangeAspect="1"/>
+          </p:cNvPicPr>
+          <p:nvPr/>
+        </p:nvPicPr>
+        <p:blipFill>
+          <a:blip r:embed="rId2">
+            <a:extLst>
+              <a:ext uri="{28A0092B-C50C-407E-A947-70E740481C1C}">
+                <a14:useLocalDpi xmlns:a14="http://schemas.microsoft.com/office/drawing/2010/main" val="0"/>
+              </a:ext>
+            </a:extLst>
+          </a:blip>
+          <a:stretch>
+            <a:fillRect/>
+          </a:stretch>
+        </p:blipFill>
+        <p:spPr>
+          <a:xfrm>
+            <a:off x="189706" y="883650"/>
+            <a:ext cx="11809412" cy="5824746"/>
+          </a:xfrm>
+          <a:prstGeom prst="rect">
+            <a:avLst/>
+          </a:prstGeom>
+        </p:spPr>
+      </p:pic>
+    </p:spTree>
+    <p:extLst>
+      <p:ext uri="{BB962C8B-B14F-4D97-AF65-F5344CB8AC3E}">
+        <p14:creationId xmlns:p14="http://schemas.microsoft.com/office/powerpoint/2010/main" val="1907231589"/>
+      </p:ext>
+    </p:extLst>
+  </p:cSld>
+  <p:clrMapOvr>
+    <a:masterClrMapping/>
+  </p:clrMapOvr>
+  <mc:AlternateContent xmlns:mc="http://schemas.openxmlformats.org/markup-compatibility/2006" xmlns:p14="http://schemas.microsoft.com/office/powerpoint/2010/main">
+    <mc:Choice Requires="p14">
+      <p:transition spd="med" p14:dur="700">
+        <p:fade/>
+      </p:transition>
+    </mc:Choice>
+    <mc:Fallback xmlns="">
+      <p:transition spd="med">
+        <p:fade/>
+      </p:transition>
+    </mc:Fallback>
+  </mc:AlternateContent>
+</p:sld>
+</file>
+
+<file path=ppt/slides/slide12.xml><?xml version="1.0" encoding="utf-8"?>
+<p:sld xmlns:a="http://schemas.openxmlformats.org/drawingml/2006/main" xmlns:r="http://schemas.openxmlformats.org/officeDocument/2006/relationships" xmlns:p="http://schemas.openxmlformats.org/presentationml/2006/main">
+  <p:cSld>
+    <p:spTree>
+      <p:nvGrpSpPr>
+        <p:cNvPr id="1" name=""/>
+        <p:cNvGrpSpPr/>
+        <p:nvPr/>
+      </p:nvGrpSpPr>
+      <p:grpSpPr>
+        <a:xfrm>
+          <a:off x="0" y="0"/>
+          <a:ext cx="0" cy="0"/>
+          <a:chOff x="0" y="0"/>
+          <a:chExt cx="0" cy="0"/>
+        </a:xfrm>
+      </p:grpSpPr>
+      <p:sp>
+        <p:nvSpPr>
+          <p:cNvPr id="5" name="Title 5">
+            <a:extLst>
+              <a:ext uri="{FF2B5EF4-FFF2-40B4-BE49-F238E27FC236}">
+                <a16:creationId xmlns:a16="http://schemas.microsoft.com/office/drawing/2014/main" id="{700B750C-252C-490B-8400-63790969BAC4}"/>
+              </a:ext>
+            </a:extLst>
+          </p:cNvPr>
+          <p:cNvSpPr>
+            <a:spLocks noGrp="1"/>
+          </p:cNvSpPr>
+          <p:nvPr>
+            <p:ph type="title"/>
+          </p:nvPr>
+        </p:nvSpPr>
+        <p:spPr>
+          <a:xfrm>
+            <a:off x="3256318" y="152400"/>
+            <a:ext cx="5676186" cy="609600"/>
+          </a:xfrm>
+        </p:spPr>
+        <p:txBody>
+          <a:bodyPr>
+            <a:normAutofit fontScale="90000"/>
+          </a:bodyPr>
+          <a:lstStyle/>
+          <a:p>
+            <a:r>
+              <a:rPr lang="en-US" b="1" dirty="0"/>
+              <a:t>Relative Strength Index - RSI</a:t>
+            </a:r>
+          </a:p>
+        </p:txBody>
+      </p:sp>
+      <p:pic>
+        <p:nvPicPr>
+          <p:cNvPr id="7" name="Picture 6">
+            <a:extLst>
+              <a:ext uri="{FF2B5EF4-FFF2-40B4-BE49-F238E27FC236}">
+                <a16:creationId xmlns:a16="http://schemas.microsoft.com/office/drawing/2014/main" id="{00E334E2-0A43-4543-99DA-2A51BB4999A2}"/>
+              </a:ext>
+            </a:extLst>
+          </p:cNvPr>
+          <p:cNvPicPr>
+            <a:picLocks noChangeAspect="1"/>
+          </p:cNvPicPr>
+          <p:nvPr/>
+        </p:nvPicPr>
+        <p:blipFill>
+          <a:blip r:embed="rId2">
+            <a:extLst>
+              <a:ext uri="{28A0092B-C50C-407E-A947-70E740481C1C}">
+                <a14:useLocalDpi xmlns:a14="http://schemas.microsoft.com/office/drawing/2010/main" val="0"/>
+              </a:ext>
+            </a:extLst>
+          </a:blip>
+          <a:stretch>
+            <a:fillRect/>
+          </a:stretch>
+        </p:blipFill>
+        <p:spPr>
+          <a:xfrm>
+            <a:off x="308754" y="922090"/>
+            <a:ext cx="11571315" cy="5707310"/>
+          </a:xfrm>
+          <a:prstGeom prst="rect">
+            <a:avLst/>
+          </a:prstGeom>
+        </p:spPr>
+      </p:pic>
+    </p:spTree>
+    <p:extLst>
+      <p:ext uri="{BB962C8B-B14F-4D97-AF65-F5344CB8AC3E}">
+        <p14:creationId xmlns:p14="http://schemas.microsoft.com/office/powerpoint/2010/main" val="2350167425"/>
+      </p:ext>
+    </p:extLst>
+  </p:cSld>
+  <p:clrMapOvr>
+    <a:masterClrMapping/>
+  </p:clrMapOvr>
+  <mc:AlternateContent xmlns:mc="http://schemas.openxmlformats.org/markup-compatibility/2006" xmlns:p14="http://schemas.microsoft.com/office/powerpoint/2010/main">
+    <mc:Choice Requires="p14">
+      <p:transition spd="med" p14:dur="700">
+        <p:fade/>
+      </p:transition>
+    </mc:Choice>
+    <mc:Fallback xmlns="">
+      <p:transition spd="med">
+        <p:fade/>
+      </p:transition>
+    </mc:Fallback>
+  </mc:AlternateContent>
+</p:sld>
+</file>
+
+<file path=ppt/slides/slide13.xml><?xml version="1.0" encoding="utf-8"?>
 <p:sld xmlns:a="http://schemas.openxmlformats.org/drawingml/2006/main" xmlns:r="http://schemas.openxmlformats.org/officeDocument/2006/relationships" xmlns:p="http://schemas.openxmlformats.org/presentationml/2006/main">
   <p:cSld>
     <p:spTree>
@@ -23522,13 +23818,20 @@
         </p:nvSpPr>
         <p:spPr>
           <a:xfrm>
-            <a:off x="314953" y="1887929"/>
-            <a:ext cx="2194116" cy="1066800"/>
+            <a:off x="314953" y="1676400"/>
+            <a:ext cx="2194116" cy="1278329"/>
           </a:xfrm>
+          <a:effectLst>
+            <a:glow rad="152400">
+              <a:srgbClr val="FF0000">
+                <a:alpha val="40000"/>
+              </a:srgbClr>
+            </a:glow>
+          </a:effectLst>
         </p:spPr>
         <p:txBody>
           <a:bodyPr>
-            <a:normAutofit/>
+            <a:normAutofit fontScale="90000"/>
           </a:bodyPr>
           <a:lstStyle/>
           <a:p>
@@ -23541,8 +23844,16 @@
             </a:br>
             <a:r>
               <a:rPr lang="en-US" b="1" dirty="0"/>
-              <a:t>Bands</a:t>
+              <a:t>Bands –</a:t>
             </a:r>
+            <a:br>
+              <a:rPr lang="en-US" b="1" dirty="0"/>
+            </a:br>
+            <a:r>
+              <a:rPr lang="en-US" b="1" dirty="0" err="1"/>
+              <a:t>BBands</a:t>
+            </a:r>
+            <a:endParaRPr lang="en-US" b="1" dirty="0"/>
           </a:p>
         </p:txBody>
       </p:sp>
@@ -23662,10 +23973,10 @@
       </p:grpSpPr>
       <p:sp>
         <p:nvSpPr>
-          <p:cNvPr id="6" name="Title 1">
+          <p:cNvPr id="5" name="Title 5">
             <a:extLst>
               <a:ext uri="{FF2B5EF4-FFF2-40B4-BE49-F238E27FC236}">
-                <a16:creationId xmlns:a16="http://schemas.microsoft.com/office/drawing/2014/main" id="{9D122AD5-290E-412C-B57A-7CBDC3A2BF66}"/>
+                <a16:creationId xmlns:a16="http://schemas.microsoft.com/office/drawing/2014/main" id="{A8B0888D-FA90-4C7A-9775-CE567A65857A}"/>
               </a:ext>
             </a:extLst>
           </p:cNvPr>
@@ -23678,27 +23989,29 @@
         </p:nvSpPr>
         <p:spPr>
           <a:xfrm>
-            <a:off x="2589212" y="762000"/>
-            <a:ext cx="1447800" cy="685800"/>
+            <a:off x="3037065" y="152400"/>
+            <a:ext cx="6114693" cy="609600"/>
           </a:xfrm>
         </p:spPr>
         <p:txBody>
-          <a:bodyPr/>
+          <a:bodyPr>
+            <a:normAutofit fontScale="90000"/>
+          </a:bodyPr>
           <a:lstStyle/>
           <a:p>
             <a:r>
               <a:rPr lang="en-US" b="1" dirty="0"/>
-              <a:t>MACD</a:t>
+              <a:t>Commodity Channel Index - CCI</a:t>
             </a:r>
           </a:p>
         </p:txBody>
       </p:sp>
       <p:pic>
         <p:nvPicPr>
-          <p:cNvPr id="4" name="Picture 3">
+          <p:cNvPr id="7" name="Picture 6">
             <a:extLst>
               <a:ext uri="{FF2B5EF4-FFF2-40B4-BE49-F238E27FC236}">
-                <a16:creationId xmlns:a16="http://schemas.microsoft.com/office/drawing/2014/main" id="{1FA5CEDA-555B-443E-87D0-0E4534F88039}"/>
+                <a16:creationId xmlns:a16="http://schemas.microsoft.com/office/drawing/2014/main" id="{FFEDE382-9F46-476D-BCB5-59481860FD92}"/>
               </a:ext>
             </a:extLst>
           </p:cNvPr>
@@ -23721,44 +24034,8 @@
         </p:blipFill>
         <p:spPr>
           <a:xfrm>
-            <a:off x="55278" y="2412513"/>
-            <a:ext cx="8858534" cy="4369287"/>
-          </a:xfrm>
-          <a:prstGeom prst="rect">
-            <a:avLst/>
-          </a:prstGeom>
-        </p:spPr>
-      </p:pic>
-      <p:pic>
-        <p:nvPicPr>
-          <p:cNvPr id="5" name="Picture 4">
-            <a:extLst>
-              <a:ext uri="{FF2B5EF4-FFF2-40B4-BE49-F238E27FC236}">
-                <a16:creationId xmlns:a16="http://schemas.microsoft.com/office/drawing/2014/main" id="{9B4F7368-F564-4D27-B119-C4BBFEAE19EE}"/>
-              </a:ext>
-            </a:extLst>
-          </p:cNvPr>
-          <p:cNvPicPr>
-            <a:picLocks noChangeAspect="1"/>
-          </p:cNvPicPr>
-          <p:nvPr/>
-        </p:nvPicPr>
-        <p:blipFill>
-          <a:blip r:embed="rId3">
-            <a:extLst>
-              <a:ext uri="{28A0092B-C50C-407E-A947-70E740481C1C}">
-                <a14:useLocalDpi xmlns:a14="http://schemas.microsoft.com/office/drawing/2010/main" val="0"/>
-              </a:ext>
-            </a:extLst>
-          </a:blip>
-          <a:stretch>
-            <a:fillRect/>
-          </a:stretch>
-        </p:blipFill>
-        <p:spPr>
-          <a:xfrm>
-            <a:off x="7786618" y="76200"/>
-            <a:ext cx="4346929" cy="2743200"/>
+            <a:off x="189706" y="914400"/>
+            <a:ext cx="11809412" cy="5824747"/>
           </a:xfrm>
           <a:prstGeom prst="rect">
             <a:avLst/>
@@ -23768,7 +24045,7 @@
     </p:spTree>
     <p:extLst>
       <p:ext uri="{BB962C8B-B14F-4D97-AF65-F5344CB8AC3E}">
-        <p14:creationId xmlns:p14="http://schemas.microsoft.com/office/powerpoint/2010/main" val="136994050"/>
+        <p14:creationId xmlns:p14="http://schemas.microsoft.com/office/powerpoint/2010/main" val="2138384216"/>
       </p:ext>
     </p:extLst>
   </p:cSld>
@@ -23812,7 +24089,7 @@
           <p:cNvPr id="5" name="Title 5">
             <a:extLst>
               <a:ext uri="{FF2B5EF4-FFF2-40B4-BE49-F238E27FC236}">
-                <a16:creationId xmlns:a16="http://schemas.microsoft.com/office/drawing/2014/main" id="{700B750C-252C-490B-8400-63790969BAC4}"/>
+                <a16:creationId xmlns:a16="http://schemas.microsoft.com/office/drawing/2014/main" id="{A8B0888D-FA90-4C7A-9775-CE567A65857A}"/>
               </a:ext>
             </a:extLst>
           </p:cNvPr>
@@ -23825,8 +24102,8 @@
         </p:nvSpPr>
         <p:spPr>
           <a:xfrm>
-            <a:off x="5676026" y="228600"/>
-            <a:ext cx="836771" cy="609600"/>
+            <a:off x="1824875" y="152400"/>
+            <a:ext cx="8539074" cy="609600"/>
           </a:xfrm>
         </p:spPr>
         <p:txBody>
@@ -23837,17 +24114,17 @@
           <a:p>
             <a:r>
               <a:rPr lang="en-US" b="1" dirty="0"/>
-              <a:t>RSI</a:t>
+              <a:t>(Slow) Stochastic Oscillator with J Line - KDJ</a:t>
             </a:r>
           </a:p>
         </p:txBody>
       </p:sp>
       <p:pic>
         <p:nvPicPr>
-          <p:cNvPr id="7" name="Picture 6">
+          <p:cNvPr id="3" name="Picture 2">
             <a:extLst>
               <a:ext uri="{FF2B5EF4-FFF2-40B4-BE49-F238E27FC236}">
-                <a16:creationId xmlns:a16="http://schemas.microsoft.com/office/drawing/2014/main" id="{00E334E2-0A43-4543-99DA-2A51BB4999A2}"/>
+                <a16:creationId xmlns:a16="http://schemas.microsoft.com/office/drawing/2014/main" id="{2550654F-A36F-4CFA-B555-D1E4D57C816A}"/>
               </a:ext>
             </a:extLst>
           </p:cNvPr>
@@ -23870,8 +24147,8 @@
         </p:blipFill>
         <p:spPr>
           <a:xfrm>
-            <a:off x="379412" y="1030448"/>
-            <a:ext cx="11506116" cy="5675152"/>
+            <a:off x="189706" y="891340"/>
+            <a:ext cx="11809412" cy="5824746"/>
           </a:xfrm>
           <a:prstGeom prst="rect">
             <a:avLst/>
@@ -23881,7 +24158,7 @@
     </p:spTree>
     <p:extLst>
       <p:ext uri="{BB962C8B-B14F-4D97-AF65-F5344CB8AC3E}">
-        <p14:creationId xmlns:p14="http://schemas.microsoft.com/office/powerpoint/2010/main" val="2350167425"/>
+        <p14:creationId xmlns:p14="http://schemas.microsoft.com/office/powerpoint/2010/main" val="1566003477"/>
       </p:ext>
     </p:extLst>
   </p:cSld>

</xml_diff>

<commit_message>
indicators and user portfolio for TA done
</commit_message>
<xml_diff>
--- a/doc/Project Idea Introdution.pptx
+++ b/doc/Project Idea Introdution.pptx
@@ -5,10 +5,10 @@
     <p:sldMasterId id="2147483660" r:id="rId1"/>
   </p:sldMasterIdLst>
   <p:notesMasterIdLst>
-    <p:notesMasterId r:id="rId15"/>
+    <p:notesMasterId r:id="rId16"/>
   </p:notesMasterIdLst>
   <p:handoutMasterIdLst>
-    <p:handoutMasterId r:id="rId16"/>
+    <p:handoutMasterId r:id="rId17"/>
   </p:handoutMasterIdLst>
   <p:sldIdLst>
     <p:sldId id="256" r:id="rId2"/>
@@ -22,8 +22,9 @@
     <p:sldId id="269" r:id="rId10"/>
     <p:sldId id="264" r:id="rId11"/>
     <p:sldId id="270" r:id="rId12"/>
-    <p:sldId id="265" r:id="rId13"/>
-    <p:sldId id="262" r:id="rId14"/>
+    <p:sldId id="271" r:id="rId13"/>
+    <p:sldId id="265" r:id="rId14"/>
+    <p:sldId id="262" r:id="rId15"/>
   </p:sldIdLst>
   <p:sldSz cx="12188825" cy="6858000"/>
   <p:notesSz cx="6858000" cy="9144000"/>
@@ -13498,7 +13499,7 @@
           <a:p>
             <a:fld id="{AC8CEC3D-96F7-401F-9673-3EE7F75C9C5B}" type="datetimeFigureOut">
               <a:rPr lang="en-US"/>
-              <a:t>8/3/2018</a:t>
+              <a:t>8/6/2018</a:t>
             </a:fld>
             <a:endParaRPr dirty="0"/>
           </a:p>
@@ -13663,7 +13664,7 @@
           <a:p>
             <a:fld id="{F032BCF4-D26D-4DAF-9F57-FE1E61FE7935}" type="datetimeFigureOut">
               <a:rPr lang="en-US"/>
-              <a:t>8/3/2018</a:t>
+              <a:t>8/6/2018</a:t>
             </a:fld>
             <a:endParaRPr dirty="0"/>
           </a:p>
@@ -14406,7 +14407,7 @@
           <a:p>
             <a:fld id="{DAD2365B-5397-4552-89D2-3C31D6B894C4}" type="datetime1">
               <a:rPr lang="en-US" smtClean="0"/>
-              <a:t>8/3/2018</a:t>
+              <a:t>8/6/2018</a:t>
             </a:fld>
             <a:endParaRPr lang="en-US" dirty="0"/>
           </a:p>
@@ -14635,7 +14636,7 @@
           <a:p>
             <a:fld id="{3718D474-84CF-40A5-B032-DFFDE135438A}" type="datetime1">
               <a:rPr lang="en-US" smtClean="0"/>
-              <a:t>8/3/2018</a:t>
+              <a:t>8/6/2018</a:t>
             </a:fld>
             <a:endParaRPr lang="en-US" dirty="0"/>
           </a:p>
@@ -14857,7 +14858,7 @@
           <a:p>
             <a:fld id="{7067C6EF-6B90-465F-AC36-47BDECADBD65}" type="datetime1">
               <a:rPr lang="en-US" smtClean="0"/>
-              <a:t>8/3/2018</a:t>
+              <a:t>8/6/2018</a:t>
             </a:fld>
             <a:endParaRPr lang="en-US" dirty="0"/>
           </a:p>
@@ -15074,7 +15075,7 @@
           <a:p>
             <a:fld id="{ED1E4A86-2703-4937-ABF7-D8FBDB5C3D3E}" type="datetime1">
               <a:rPr lang="en-US" smtClean="0"/>
-              <a:t>8/3/2018</a:t>
+              <a:t>8/6/2018</a:t>
             </a:fld>
             <a:endParaRPr lang="en-US" dirty="0"/>
           </a:p>
@@ -15340,7 +15341,7 @@
           <a:p>
             <a:fld id="{12E02F23-BD92-4B7B-9DFF-42EEC8F21ED4}" type="datetime1">
               <a:rPr lang="en-US" smtClean="0"/>
-              <a:t>8/3/2018</a:t>
+              <a:t>8/6/2018</a:t>
             </a:fld>
             <a:endParaRPr lang="en-US" dirty="0"/>
           </a:p>
@@ -15642,7 +15643,7 @@
           <a:p>
             <a:fld id="{8814B7EA-8738-442B-ADC7-3A7E6F5C49CD}" type="datetime1">
               <a:rPr lang="en-US" smtClean="0"/>
-              <a:t>8/3/2018</a:t>
+              <a:t>8/6/2018</a:t>
             </a:fld>
             <a:endParaRPr lang="en-US" dirty="0"/>
           </a:p>
@@ -16092,7 +16093,7 @@
           <a:p>
             <a:fld id="{8FE5692D-78A6-499F-901A-E660774CC8EE}" type="datetime1">
               <a:rPr lang="en-US" smtClean="0"/>
-              <a:t>8/3/2018</a:t>
+              <a:t>8/6/2018</a:t>
             </a:fld>
             <a:endParaRPr lang="en-US" dirty="0"/>
           </a:p>
@@ -16225,7 +16226,7 @@
           <a:p>
             <a:fld id="{6776F355-F21B-43C0-ABBD-B5AEBBE279A6}" type="datetime1">
               <a:rPr lang="en-US" smtClean="0"/>
-              <a:t>8/3/2018</a:t>
+              <a:t>8/6/2018</a:t>
             </a:fld>
             <a:endParaRPr lang="en-US" dirty="0"/>
           </a:p>
@@ -16335,7 +16336,7 @@
           <a:p>
             <a:fld id="{C0AB95E7-F437-40FB-91EE-0B08B57CB523}" type="datetime1">
               <a:rPr lang="en-US" smtClean="0"/>
-              <a:t>8/3/2018</a:t>
+              <a:t>8/6/2018</a:t>
             </a:fld>
             <a:endParaRPr lang="en-US" dirty="0"/>
           </a:p>
@@ -16635,7 +16636,7 @@
           <a:p>
             <a:fld id="{67709EEF-87D9-4049-9A5D-A2B5E4C83A85}" type="datetime1">
               <a:rPr lang="en-US" smtClean="0"/>
-              <a:t>8/3/2018</a:t>
+              <a:t>8/6/2018</a:t>
             </a:fld>
             <a:endParaRPr lang="en-US" dirty="0"/>
           </a:p>
@@ -16924,7 +16925,7 @@
           <a:p>
             <a:fld id="{CAEBD992-82F2-4752-BCD7-4BDCCFA26099}" type="datetime1">
               <a:rPr lang="en-US" smtClean="0"/>
-              <a:t>8/3/2018</a:t>
+              <a:t>8/6/2018</a:t>
             </a:fld>
             <a:endParaRPr lang="en-US" dirty="0"/>
           </a:p>
@@ -17222,7 +17223,7 @@
             <a:fld id="{7590C4DA-EDE6-465C-B91D-0B6D7078AFBA}" type="datetime1">
               <a:rPr lang="en-US" smtClean="0"/>
               <a:pPr/>
-              <a:t>8/3/2018</a:t>
+              <a:t>8/6/2018</a:t>
             </a:fld>
             <a:endParaRPr lang="en-US" dirty="0"/>
           </a:p>
@@ -18077,6 +18078,127 @@
           <p:cNvPr id="5" name="Title 5">
             <a:extLst>
               <a:ext uri="{FF2B5EF4-FFF2-40B4-BE49-F238E27FC236}">
+                <a16:creationId xmlns:a16="http://schemas.microsoft.com/office/drawing/2014/main" id="{A8B0888D-FA90-4C7A-9775-CE567A65857A}"/>
+              </a:ext>
+            </a:extLst>
+          </p:cNvPr>
+          <p:cNvSpPr>
+            <a:spLocks noGrp="1"/>
+          </p:cNvSpPr>
+          <p:nvPr>
+            <p:ph type="title"/>
+          </p:nvPr>
+        </p:nvSpPr>
+        <p:spPr>
+          <a:xfrm>
+            <a:off x="2779127" y="163586"/>
+            <a:ext cx="6630569" cy="609600"/>
+          </a:xfrm>
+        </p:spPr>
+        <p:txBody>
+          <a:bodyPr>
+            <a:normAutofit fontScale="90000"/>
+          </a:bodyPr>
+          <a:lstStyle/>
+          <a:p>
+            <a:r>
+              <a:rPr lang="en-HK" b="1" dirty="0"/>
+              <a:t>Parabolic Stop And Reverse</a:t>
+            </a:r>
+            <a:r>
+              <a:rPr lang="zh-TW" altLang="en-US" b="1" dirty="0"/>
+              <a:t> </a:t>
+            </a:r>
+            <a:r>
+              <a:rPr lang="en-US" b="1" dirty="0"/>
+              <a:t>- PSAR</a:t>
+            </a:r>
+          </a:p>
+        </p:txBody>
+      </p:sp>
+      <p:pic>
+        <p:nvPicPr>
+          <p:cNvPr id="3" name="Picture 2">
+            <a:extLst>
+              <a:ext uri="{FF2B5EF4-FFF2-40B4-BE49-F238E27FC236}">
+                <a16:creationId xmlns:a16="http://schemas.microsoft.com/office/drawing/2014/main" id="{072558A1-D7CA-4E43-AC10-1357EA493CC1}"/>
+              </a:ext>
+            </a:extLst>
+          </p:cNvPr>
+          <p:cNvPicPr>
+            <a:picLocks noChangeAspect="1"/>
+          </p:cNvPicPr>
+          <p:nvPr/>
+        </p:nvPicPr>
+        <p:blipFill>
+          <a:blip r:embed="rId2">
+            <a:extLst>
+              <a:ext uri="{28A0092B-C50C-407E-A947-70E740481C1C}">
+                <a14:useLocalDpi xmlns:a14="http://schemas.microsoft.com/office/drawing/2010/main" val="0"/>
+              </a:ext>
+            </a:extLst>
+          </a:blip>
+          <a:stretch>
+            <a:fillRect/>
+          </a:stretch>
+        </p:blipFill>
+        <p:spPr>
+          <a:xfrm>
+            <a:off x="133710" y="844492"/>
+            <a:ext cx="11921402" cy="5879983"/>
+          </a:xfrm>
+          <a:prstGeom prst="rect">
+            <a:avLst/>
+          </a:prstGeom>
+        </p:spPr>
+      </p:pic>
+    </p:spTree>
+    <p:extLst>
+      <p:ext uri="{BB962C8B-B14F-4D97-AF65-F5344CB8AC3E}">
+        <p14:creationId xmlns:p14="http://schemas.microsoft.com/office/powerpoint/2010/main" val="3944866800"/>
+      </p:ext>
+    </p:extLst>
+  </p:cSld>
+  <p:clrMapOvr>
+    <a:masterClrMapping/>
+  </p:clrMapOvr>
+  <mc:AlternateContent xmlns:mc="http://schemas.openxmlformats.org/markup-compatibility/2006" xmlns:p14="http://schemas.microsoft.com/office/powerpoint/2010/main">
+    <mc:Choice Requires="p14">
+      <p:transition spd="med" p14:dur="700">
+        <p:fade/>
+      </p:transition>
+    </mc:Choice>
+    <mc:Fallback xmlns="">
+      <p:transition spd="med">
+        <p:fade/>
+      </p:transition>
+    </mc:Fallback>
+  </mc:AlternateContent>
+</p:sld>
+</file>
+
+<file path=ppt/slides/slide13.xml><?xml version="1.0" encoding="utf-8"?>
+<p:sld xmlns:a="http://schemas.openxmlformats.org/drawingml/2006/main" xmlns:r="http://schemas.openxmlformats.org/officeDocument/2006/relationships" xmlns:p="http://schemas.openxmlformats.org/presentationml/2006/main">
+  <p:cSld>
+    <p:spTree>
+      <p:nvGrpSpPr>
+        <p:cNvPr id="1" name=""/>
+        <p:cNvGrpSpPr/>
+        <p:nvPr/>
+      </p:nvGrpSpPr>
+      <p:grpSpPr>
+        <a:xfrm>
+          <a:off x="0" y="0"/>
+          <a:ext cx="0" cy="0"/>
+          <a:chOff x="0" y="0"/>
+          <a:chExt cx="0" cy="0"/>
+        </a:xfrm>
+      </p:grpSpPr>
+      <p:sp>
+        <p:nvSpPr>
+          <p:cNvPr id="5" name="Title 5">
+            <a:extLst>
+              <a:ext uri="{FF2B5EF4-FFF2-40B4-BE49-F238E27FC236}">
                 <a16:creationId xmlns:a16="http://schemas.microsoft.com/office/drawing/2014/main" id="{700B750C-252C-490B-8400-63790969BAC4}"/>
               </a:ext>
             </a:extLst>
@@ -18168,7 +18290,7 @@
 </p:sld>
 </file>
 
-<file path=ppt/slides/slide13.xml><?xml version="1.0" encoding="utf-8"?>
+<file path=ppt/slides/slide14.xml><?xml version="1.0" encoding="utf-8"?>
 <p:sld xmlns:a="http://schemas.openxmlformats.org/drawingml/2006/main" xmlns:r="http://schemas.openxmlformats.org/officeDocument/2006/relationships" xmlns:p="http://schemas.openxmlformats.org/presentationml/2006/main">
   <p:cSld>
     <p:spTree>
@@ -23818,7 +23940,7 @@
         </p:nvSpPr>
         <p:spPr>
           <a:xfrm>
-            <a:off x="314953" y="1676400"/>
+            <a:off x="74612" y="1600200"/>
             <a:ext cx="2194116" cy="1278329"/>
           </a:xfrm>
           <a:effectLst>
@@ -23921,8 +24043,8 @@
         </p:blipFill>
         <p:spPr>
           <a:xfrm>
-            <a:off x="2641447" y="118258"/>
-            <a:ext cx="9338747" cy="4606142"/>
+            <a:off x="2177971" y="118258"/>
+            <a:ext cx="9802223" cy="4834742"/>
           </a:xfrm>
           <a:prstGeom prst="rect">
             <a:avLst/>

</xml_diff>

<commit_message>
map news to user portfolio
</commit_message>
<xml_diff>
--- a/doc/Project Idea Introdution.pptx
+++ b/doc/Project Idea Introdution.pptx
@@ -5,10 +5,10 @@
     <p:sldMasterId id="2147483660" r:id="rId1"/>
   </p:sldMasterIdLst>
   <p:notesMasterIdLst>
-    <p:notesMasterId r:id="rId16"/>
+    <p:notesMasterId r:id="rId22"/>
   </p:notesMasterIdLst>
   <p:handoutMasterIdLst>
-    <p:handoutMasterId r:id="rId17"/>
+    <p:handoutMasterId r:id="rId23"/>
   </p:handoutMasterIdLst>
   <p:sldIdLst>
     <p:sldId id="256" r:id="rId2"/>
@@ -24,7 +24,13 @@
     <p:sldId id="270" r:id="rId12"/>
     <p:sldId id="271" r:id="rId13"/>
     <p:sldId id="265" r:id="rId14"/>
-    <p:sldId id="262" r:id="rId15"/>
+    <p:sldId id="272" r:id="rId15"/>
+    <p:sldId id="273" r:id="rId16"/>
+    <p:sldId id="274" r:id="rId17"/>
+    <p:sldId id="275" r:id="rId18"/>
+    <p:sldId id="276" r:id="rId19"/>
+    <p:sldId id="277" r:id="rId20"/>
+    <p:sldId id="262" r:id="rId21"/>
   </p:sldIdLst>
   <p:sldSz cx="12188825" cy="6858000"/>
   <p:notesSz cx="6858000" cy="9144000"/>
@@ -13499,7 +13505,7 @@
           <a:p>
             <a:fld id="{AC8CEC3D-96F7-401F-9673-3EE7F75C9C5B}" type="datetimeFigureOut">
               <a:rPr lang="en-US"/>
-              <a:t>8/6/2018</a:t>
+              <a:t>8/14/2018</a:t>
             </a:fld>
             <a:endParaRPr dirty="0"/>
           </a:p>
@@ -13664,7 +13670,7 @@
           <a:p>
             <a:fld id="{F032BCF4-D26D-4DAF-9F57-FE1E61FE7935}" type="datetimeFigureOut">
               <a:rPr lang="en-US"/>
-              <a:t>8/6/2018</a:t>
+              <a:t>8/14/2018</a:t>
             </a:fld>
             <a:endParaRPr dirty="0"/>
           </a:p>
@@ -14407,7 +14413,7 @@
           <a:p>
             <a:fld id="{DAD2365B-5397-4552-89D2-3C31D6B894C4}" type="datetime1">
               <a:rPr lang="en-US" smtClean="0"/>
-              <a:t>8/6/2018</a:t>
+              <a:t>8/14/2018</a:t>
             </a:fld>
             <a:endParaRPr lang="en-US" dirty="0"/>
           </a:p>
@@ -14636,7 +14642,7 @@
           <a:p>
             <a:fld id="{3718D474-84CF-40A5-B032-DFFDE135438A}" type="datetime1">
               <a:rPr lang="en-US" smtClean="0"/>
-              <a:t>8/6/2018</a:t>
+              <a:t>8/14/2018</a:t>
             </a:fld>
             <a:endParaRPr lang="en-US" dirty="0"/>
           </a:p>
@@ -14858,7 +14864,7 @@
           <a:p>
             <a:fld id="{7067C6EF-6B90-465F-AC36-47BDECADBD65}" type="datetime1">
               <a:rPr lang="en-US" smtClean="0"/>
-              <a:t>8/6/2018</a:t>
+              <a:t>8/14/2018</a:t>
             </a:fld>
             <a:endParaRPr lang="en-US" dirty="0"/>
           </a:p>
@@ -15075,7 +15081,7 @@
           <a:p>
             <a:fld id="{ED1E4A86-2703-4937-ABF7-D8FBDB5C3D3E}" type="datetime1">
               <a:rPr lang="en-US" smtClean="0"/>
-              <a:t>8/6/2018</a:t>
+              <a:t>8/14/2018</a:t>
             </a:fld>
             <a:endParaRPr lang="en-US" dirty="0"/>
           </a:p>
@@ -15341,7 +15347,7 @@
           <a:p>
             <a:fld id="{12E02F23-BD92-4B7B-9DFF-42EEC8F21ED4}" type="datetime1">
               <a:rPr lang="en-US" smtClean="0"/>
-              <a:t>8/6/2018</a:t>
+              <a:t>8/14/2018</a:t>
             </a:fld>
             <a:endParaRPr lang="en-US" dirty="0"/>
           </a:p>
@@ -15643,7 +15649,7 @@
           <a:p>
             <a:fld id="{8814B7EA-8738-442B-ADC7-3A7E6F5C49CD}" type="datetime1">
               <a:rPr lang="en-US" smtClean="0"/>
-              <a:t>8/6/2018</a:t>
+              <a:t>8/14/2018</a:t>
             </a:fld>
             <a:endParaRPr lang="en-US" dirty="0"/>
           </a:p>
@@ -16093,7 +16099,7 @@
           <a:p>
             <a:fld id="{8FE5692D-78A6-499F-901A-E660774CC8EE}" type="datetime1">
               <a:rPr lang="en-US" smtClean="0"/>
-              <a:t>8/6/2018</a:t>
+              <a:t>8/14/2018</a:t>
             </a:fld>
             <a:endParaRPr lang="en-US" dirty="0"/>
           </a:p>
@@ -16226,7 +16232,7 @@
           <a:p>
             <a:fld id="{6776F355-F21B-43C0-ABBD-B5AEBBE279A6}" type="datetime1">
               <a:rPr lang="en-US" smtClean="0"/>
-              <a:t>8/6/2018</a:t>
+              <a:t>8/14/2018</a:t>
             </a:fld>
             <a:endParaRPr lang="en-US" dirty="0"/>
           </a:p>
@@ -16336,7 +16342,7 @@
           <a:p>
             <a:fld id="{C0AB95E7-F437-40FB-91EE-0B08B57CB523}" type="datetime1">
               <a:rPr lang="en-US" smtClean="0"/>
-              <a:t>8/6/2018</a:t>
+              <a:t>8/14/2018</a:t>
             </a:fld>
             <a:endParaRPr lang="en-US" dirty="0"/>
           </a:p>
@@ -16636,7 +16642,7 @@
           <a:p>
             <a:fld id="{67709EEF-87D9-4049-9A5D-A2B5E4C83A85}" type="datetime1">
               <a:rPr lang="en-US" smtClean="0"/>
-              <a:t>8/6/2018</a:t>
+              <a:t>8/14/2018</a:t>
             </a:fld>
             <a:endParaRPr lang="en-US" dirty="0"/>
           </a:p>
@@ -16925,7 +16931,7 @@
           <a:p>
             <a:fld id="{CAEBD992-82F2-4752-BCD7-4BDCCFA26099}" type="datetime1">
               <a:rPr lang="en-US" smtClean="0"/>
-              <a:t>8/6/2018</a:t>
+              <a:t>8/14/2018</a:t>
             </a:fld>
             <a:endParaRPr lang="en-US" dirty="0"/>
           </a:p>
@@ -17223,7 +17229,7 @@
             <a:fld id="{7590C4DA-EDE6-465C-B91D-0B6D7078AFBA}" type="datetime1">
               <a:rPr lang="en-US" smtClean="0"/>
               <a:pPr/>
-              <a:t>8/6/2018</a:t>
+              <a:t>8/14/2018</a:t>
             </a:fld>
             <a:endParaRPr lang="en-US" dirty="0"/>
           </a:p>
@@ -17667,46 +17673,91 @@
             <p:ph type="ctrTitle"/>
           </p:nvPr>
         </p:nvSpPr>
-        <p:spPr/>
+        <p:spPr>
+          <a:xfrm>
+            <a:off x="608013" y="2819400"/>
+            <a:ext cx="3962400" cy="2514599"/>
+          </a:xfrm>
+        </p:spPr>
         <p:txBody>
           <a:bodyPr/>
           <a:lstStyle/>
           <a:p>
             <a:r>
-              <a:rPr lang="en-US" b="1" dirty="0"/>
+              <a:rPr lang="en-US" b="1" dirty="0">
+                <a:solidFill>
+                  <a:schemeClr val="tx1"/>
+                </a:solidFill>
+              </a:rPr>
               <a:t>I</a:t>
             </a:r>
             <a:r>
-              <a:rPr lang="en-US" dirty="0"/>
+              <a:rPr lang="en-US" dirty="0">
+                <a:solidFill>
+                  <a:schemeClr val="tx1"/>
+                </a:solidFill>
+              </a:rPr>
               <a:t>nvestment</a:t>
             </a:r>
             <a:br>
-              <a:rPr lang="en-US" dirty="0"/>
+              <a:rPr lang="en-US" dirty="0">
+                <a:solidFill>
+                  <a:schemeClr val="tx1"/>
+                </a:solidFill>
+              </a:rPr>
             </a:br>
             <a:r>
-              <a:rPr lang="en-US" b="1" dirty="0"/>
+              <a:rPr lang="en-US" b="1" dirty="0">
+                <a:solidFill>
+                  <a:schemeClr val="tx1"/>
+                </a:solidFill>
+              </a:rPr>
               <a:t>I</a:t>
             </a:r>
             <a:r>
-              <a:rPr lang="en-US" dirty="0"/>
+              <a:rPr lang="en-US" dirty="0">
+                <a:solidFill>
+                  <a:schemeClr val="tx1"/>
+                </a:solidFill>
+              </a:rPr>
               <a:t>nformation</a:t>
             </a:r>
             <a:br>
-              <a:rPr lang="en-US" dirty="0"/>
+              <a:rPr lang="en-US" dirty="0">
+                <a:solidFill>
+                  <a:schemeClr val="tx1"/>
+                </a:solidFill>
+              </a:rPr>
             </a:br>
             <a:r>
-              <a:rPr lang="en-US" b="1" dirty="0"/>
+              <a:rPr lang="en-US" b="1" dirty="0">
+                <a:solidFill>
+                  <a:schemeClr val="tx1"/>
+                </a:solidFill>
+              </a:rPr>
               <a:t>F</a:t>
             </a:r>
             <a:r>
-              <a:rPr lang="en-US" dirty="0"/>
+              <a:rPr lang="en-US" dirty="0">
+                <a:solidFill>
+                  <a:schemeClr val="tx1"/>
+                </a:solidFill>
+              </a:rPr>
               <a:t>eed</a:t>
             </a:r>
             <a:br>
-              <a:rPr lang="en-US" dirty="0"/>
+              <a:rPr lang="en-US" dirty="0">
+                <a:solidFill>
+                  <a:schemeClr val="tx1"/>
+                </a:solidFill>
+              </a:rPr>
             </a:br>
             <a:r>
-              <a:rPr lang="en-US" dirty="0"/>
+              <a:rPr lang="en-US" dirty="0">
+                <a:solidFill>
+                  <a:schemeClr val="tx1"/>
+                </a:solidFill>
+              </a:rPr>
               <a:t>System</a:t>
             </a:r>
           </a:p>
@@ -17809,14 +17860,26 @@
           <a:lstStyle/>
           <a:p>
             <a:r>
-              <a:rPr lang="en-US" b="1" dirty="0"/>
+              <a:rPr lang="en-US" b="1" dirty="0">
+                <a:solidFill>
+                  <a:schemeClr val="tx1"/>
+                </a:solidFill>
+              </a:rPr>
               <a:t>Moving Average Convergence/Divergence</a:t>
             </a:r>
             <a:br>
-              <a:rPr lang="en-US" b="1" dirty="0"/>
+              <a:rPr lang="en-US" b="1" dirty="0">
+                <a:solidFill>
+                  <a:schemeClr val="tx1"/>
+                </a:solidFill>
+              </a:rPr>
             </a:br>
             <a:r>
-              <a:rPr lang="en-US" b="1" dirty="0"/>
+              <a:rPr lang="en-US" b="1" dirty="0">
+                <a:solidFill>
+                  <a:schemeClr val="tx1"/>
+                </a:solidFill>
+              </a:rPr>
               <a:t>MACD</a:t>
             </a:r>
           </a:p>
@@ -17965,31 +18028,59 @@
           <a:lstStyle/>
           <a:p>
             <a:r>
-              <a:rPr lang="en-US" b="1" dirty="0"/>
+              <a:rPr lang="en-US" b="1" dirty="0">
+                <a:solidFill>
+                  <a:schemeClr val="tx1"/>
+                </a:solidFill>
+              </a:rPr>
               <a:t>On </a:t>
             </a:r>
             <a:r>
-              <a:rPr lang="en-US" altLang="zh-TW" b="1" dirty="0"/>
+              <a:rPr lang="en-US" altLang="zh-TW" b="1" dirty="0">
+                <a:solidFill>
+                  <a:schemeClr val="tx1"/>
+                </a:solidFill>
+              </a:rPr>
               <a:t>B</a:t>
             </a:r>
             <a:r>
-              <a:rPr lang="en-HK" altLang="zh-TW" b="1" dirty="0" err="1"/>
+              <a:rPr lang="en-HK" altLang="zh-TW" b="1" dirty="0" err="1">
+                <a:solidFill>
+                  <a:schemeClr val="tx1"/>
+                </a:solidFill>
+              </a:rPr>
               <a:t>alance</a:t>
             </a:r>
             <a:r>
-              <a:rPr lang="zh-TW" altLang="en-US" b="1" dirty="0"/>
+              <a:rPr lang="zh-TW" altLang="en-US" b="1" dirty="0">
+                <a:solidFill>
+                  <a:schemeClr val="tx1"/>
+                </a:solidFill>
+              </a:rPr>
               <a:t> </a:t>
             </a:r>
             <a:r>
-              <a:rPr lang="en-HK" altLang="zh-TW" b="1" dirty="0"/>
+              <a:rPr lang="en-HK" altLang="zh-TW" b="1" dirty="0">
+                <a:solidFill>
+                  <a:schemeClr val="tx1"/>
+                </a:solidFill>
+              </a:rPr>
               <a:t>Volume</a:t>
             </a:r>
             <a:r>
-              <a:rPr lang="zh-TW" altLang="en-US" b="1" dirty="0"/>
+              <a:rPr lang="zh-TW" altLang="en-US" b="1" dirty="0">
+                <a:solidFill>
+                  <a:schemeClr val="tx1"/>
+                </a:solidFill>
+              </a:rPr>
               <a:t> </a:t>
             </a:r>
             <a:r>
-              <a:rPr lang="en-US" b="1" dirty="0"/>
+              <a:rPr lang="en-US" b="1" dirty="0">
+                <a:solidFill>
+                  <a:schemeClr val="tx1"/>
+                </a:solidFill>
+              </a:rPr>
               <a:t>- OBV</a:t>
             </a:r>
           </a:p>
@@ -18102,15 +18193,27 @@
           <a:lstStyle/>
           <a:p>
             <a:r>
-              <a:rPr lang="en-HK" b="1" dirty="0"/>
+              <a:rPr lang="en-HK" b="1" dirty="0">
+                <a:solidFill>
+                  <a:schemeClr val="tx1"/>
+                </a:solidFill>
+              </a:rPr>
               <a:t>Parabolic Stop And Reverse</a:t>
             </a:r>
             <a:r>
-              <a:rPr lang="zh-TW" altLang="en-US" b="1" dirty="0"/>
+              <a:rPr lang="zh-TW" altLang="en-US" b="1" dirty="0">
+                <a:solidFill>
+                  <a:schemeClr val="tx1"/>
+                </a:solidFill>
+              </a:rPr>
               <a:t> </a:t>
             </a:r>
             <a:r>
-              <a:rPr lang="en-US" b="1" dirty="0"/>
+              <a:rPr lang="en-US" b="1" dirty="0">
+                <a:solidFill>
+                  <a:schemeClr val="tx1"/>
+                </a:solidFill>
+              </a:rPr>
               <a:t>- PSAR</a:t>
             </a:r>
           </a:p>
@@ -18212,7 +18315,7 @@
         </p:nvSpPr>
         <p:spPr>
           <a:xfrm>
-            <a:off x="3256318" y="152400"/>
+            <a:off x="3256318" y="76200"/>
             <a:ext cx="5676186" cy="609600"/>
           </a:xfrm>
         </p:spPr>
@@ -18223,7 +18326,11 @@
           <a:lstStyle/>
           <a:p>
             <a:r>
-              <a:rPr lang="en-US" b="1" dirty="0"/>
+              <a:rPr lang="en-US" b="1" dirty="0">
+                <a:solidFill>
+                  <a:schemeClr val="tx1"/>
+                </a:solidFill>
+              </a:rPr>
               <a:t>Relative Strength Index - RSI</a:t>
             </a:r>
           </a:p>
@@ -18231,10 +18338,10 @@
       </p:sp>
       <p:pic>
         <p:nvPicPr>
-          <p:cNvPr id="7" name="Picture 6">
+          <p:cNvPr id="3" name="Picture 2">
             <a:extLst>
               <a:ext uri="{FF2B5EF4-FFF2-40B4-BE49-F238E27FC236}">
-                <a16:creationId xmlns:a16="http://schemas.microsoft.com/office/drawing/2014/main" id="{00E334E2-0A43-4543-99DA-2A51BB4999A2}"/>
+                <a16:creationId xmlns:a16="http://schemas.microsoft.com/office/drawing/2014/main" id="{BB513024-42AF-479E-871A-14262D9D41D2}"/>
               </a:ext>
             </a:extLst>
           </p:cNvPr>
@@ -18257,8 +18364,8 @@
         </p:blipFill>
         <p:spPr>
           <a:xfrm>
-            <a:off x="308754" y="922090"/>
-            <a:ext cx="11571315" cy="5707310"/>
+            <a:off x="303212" y="762000"/>
+            <a:ext cx="11586906" cy="5943600"/>
           </a:xfrm>
           <a:prstGeom prst="rect">
             <a:avLst/>
@@ -18291,6 +18398,2469 @@
 </file>
 
 <file path=ppt/slides/slide14.xml><?xml version="1.0" encoding="utf-8"?>
+<p:sld xmlns:a="http://schemas.openxmlformats.org/drawingml/2006/main" xmlns:r="http://schemas.openxmlformats.org/officeDocument/2006/relationships" xmlns:p="http://schemas.openxmlformats.org/presentationml/2006/main">
+  <p:cSld>
+    <p:spTree>
+      <p:nvGrpSpPr>
+        <p:cNvPr id="1" name=""/>
+        <p:cNvGrpSpPr/>
+        <p:nvPr/>
+      </p:nvGrpSpPr>
+      <p:grpSpPr>
+        <a:xfrm>
+          <a:off x="0" y="0"/>
+          <a:ext cx="0" cy="0"/>
+          <a:chOff x="0" y="0"/>
+          <a:chExt cx="0" cy="0"/>
+        </a:xfrm>
+      </p:grpSpPr>
+      <p:sp>
+        <p:nvSpPr>
+          <p:cNvPr id="3" name="Content Placeholder 2">
+            <a:extLst>
+              <a:ext uri="{FF2B5EF4-FFF2-40B4-BE49-F238E27FC236}">
+                <a16:creationId xmlns:a16="http://schemas.microsoft.com/office/drawing/2014/main" id="{352C789D-F317-4F63-B13E-2AA7418EA9C4}"/>
+              </a:ext>
+            </a:extLst>
+          </p:cNvPr>
+          <p:cNvSpPr>
+            <a:spLocks noGrp="1"/>
+          </p:cNvSpPr>
+          <p:nvPr>
+            <p:ph sz="half" idx="1"/>
+          </p:nvPr>
+        </p:nvSpPr>
+        <p:spPr>
+          <a:xfrm>
+            <a:off x="303212" y="990600"/>
+            <a:ext cx="4038600" cy="457200"/>
+          </a:xfrm>
+        </p:spPr>
+        <p:txBody>
+          <a:bodyPr>
+            <a:normAutofit fontScale="92500" lnSpcReduction="20000"/>
+          </a:bodyPr>
+          <a:lstStyle/>
+          <a:p>
+            <a:pPr marL="0" indent="0">
+              <a:lnSpc>
+                <a:spcPct val="110000"/>
+              </a:lnSpc>
+              <a:buNone/>
+            </a:pPr>
+            <a:r>
+              <a:rPr lang="en-US" dirty="0"/>
+              <a:t>customer_trade_book.csv</a:t>
+            </a:r>
+            <a:endParaRPr lang="en-HK" dirty="0"/>
+          </a:p>
+        </p:txBody>
+      </p:sp>
+      <p:sp>
+        <p:nvSpPr>
+          <p:cNvPr id="5" name="Title 5">
+            <a:extLst>
+              <a:ext uri="{FF2B5EF4-FFF2-40B4-BE49-F238E27FC236}">
+                <a16:creationId xmlns:a16="http://schemas.microsoft.com/office/drawing/2014/main" id="{A97B2706-9220-4DB4-9796-8432F15EA374}"/>
+              </a:ext>
+            </a:extLst>
+          </p:cNvPr>
+          <p:cNvSpPr txBox="1">
+            <a:spLocks/>
+          </p:cNvSpPr>
+          <p:nvPr/>
+        </p:nvSpPr>
+        <p:spPr>
+          <a:xfrm>
+            <a:off x="3732212" y="152400"/>
+            <a:ext cx="4285894" cy="609600"/>
+          </a:xfrm>
+          <a:prstGeom prst="rect">
+            <a:avLst/>
+          </a:prstGeom>
+        </p:spPr>
+        <p:txBody>
+          <a:bodyPr vert="horz" lIns="91440" tIns="45720" rIns="91440" bIns="45720" rtlCol="0" anchor="b">
+            <a:normAutofit fontScale="97500"/>
+          </a:bodyPr>
+          <a:lstStyle>
+            <a:lvl1pPr algn="l" defTabSz="914400" rtl="0" eaLnBrk="1" latinLnBrk="0" hangingPunct="1">
+              <a:lnSpc>
+                <a:spcPct val="80000"/>
+              </a:lnSpc>
+              <a:spcBef>
+                <a:spcPct val="0"/>
+              </a:spcBef>
+              <a:buNone/>
+              <a:defRPr sz="3600" kern="1200">
+                <a:solidFill>
+                  <a:schemeClr val="tx2"/>
+                </a:solidFill>
+                <a:latin typeface="+mj-lt"/>
+                <a:ea typeface="+mj-ea"/>
+                <a:cs typeface="+mj-cs"/>
+              </a:defRPr>
+            </a:lvl1pPr>
+          </a:lstStyle>
+          <a:p>
+            <a:r>
+              <a:rPr lang="en-US" b="1" dirty="0">
+                <a:solidFill>
+                  <a:schemeClr val="tx1"/>
+                </a:solidFill>
+              </a:rPr>
+              <a:t>TA on User portfolio</a:t>
+            </a:r>
+          </a:p>
+        </p:txBody>
+      </p:sp>
+      <p:graphicFrame>
+        <p:nvGraphicFramePr>
+          <p:cNvPr id="6" name="Object 5">
+            <a:extLst>
+              <a:ext uri="{FF2B5EF4-FFF2-40B4-BE49-F238E27FC236}">
+                <a16:creationId xmlns:a16="http://schemas.microsoft.com/office/drawing/2014/main" id="{2872E699-1C97-40F4-8E9C-4501124142B3}"/>
+              </a:ext>
+            </a:extLst>
+          </p:cNvPr>
+          <p:cNvGraphicFramePr>
+            <a:graphicFrameLocks noChangeAspect="1"/>
+          </p:cNvGraphicFramePr>
+          <p:nvPr>
+            <p:extLst>
+              <p:ext uri="{D42A27DB-BD31-4B8C-83A1-F6EECF244321}">
+                <p14:modId xmlns:p14="http://schemas.microsoft.com/office/powerpoint/2010/main" val="4125038295"/>
+              </p:ext>
+            </p:extLst>
+          </p:nvPr>
+        </p:nvGraphicFramePr>
+        <p:xfrm>
+          <a:off x="5480050" y="3233738"/>
+          <a:ext cx="1228725" cy="390525"/>
+        </p:xfrm>
+        <a:graphic>
+          <a:graphicData uri="http://schemas.openxmlformats.org/presentationml/2006/ole">
+            <mc:AlternateContent xmlns:mc="http://schemas.openxmlformats.org/markup-compatibility/2006">
+              <mc:Choice xmlns:v="urn:schemas-microsoft-com:vml" Requires="v">
+                <p:oleObj spid="_x0000_s1042" name="Worksheet" r:id="rId3" imgW="1228781" imgH="390618" progId="Excel.Sheet.12">
+                  <p:embed/>
+                </p:oleObj>
+              </mc:Choice>
+              <mc:Fallback>
+                <p:oleObj name="Worksheet" r:id="rId3" imgW="1228781" imgH="390618" progId="Excel.Sheet.12">
+                  <p:embed/>
+                  <p:pic>
+                    <p:nvPicPr>
+                      <p:cNvPr id="0" name=""/>
+                      <p:cNvPicPr/>
+                      <p:nvPr/>
+                    </p:nvPicPr>
+                    <p:blipFill>
+                      <a:blip r:embed="rId4"/>
+                      <a:stretch>
+                        <a:fillRect/>
+                      </a:stretch>
+                    </p:blipFill>
+                    <p:spPr>
+                      <a:xfrm>
+                        <a:off x="5480050" y="3233738"/>
+                        <a:ext cx="1228725" cy="390525"/>
+                      </a:xfrm>
+                      <a:prstGeom prst="rect">
+                        <a:avLst/>
+                      </a:prstGeom>
+                    </p:spPr>
+                  </p:pic>
+                </p:oleObj>
+              </mc:Fallback>
+            </mc:AlternateContent>
+          </a:graphicData>
+        </a:graphic>
+      </p:graphicFrame>
+      <p:graphicFrame>
+        <p:nvGraphicFramePr>
+          <p:cNvPr id="9" name="Object 8">
+            <a:extLst>
+              <a:ext uri="{FF2B5EF4-FFF2-40B4-BE49-F238E27FC236}">
+                <a16:creationId xmlns:a16="http://schemas.microsoft.com/office/drawing/2014/main" id="{A72E3489-13FF-43DB-BA18-BB6F8F99B069}"/>
+              </a:ext>
+            </a:extLst>
+          </p:cNvPr>
+          <p:cNvGraphicFramePr>
+            <a:graphicFrameLocks noChangeAspect="1"/>
+          </p:cNvGraphicFramePr>
+          <p:nvPr>
+            <p:extLst>
+              <p:ext uri="{D42A27DB-BD31-4B8C-83A1-F6EECF244321}">
+                <p14:modId xmlns:p14="http://schemas.microsoft.com/office/powerpoint/2010/main" val="3046700019"/>
+              </p:ext>
+            </p:extLst>
+          </p:nvPr>
+        </p:nvGraphicFramePr>
+        <p:xfrm>
+          <a:off x="231685" y="1552575"/>
+          <a:ext cx="11725453" cy="5153025"/>
+        </p:xfrm>
+        <a:graphic>
+          <a:graphicData uri="http://schemas.openxmlformats.org/presentationml/2006/ole">
+            <mc:AlternateContent xmlns:mc="http://schemas.openxmlformats.org/markup-compatibility/2006">
+              <mc:Choice xmlns:v="urn:schemas-microsoft-com:vml" Requires="v">
+                <p:oleObj spid="_x0000_s1043" name="Worksheet" r:id="rId5" imgW="11277480" imgH="5152852" progId="Excel.Sheet.12">
+                  <p:embed/>
+                </p:oleObj>
+              </mc:Choice>
+              <mc:Fallback>
+                <p:oleObj name="Worksheet" r:id="rId5" imgW="11277480" imgH="5152852" progId="Excel.Sheet.12">
+                  <p:embed/>
+                  <p:pic>
+                    <p:nvPicPr>
+                      <p:cNvPr id="0" name=""/>
+                      <p:cNvPicPr/>
+                      <p:nvPr/>
+                    </p:nvPicPr>
+                    <p:blipFill>
+                      <a:blip r:embed="rId6"/>
+                      <a:stretch>
+                        <a:fillRect/>
+                      </a:stretch>
+                    </p:blipFill>
+                    <p:spPr>
+                      <a:xfrm>
+                        <a:off x="231685" y="1552575"/>
+                        <a:ext cx="11725453" cy="5153025"/>
+                      </a:xfrm>
+                      <a:prstGeom prst="rect">
+                        <a:avLst/>
+                      </a:prstGeom>
+                      <a:solidFill>
+                        <a:schemeClr val="bg1"/>
+                      </a:solidFill>
+                    </p:spPr>
+                  </p:pic>
+                </p:oleObj>
+              </mc:Fallback>
+            </mc:AlternateContent>
+          </a:graphicData>
+        </a:graphic>
+      </p:graphicFrame>
+      <p:sp>
+        <p:nvSpPr>
+          <p:cNvPr id="10" name="Rectangle 9">
+            <a:extLst>
+              <a:ext uri="{FF2B5EF4-FFF2-40B4-BE49-F238E27FC236}">
+                <a16:creationId xmlns:a16="http://schemas.microsoft.com/office/drawing/2014/main" id="{E51EB2DB-FD89-4306-AB39-8F9831B42A05}"/>
+              </a:ext>
+            </a:extLst>
+          </p:cNvPr>
+          <p:cNvSpPr/>
+          <p:nvPr/>
+        </p:nvSpPr>
+        <p:spPr>
+          <a:xfrm>
+            <a:off x="2170068" y="1500187"/>
+            <a:ext cx="876344" cy="5257800"/>
+          </a:xfrm>
+          <a:prstGeom prst="rect">
+            <a:avLst/>
+          </a:prstGeom>
+          <a:noFill/>
+          <a:ln w="28575">
+            <a:solidFill>
+              <a:srgbClr val="FF0000"/>
+            </a:solidFill>
+          </a:ln>
+        </p:spPr>
+        <p:style>
+          <a:lnRef idx="3">
+            <a:schemeClr val="lt1"/>
+          </a:lnRef>
+          <a:fillRef idx="1">
+            <a:schemeClr val="accent2"/>
+          </a:fillRef>
+          <a:effectRef idx="1">
+            <a:schemeClr val="accent2"/>
+          </a:effectRef>
+          <a:fontRef idx="minor">
+            <a:schemeClr val="lt1"/>
+          </a:fontRef>
+        </p:style>
+        <p:txBody>
+          <a:bodyPr rtlCol="0" anchor="ctr"/>
+          <a:lstStyle/>
+          <a:p>
+            <a:pPr algn="ctr"/>
+            <a:endParaRPr lang="en-HK" dirty="0"/>
+          </a:p>
+        </p:txBody>
+      </p:sp>
+    </p:spTree>
+    <p:extLst>
+      <p:ext uri="{BB962C8B-B14F-4D97-AF65-F5344CB8AC3E}">
+        <p14:creationId xmlns:p14="http://schemas.microsoft.com/office/powerpoint/2010/main" val="224018975"/>
+      </p:ext>
+    </p:extLst>
+  </p:cSld>
+  <p:clrMapOvr>
+    <a:masterClrMapping/>
+  </p:clrMapOvr>
+  <mc:AlternateContent xmlns:mc="http://schemas.openxmlformats.org/markup-compatibility/2006" xmlns:p14="http://schemas.microsoft.com/office/powerpoint/2010/main">
+    <mc:Choice Requires="p14">
+      <p:transition spd="med" p14:dur="700">
+        <p:fade/>
+      </p:transition>
+    </mc:Choice>
+    <mc:Fallback xmlns="">
+      <p:transition spd="med">
+        <p:fade/>
+      </p:transition>
+    </mc:Fallback>
+  </mc:AlternateContent>
+</p:sld>
+</file>
+
+<file path=ppt/slides/slide15.xml><?xml version="1.0" encoding="utf-8"?>
+<p:sld xmlns:a="http://schemas.openxmlformats.org/drawingml/2006/main" xmlns:r="http://schemas.openxmlformats.org/officeDocument/2006/relationships" xmlns:p="http://schemas.openxmlformats.org/presentationml/2006/main">
+  <p:cSld>
+    <p:spTree>
+      <p:nvGrpSpPr>
+        <p:cNvPr id="1" name=""/>
+        <p:cNvGrpSpPr/>
+        <p:nvPr/>
+      </p:nvGrpSpPr>
+      <p:grpSpPr>
+        <a:xfrm>
+          <a:off x="0" y="0"/>
+          <a:ext cx="0" cy="0"/>
+          <a:chOff x="0" y="0"/>
+          <a:chExt cx="0" cy="0"/>
+        </a:xfrm>
+      </p:grpSpPr>
+      <p:pic>
+        <p:nvPicPr>
+          <p:cNvPr id="6" name="Picture 5">
+            <a:extLst>
+              <a:ext uri="{FF2B5EF4-FFF2-40B4-BE49-F238E27FC236}">
+                <a16:creationId xmlns:a16="http://schemas.microsoft.com/office/drawing/2014/main" id="{26A75DCF-9485-4B26-A7E7-8194F6D09DD4}"/>
+              </a:ext>
+            </a:extLst>
+          </p:cNvPr>
+          <p:cNvPicPr>
+            <a:picLocks noChangeAspect="1"/>
+          </p:cNvPicPr>
+          <p:nvPr/>
+        </p:nvPicPr>
+        <p:blipFill>
+          <a:blip r:embed="rId2">
+            <a:extLst>
+              <a:ext uri="{28A0092B-C50C-407E-A947-70E740481C1C}">
+                <a14:useLocalDpi xmlns:a14="http://schemas.microsoft.com/office/drawing/2010/main" val="0"/>
+              </a:ext>
+            </a:extLst>
+          </a:blip>
+          <a:stretch>
+            <a:fillRect/>
+          </a:stretch>
+        </p:blipFill>
+        <p:spPr>
+          <a:xfrm>
+            <a:off x="2329791" y="381000"/>
+            <a:ext cx="7529241" cy="2286000"/>
+          </a:xfrm>
+          <a:prstGeom prst="rect">
+            <a:avLst/>
+          </a:prstGeom>
+        </p:spPr>
+      </p:pic>
+      <p:sp>
+        <p:nvSpPr>
+          <p:cNvPr id="7" name="Arrow: Down 6">
+            <a:extLst>
+              <a:ext uri="{FF2B5EF4-FFF2-40B4-BE49-F238E27FC236}">
+                <a16:creationId xmlns:a16="http://schemas.microsoft.com/office/drawing/2014/main" id="{519E5DDE-2C6B-4266-9179-68AB27DD9915}"/>
+              </a:ext>
+            </a:extLst>
+          </p:cNvPr>
+          <p:cNvSpPr/>
+          <p:nvPr/>
+        </p:nvSpPr>
+        <p:spPr>
+          <a:xfrm>
+            <a:off x="5751511" y="2863487"/>
+            <a:ext cx="685800" cy="838200"/>
+          </a:xfrm>
+          <a:prstGeom prst="downArrow">
+            <a:avLst/>
+          </a:prstGeom>
+          <a:ln>
+            <a:noFill/>
+          </a:ln>
+        </p:spPr>
+        <p:style>
+          <a:lnRef idx="3">
+            <a:schemeClr val="lt1"/>
+          </a:lnRef>
+          <a:fillRef idx="1">
+            <a:schemeClr val="accent2"/>
+          </a:fillRef>
+          <a:effectRef idx="1">
+            <a:schemeClr val="accent2"/>
+          </a:effectRef>
+          <a:fontRef idx="minor">
+            <a:schemeClr val="lt1"/>
+          </a:fontRef>
+        </p:style>
+        <p:txBody>
+          <a:bodyPr rtlCol="0" anchor="ctr"/>
+          <a:lstStyle/>
+          <a:p>
+            <a:pPr algn="ctr"/>
+            <a:endParaRPr lang="en-HK" dirty="0"/>
+          </a:p>
+        </p:txBody>
+      </p:sp>
+      <p:pic>
+        <p:nvPicPr>
+          <p:cNvPr id="9" name="Picture 8">
+            <a:extLst>
+              <a:ext uri="{FF2B5EF4-FFF2-40B4-BE49-F238E27FC236}">
+                <a16:creationId xmlns:a16="http://schemas.microsoft.com/office/drawing/2014/main" id="{5FDEBA44-23B6-4780-A4C6-03A81A6C7608}"/>
+              </a:ext>
+            </a:extLst>
+          </p:cNvPr>
+          <p:cNvPicPr>
+            <a:picLocks noChangeAspect="1"/>
+          </p:cNvPicPr>
+          <p:nvPr/>
+        </p:nvPicPr>
+        <p:blipFill>
+          <a:blip r:embed="rId3">
+            <a:extLst>
+              <a:ext uri="{28A0092B-C50C-407E-A947-70E740481C1C}">
+                <a14:useLocalDpi xmlns:a14="http://schemas.microsoft.com/office/drawing/2010/main" val="0"/>
+              </a:ext>
+            </a:extLst>
+          </a:blip>
+          <a:stretch>
+            <a:fillRect/>
+          </a:stretch>
+        </p:blipFill>
+        <p:spPr>
+          <a:xfrm>
+            <a:off x="2994595" y="3898174"/>
+            <a:ext cx="6199632" cy="2743200"/>
+          </a:xfrm>
+          <a:prstGeom prst="rect">
+            <a:avLst/>
+          </a:prstGeom>
+        </p:spPr>
+      </p:pic>
+      <p:sp>
+        <p:nvSpPr>
+          <p:cNvPr id="10" name="Rectangle 9">
+            <a:extLst>
+              <a:ext uri="{FF2B5EF4-FFF2-40B4-BE49-F238E27FC236}">
+                <a16:creationId xmlns:a16="http://schemas.microsoft.com/office/drawing/2014/main" id="{0E4A1907-FC5B-4577-B34D-FC90BC6A9BDE}"/>
+              </a:ext>
+            </a:extLst>
+          </p:cNvPr>
+          <p:cNvSpPr/>
+          <p:nvPr/>
+        </p:nvSpPr>
+        <p:spPr>
+          <a:xfrm rot="5400000">
+            <a:off x="3770312" y="-342899"/>
+            <a:ext cx="838201" cy="3962401"/>
+          </a:xfrm>
+          <a:prstGeom prst="rect">
+            <a:avLst/>
+          </a:prstGeom>
+          <a:noFill/>
+          <a:ln w="28575">
+            <a:solidFill>
+              <a:srgbClr val="FF0000"/>
+            </a:solidFill>
+          </a:ln>
+        </p:spPr>
+        <p:style>
+          <a:lnRef idx="3">
+            <a:schemeClr val="lt1"/>
+          </a:lnRef>
+          <a:fillRef idx="1">
+            <a:schemeClr val="accent2"/>
+          </a:fillRef>
+          <a:effectRef idx="1">
+            <a:schemeClr val="accent2"/>
+          </a:effectRef>
+          <a:fontRef idx="minor">
+            <a:schemeClr val="lt1"/>
+          </a:fontRef>
+        </p:style>
+        <p:txBody>
+          <a:bodyPr rtlCol="0" anchor="ctr"/>
+          <a:lstStyle/>
+          <a:p>
+            <a:pPr algn="ctr"/>
+            <a:endParaRPr lang="en-HK" dirty="0"/>
+          </a:p>
+        </p:txBody>
+      </p:sp>
+      <p:sp>
+        <p:nvSpPr>
+          <p:cNvPr id="11" name="Rectangle 10">
+            <a:extLst>
+              <a:ext uri="{FF2B5EF4-FFF2-40B4-BE49-F238E27FC236}">
+                <a16:creationId xmlns:a16="http://schemas.microsoft.com/office/drawing/2014/main" id="{22307FCF-E33D-4D9C-8503-FBDF2F5CE442}"/>
+              </a:ext>
+            </a:extLst>
+          </p:cNvPr>
+          <p:cNvSpPr/>
+          <p:nvPr/>
+        </p:nvSpPr>
+        <p:spPr>
+          <a:xfrm rot="5400000">
+            <a:off x="3015433" y="4805409"/>
+            <a:ext cx="266744" cy="661987"/>
+          </a:xfrm>
+          <a:prstGeom prst="rect">
+            <a:avLst/>
+          </a:prstGeom>
+          <a:noFill/>
+          <a:ln w="28575">
+            <a:solidFill>
+              <a:srgbClr val="FF0000"/>
+            </a:solidFill>
+          </a:ln>
+        </p:spPr>
+        <p:style>
+          <a:lnRef idx="3">
+            <a:schemeClr val="lt1"/>
+          </a:lnRef>
+          <a:fillRef idx="1">
+            <a:schemeClr val="accent2"/>
+          </a:fillRef>
+          <a:effectRef idx="1">
+            <a:schemeClr val="accent2"/>
+          </a:effectRef>
+          <a:fontRef idx="minor">
+            <a:schemeClr val="lt1"/>
+          </a:fontRef>
+        </p:style>
+        <p:txBody>
+          <a:bodyPr rtlCol="0" anchor="ctr"/>
+          <a:lstStyle/>
+          <a:p>
+            <a:pPr algn="ctr"/>
+            <a:endParaRPr lang="en-HK" dirty="0"/>
+          </a:p>
+        </p:txBody>
+      </p:sp>
+    </p:spTree>
+    <p:extLst>
+      <p:ext uri="{BB962C8B-B14F-4D97-AF65-F5344CB8AC3E}">
+        <p14:creationId xmlns:p14="http://schemas.microsoft.com/office/powerpoint/2010/main" val="1970800816"/>
+      </p:ext>
+    </p:extLst>
+  </p:cSld>
+  <p:clrMapOvr>
+    <a:masterClrMapping/>
+  </p:clrMapOvr>
+  <mc:AlternateContent xmlns:mc="http://schemas.openxmlformats.org/markup-compatibility/2006" xmlns:p14="http://schemas.microsoft.com/office/powerpoint/2010/main">
+    <mc:Choice Requires="p14">
+      <p:transition spd="med" p14:dur="700">
+        <p:fade/>
+      </p:transition>
+    </mc:Choice>
+    <mc:Fallback xmlns="">
+      <p:transition spd="med">
+        <p:fade/>
+      </p:transition>
+    </mc:Fallback>
+  </mc:AlternateContent>
+</p:sld>
+</file>
+
+<file path=ppt/slides/slide16.xml><?xml version="1.0" encoding="utf-8"?>
+<p:sld xmlns:a="http://schemas.openxmlformats.org/drawingml/2006/main" xmlns:r="http://schemas.openxmlformats.org/officeDocument/2006/relationships" xmlns:p="http://schemas.openxmlformats.org/presentationml/2006/main">
+  <p:cSld>
+    <p:spTree>
+      <p:nvGrpSpPr>
+        <p:cNvPr id="1" name=""/>
+        <p:cNvGrpSpPr/>
+        <p:nvPr/>
+      </p:nvGrpSpPr>
+      <p:grpSpPr>
+        <a:xfrm>
+          <a:off x="0" y="0"/>
+          <a:ext cx="0" cy="0"/>
+          <a:chOff x="0" y="0"/>
+          <a:chExt cx="0" cy="0"/>
+        </a:xfrm>
+      </p:grpSpPr>
+      <p:pic>
+        <p:nvPicPr>
+          <p:cNvPr id="6" name="Picture 5">
+            <a:extLst>
+              <a:ext uri="{FF2B5EF4-FFF2-40B4-BE49-F238E27FC236}">
+                <a16:creationId xmlns:a16="http://schemas.microsoft.com/office/drawing/2014/main" id="{7E6BD167-35B4-4ED2-922F-5B94660E5123}"/>
+              </a:ext>
+            </a:extLst>
+          </p:cNvPr>
+          <p:cNvPicPr>
+            <a:picLocks noChangeAspect="1"/>
+          </p:cNvPicPr>
+          <p:nvPr/>
+        </p:nvPicPr>
+        <p:blipFill>
+          <a:blip r:embed="rId2" cstate="print">
+            <a:extLst>
+              <a:ext uri="{28A0092B-C50C-407E-A947-70E740481C1C}">
+                <a14:useLocalDpi xmlns:a14="http://schemas.microsoft.com/office/drawing/2010/main" val="0"/>
+              </a:ext>
+            </a:extLst>
+          </a:blip>
+          <a:stretch>
+            <a:fillRect/>
+          </a:stretch>
+        </p:blipFill>
+        <p:spPr>
+          <a:xfrm>
+            <a:off x="303212" y="228600"/>
+            <a:ext cx="6180812" cy="4083456"/>
+          </a:xfrm>
+          <a:prstGeom prst="rect">
+            <a:avLst/>
+          </a:prstGeom>
+        </p:spPr>
+      </p:pic>
+      <p:pic>
+        <p:nvPicPr>
+          <p:cNvPr id="8" name="Picture 7">
+            <a:extLst>
+              <a:ext uri="{FF2B5EF4-FFF2-40B4-BE49-F238E27FC236}">
+                <a16:creationId xmlns:a16="http://schemas.microsoft.com/office/drawing/2014/main" id="{12D55AAF-9071-4C9C-A5EC-6EF4602FD3EE}"/>
+              </a:ext>
+            </a:extLst>
+          </p:cNvPr>
+          <p:cNvPicPr>
+            <a:picLocks noChangeAspect="1"/>
+          </p:cNvPicPr>
+          <p:nvPr/>
+        </p:nvPicPr>
+        <p:blipFill>
+          <a:blip r:embed="rId3" cstate="print">
+            <a:extLst>
+              <a:ext uri="{28A0092B-C50C-407E-A947-70E740481C1C}">
+                <a14:useLocalDpi xmlns:a14="http://schemas.microsoft.com/office/drawing/2010/main" val="0"/>
+              </a:ext>
+            </a:extLst>
+          </a:blip>
+          <a:stretch>
+            <a:fillRect/>
+          </a:stretch>
+        </p:blipFill>
+        <p:spPr>
+          <a:xfrm>
+            <a:off x="5865812" y="2667000"/>
+            <a:ext cx="6180811" cy="4083456"/>
+          </a:xfrm>
+          <a:prstGeom prst="rect">
+            <a:avLst/>
+          </a:prstGeom>
+          <a:blipFill dpi="0" rotWithShape="1">
+            <a:blip r:embed="rId3">
+              <a:alphaModFix amt="61000"/>
+            </a:blip>
+            <a:srcRect/>
+            <a:stretch>
+              <a:fillRect/>
+            </a:stretch>
+          </a:blipFill>
+        </p:spPr>
+      </p:pic>
+    </p:spTree>
+    <p:extLst>
+      <p:ext uri="{BB962C8B-B14F-4D97-AF65-F5344CB8AC3E}">
+        <p14:creationId xmlns:p14="http://schemas.microsoft.com/office/powerpoint/2010/main" val="2014378153"/>
+      </p:ext>
+    </p:extLst>
+  </p:cSld>
+  <p:clrMapOvr>
+    <a:masterClrMapping/>
+  </p:clrMapOvr>
+  <mc:AlternateContent xmlns:mc="http://schemas.openxmlformats.org/markup-compatibility/2006" xmlns:p14="http://schemas.microsoft.com/office/powerpoint/2010/main">
+    <mc:Choice Requires="p14">
+      <p:transition spd="med" p14:dur="700">
+        <p:fade/>
+      </p:transition>
+    </mc:Choice>
+    <mc:Fallback xmlns="">
+      <p:transition spd="med">
+        <p:fade/>
+      </p:transition>
+    </mc:Fallback>
+  </mc:AlternateContent>
+</p:sld>
+</file>
+
+<file path=ppt/slides/slide17.xml><?xml version="1.0" encoding="utf-8"?>
+<p:sld xmlns:a="http://schemas.openxmlformats.org/drawingml/2006/main" xmlns:r="http://schemas.openxmlformats.org/officeDocument/2006/relationships" xmlns:p="http://schemas.openxmlformats.org/presentationml/2006/main" showMasterSp="0">
+  <p:cSld>
+    <p:bg>
+      <p:bgPr>
+        <a:blipFill dpi="0" rotWithShape="1">
+          <a:blip r:embed="rId2">
+            <a:alphaModFix amt="20000"/>
+            <a:lum/>
+          </a:blip>
+          <a:srcRect/>
+          <a:stretch>
+            <a:fillRect l="-3000" r="-3000"/>
+          </a:stretch>
+        </a:blipFill>
+        <a:effectLst/>
+      </p:bgPr>
+    </p:bg>
+    <p:spTree>
+      <p:nvGrpSpPr>
+        <p:cNvPr id="1" name=""/>
+        <p:cNvGrpSpPr/>
+        <p:nvPr/>
+      </p:nvGrpSpPr>
+      <p:grpSpPr>
+        <a:xfrm>
+          <a:off x="0" y="0"/>
+          <a:ext cx="0" cy="0"/>
+          <a:chOff x="0" y="0"/>
+          <a:chExt cx="0" cy="0"/>
+        </a:xfrm>
+      </p:grpSpPr>
+      <p:sp>
+        <p:nvSpPr>
+          <p:cNvPr id="5" name="Title 1">
+            <a:extLst>
+              <a:ext uri="{FF2B5EF4-FFF2-40B4-BE49-F238E27FC236}">
+                <a16:creationId xmlns:a16="http://schemas.microsoft.com/office/drawing/2014/main" id="{D349BC52-9827-4D40-B5CB-48A398D3D11C}"/>
+              </a:ext>
+            </a:extLst>
+          </p:cNvPr>
+          <p:cNvSpPr>
+            <a:spLocks noGrp="1"/>
+          </p:cNvSpPr>
+          <p:nvPr>
+            <p:ph type="title"/>
+          </p:nvPr>
+        </p:nvSpPr>
+        <p:spPr>
+          <a:xfrm>
+            <a:off x="2703512" y="2933700"/>
+            <a:ext cx="6781800" cy="990600"/>
+          </a:xfrm>
+          <a:ln w="63500">
+            <a:solidFill>
+              <a:schemeClr val="tx1"/>
+            </a:solidFill>
+          </a:ln>
+          <a:effectLst>
+            <a:reflection stA="46000" dir="5400000" sy="-100000" algn="bl" rotWithShape="0"/>
+          </a:effectLst>
+        </p:spPr>
+        <p:txBody>
+          <a:bodyPr>
+            <a:noAutofit/>
+          </a:bodyPr>
+          <a:lstStyle/>
+          <a:p>
+            <a:pPr algn="ctr"/>
+            <a:r>
+              <a:rPr lang="en-US" sz="6000" b="1" dirty="0">
+                <a:solidFill>
+                  <a:schemeClr val="tx1"/>
+                </a:solidFill>
+              </a:rPr>
+              <a:t>Market News</a:t>
+            </a:r>
+          </a:p>
+        </p:txBody>
+      </p:sp>
+    </p:spTree>
+    <p:extLst>
+      <p:ext uri="{BB962C8B-B14F-4D97-AF65-F5344CB8AC3E}">
+        <p14:creationId xmlns:p14="http://schemas.microsoft.com/office/powerpoint/2010/main" val="2496535924"/>
+      </p:ext>
+    </p:extLst>
+  </p:cSld>
+  <p:clrMapOvr>
+    <a:masterClrMapping/>
+  </p:clrMapOvr>
+  <mc:AlternateContent xmlns:mc="http://schemas.openxmlformats.org/markup-compatibility/2006" xmlns:p14="http://schemas.microsoft.com/office/powerpoint/2010/main">
+    <mc:Choice Requires="p14">
+      <p:transition spd="med" p14:dur="700">
+        <p:fade/>
+      </p:transition>
+    </mc:Choice>
+    <mc:Fallback xmlns="">
+      <p:transition spd="med">
+        <p:fade/>
+      </p:transition>
+    </mc:Fallback>
+  </mc:AlternateContent>
+</p:sld>
+</file>
+
+<file path=ppt/slides/slide18.xml><?xml version="1.0" encoding="utf-8"?>
+<p:sld xmlns:a="http://schemas.openxmlformats.org/drawingml/2006/main" xmlns:r="http://schemas.openxmlformats.org/officeDocument/2006/relationships" xmlns:p="http://schemas.openxmlformats.org/presentationml/2006/main">
+  <p:cSld>
+    <p:spTree>
+      <p:nvGrpSpPr>
+        <p:cNvPr id="1" name=""/>
+        <p:cNvGrpSpPr/>
+        <p:nvPr/>
+      </p:nvGrpSpPr>
+      <p:grpSpPr>
+        <a:xfrm>
+          <a:off x="0" y="0"/>
+          <a:ext cx="0" cy="0"/>
+          <a:chOff x="0" y="0"/>
+          <a:chExt cx="0" cy="0"/>
+        </a:xfrm>
+      </p:grpSpPr>
+      <p:pic>
+        <p:nvPicPr>
+          <p:cNvPr id="6" name="Picture 5">
+            <a:extLst>
+              <a:ext uri="{FF2B5EF4-FFF2-40B4-BE49-F238E27FC236}">
+                <a16:creationId xmlns:a16="http://schemas.microsoft.com/office/drawing/2014/main" id="{99F73D81-F9D9-4669-BB27-34A5A811C5D8}"/>
+              </a:ext>
+            </a:extLst>
+          </p:cNvPr>
+          <p:cNvPicPr>
+            <a:picLocks noChangeAspect="1"/>
+          </p:cNvPicPr>
+          <p:nvPr/>
+        </p:nvPicPr>
+        <p:blipFill>
+          <a:blip r:embed="rId2">
+            <a:extLst>
+              <a:ext uri="{28A0092B-C50C-407E-A947-70E740481C1C}">
+                <a14:useLocalDpi xmlns:a14="http://schemas.microsoft.com/office/drawing/2010/main" val="0"/>
+              </a:ext>
+            </a:extLst>
+          </a:blip>
+          <a:stretch>
+            <a:fillRect/>
+          </a:stretch>
+        </p:blipFill>
+        <p:spPr>
+          <a:xfrm>
+            <a:off x="3656012" y="228600"/>
+            <a:ext cx="7430537" cy="6553200"/>
+          </a:xfrm>
+          <a:prstGeom prst="rect">
+            <a:avLst/>
+          </a:prstGeom>
+        </p:spPr>
+      </p:pic>
+      <p:sp>
+        <p:nvSpPr>
+          <p:cNvPr id="7" name="Rectangle 6">
+            <a:extLst>
+              <a:ext uri="{FF2B5EF4-FFF2-40B4-BE49-F238E27FC236}">
+                <a16:creationId xmlns:a16="http://schemas.microsoft.com/office/drawing/2014/main" id="{B01DA771-F36E-4CD8-ACBF-2AB0C4ECD967}"/>
+              </a:ext>
+            </a:extLst>
+          </p:cNvPr>
+          <p:cNvSpPr/>
+          <p:nvPr/>
+        </p:nvSpPr>
+        <p:spPr>
+          <a:xfrm rot="5400000">
+            <a:off x="3579811" y="990601"/>
+            <a:ext cx="304802" cy="762000"/>
+          </a:xfrm>
+          <a:prstGeom prst="rect">
+            <a:avLst/>
+          </a:prstGeom>
+          <a:noFill/>
+          <a:ln w="28575">
+            <a:solidFill>
+              <a:srgbClr val="FF0000"/>
+            </a:solidFill>
+          </a:ln>
+        </p:spPr>
+        <p:style>
+          <a:lnRef idx="3">
+            <a:schemeClr val="lt1"/>
+          </a:lnRef>
+          <a:fillRef idx="1">
+            <a:schemeClr val="accent2"/>
+          </a:fillRef>
+          <a:effectRef idx="1">
+            <a:schemeClr val="accent2"/>
+          </a:effectRef>
+          <a:fontRef idx="minor">
+            <a:schemeClr val="lt1"/>
+          </a:fontRef>
+        </p:style>
+        <p:txBody>
+          <a:bodyPr rtlCol="0" anchor="ctr"/>
+          <a:lstStyle/>
+          <a:p>
+            <a:pPr algn="ctr"/>
+            <a:endParaRPr lang="en-HK" dirty="0"/>
+          </a:p>
+        </p:txBody>
+      </p:sp>
+      <p:sp>
+        <p:nvSpPr>
+          <p:cNvPr id="8" name="Rectangle 7">
+            <a:extLst>
+              <a:ext uri="{FF2B5EF4-FFF2-40B4-BE49-F238E27FC236}">
+                <a16:creationId xmlns:a16="http://schemas.microsoft.com/office/drawing/2014/main" id="{330FECC5-FBEB-4EAB-8F4F-202CBBF4EC6B}"/>
+              </a:ext>
+            </a:extLst>
+          </p:cNvPr>
+          <p:cNvSpPr/>
+          <p:nvPr/>
+        </p:nvSpPr>
+        <p:spPr>
+          <a:xfrm rot="5400000">
+            <a:off x="5162301" y="825433"/>
+            <a:ext cx="304800" cy="3622177"/>
+          </a:xfrm>
+          <a:prstGeom prst="rect">
+            <a:avLst/>
+          </a:prstGeom>
+          <a:noFill/>
+          <a:ln w="28575">
+            <a:solidFill>
+              <a:srgbClr val="FF0000"/>
+            </a:solidFill>
+          </a:ln>
+        </p:spPr>
+        <p:style>
+          <a:lnRef idx="3">
+            <a:schemeClr val="lt1"/>
+          </a:lnRef>
+          <a:fillRef idx="1">
+            <a:schemeClr val="accent2"/>
+          </a:fillRef>
+          <a:effectRef idx="1">
+            <a:schemeClr val="accent2"/>
+          </a:effectRef>
+          <a:fontRef idx="minor">
+            <a:schemeClr val="lt1"/>
+          </a:fontRef>
+        </p:style>
+        <p:txBody>
+          <a:bodyPr rtlCol="0" anchor="ctr"/>
+          <a:lstStyle/>
+          <a:p>
+            <a:pPr algn="ctr"/>
+            <a:endParaRPr lang="en-HK" dirty="0"/>
+          </a:p>
+        </p:txBody>
+      </p:sp>
+      <p:sp>
+        <p:nvSpPr>
+          <p:cNvPr id="9" name="Rectangle 8">
+            <a:extLst>
+              <a:ext uri="{FF2B5EF4-FFF2-40B4-BE49-F238E27FC236}">
+                <a16:creationId xmlns:a16="http://schemas.microsoft.com/office/drawing/2014/main" id="{D382BE6E-6EEC-4232-9162-8138AB695DAD}"/>
+              </a:ext>
+            </a:extLst>
+          </p:cNvPr>
+          <p:cNvSpPr/>
+          <p:nvPr/>
+        </p:nvSpPr>
+        <p:spPr>
+          <a:xfrm rot="5400000">
+            <a:off x="5408612" y="3886201"/>
+            <a:ext cx="304800" cy="4114800"/>
+          </a:xfrm>
+          <a:prstGeom prst="rect">
+            <a:avLst/>
+          </a:prstGeom>
+          <a:noFill/>
+          <a:ln w="28575">
+            <a:solidFill>
+              <a:srgbClr val="FF0000"/>
+            </a:solidFill>
+          </a:ln>
+        </p:spPr>
+        <p:style>
+          <a:lnRef idx="3">
+            <a:schemeClr val="lt1"/>
+          </a:lnRef>
+          <a:fillRef idx="1">
+            <a:schemeClr val="accent2"/>
+          </a:fillRef>
+          <a:effectRef idx="1">
+            <a:schemeClr val="accent2"/>
+          </a:effectRef>
+          <a:fontRef idx="minor">
+            <a:schemeClr val="lt1"/>
+          </a:fontRef>
+        </p:style>
+        <p:txBody>
+          <a:bodyPr rtlCol="0" anchor="ctr"/>
+          <a:lstStyle/>
+          <a:p>
+            <a:pPr algn="ctr"/>
+            <a:endParaRPr lang="en-HK" dirty="0"/>
+          </a:p>
+        </p:txBody>
+      </p:sp>
+      <p:sp>
+        <p:nvSpPr>
+          <p:cNvPr id="10" name="Content Placeholder 2">
+            <a:extLst>
+              <a:ext uri="{FF2B5EF4-FFF2-40B4-BE49-F238E27FC236}">
+                <a16:creationId xmlns:a16="http://schemas.microsoft.com/office/drawing/2014/main" id="{81D85707-9EF0-4EFB-9555-7FF8001A01DC}"/>
+              </a:ext>
+            </a:extLst>
+          </p:cNvPr>
+          <p:cNvSpPr>
+            <a:spLocks noGrp="1"/>
+          </p:cNvSpPr>
+          <p:nvPr>
+            <p:ph sz="half" idx="1"/>
+          </p:nvPr>
+        </p:nvSpPr>
+        <p:spPr>
+          <a:xfrm>
+            <a:off x="873676" y="2466704"/>
+            <a:ext cx="2420689" cy="457199"/>
+          </a:xfrm>
+        </p:spPr>
+        <p:txBody>
+          <a:bodyPr>
+            <a:normAutofit lnSpcReduction="10000"/>
+          </a:bodyPr>
+          <a:lstStyle/>
+          <a:p>
+            <a:pPr marL="0" indent="0">
+              <a:buNone/>
+            </a:pPr>
+            <a:r>
+              <a:rPr lang="en-US" dirty="0"/>
+              <a:t>Crawl </a:t>
+            </a:r>
+            <a:r>
+              <a:rPr lang="en-US" dirty="0" err="1"/>
+              <a:t>Aastocks</a:t>
+            </a:r>
+            <a:endParaRPr lang="en-US" dirty="0"/>
+          </a:p>
+        </p:txBody>
+      </p:sp>
+      <p:sp>
+        <p:nvSpPr>
+          <p:cNvPr id="11" name="Content Placeholder 2">
+            <a:extLst>
+              <a:ext uri="{FF2B5EF4-FFF2-40B4-BE49-F238E27FC236}">
+                <a16:creationId xmlns:a16="http://schemas.microsoft.com/office/drawing/2014/main" id="{96F264A3-9E79-4571-962F-6185B87C8C8F}"/>
+              </a:ext>
+            </a:extLst>
+          </p:cNvPr>
+          <p:cNvSpPr txBox="1">
+            <a:spLocks/>
+          </p:cNvSpPr>
+          <p:nvPr/>
+        </p:nvSpPr>
+        <p:spPr>
+          <a:xfrm>
+            <a:off x="551165" y="5372101"/>
+            <a:ext cx="2743200" cy="1143000"/>
+          </a:xfrm>
+          <a:prstGeom prst="rect">
+            <a:avLst/>
+          </a:prstGeom>
+        </p:spPr>
+        <p:txBody>
+          <a:bodyPr vert="horz" lIns="91440" tIns="45720" rIns="91440" bIns="45720" rtlCol="0">
+            <a:normAutofit fontScale="85000" lnSpcReduction="20000"/>
+          </a:bodyPr>
+          <a:lstStyle>
+            <a:lvl1pPr marL="228600" indent="-228600" algn="l" defTabSz="914400" rtl="0" eaLnBrk="1" latinLnBrk="0" hangingPunct="1">
+              <a:lnSpc>
+                <a:spcPct val="90000"/>
+              </a:lnSpc>
+              <a:spcBef>
+                <a:spcPts val="1800"/>
+              </a:spcBef>
+              <a:buClr>
+                <a:schemeClr val="tx1"/>
+              </a:buClr>
+              <a:buSzPct val="80000"/>
+              <a:buFont typeface="Arial" pitchFamily="34" charset="0"/>
+              <a:buChar char="•"/>
+              <a:defRPr sz="2800" kern="1200">
+                <a:solidFill>
+                  <a:schemeClr val="tx1"/>
+                </a:solidFill>
+                <a:latin typeface="+mn-lt"/>
+                <a:ea typeface="+mn-ea"/>
+                <a:cs typeface="+mn-cs"/>
+              </a:defRPr>
+            </a:lvl1pPr>
+            <a:lvl2pPr marL="615950" indent="-285750" algn="l" defTabSz="914400" rtl="0" eaLnBrk="1" latinLnBrk="0" hangingPunct="1">
+              <a:lnSpc>
+                <a:spcPct val="90000"/>
+              </a:lnSpc>
+              <a:spcBef>
+                <a:spcPts val="600"/>
+              </a:spcBef>
+              <a:buSzPct val="80000"/>
+              <a:buFont typeface="Corbel" pitchFamily="34" charset="0"/>
+              <a:buChar char="–"/>
+              <a:defRPr sz="2400" kern="1200">
+                <a:solidFill>
+                  <a:schemeClr val="tx1"/>
+                </a:solidFill>
+                <a:latin typeface="+mn-lt"/>
+                <a:ea typeface="+mn-ea"/>
+                <a:cs typeface="+mn-cs"/>
+              </a:defRPr>
+            </a:lvl2pPr>
+            <a:lvl3pPr marL="996696" indent="-228600" algn="l" defTabSz="914400" rtl="0" eaLnBrk="1" latinLnBrk="0" hangingPunct="1">
+              <a:lnSpc>
+                <a:spcPct val="90000"/>
+              </a:lnSpc>
+              <a:spcBef>
+                <a:spcPts val="600"/>
+              </a:spcBef>
+              <a:buClr>
+                <a:schemeClr val="tx1"/>
+              </a:buClr>
+              <a:buSzPct val="80000"/>
+              <a:buFont typeface="Arial" pitchFamily="34" charset="0"/>
+              <a:buChar char="•"/>
+              <a:defRPr sz="2000" kern="1200">
+                <a:solidFill>
+                  <a:schemeClr val="tx1"/>
+                </a:solidFill>
+                <a:latin typeface="+mn-lt"/>
+                <a:ea typeface="+mn-ea"/>
+                <a:cs typeface="+mn-cs"/>
+              </a:defRPr>
+            </a:lvl3pPr>
+            <a:lvl4pPr marL="1380744" indent="-283464" algn="l" defTabSz="914400" rtl="0" eaLnBrk="1" latinLnBrk="0" hangingPunct="1">
+              <a:lnSpc>
+                <a:spcPct val="90000"/>
+              </a:lnSpc>
+              <a:spcBef>
+                <a:spcPts val="600"/>
+              </a:spcBef>
+              <a:buFont typeface="Corbel" pitchFamily="34" charset="0"/>
+              <a:buChar char="–"/>
+              <a:defRPr sz="1800" kern="1200">
+                <a:solidFill>
+                  <a:schemeClr val="tx1"/>
+                </a:solidFill>
+                <a:latin typeface="+mn-lt"/>
+                <a:ea typeface="+mn-ea"/>
+                <a:cs typeface="+mn-cs"/>
+              </a:defRPr>
+            </a:lvl4pPr>
+            <a:lvl5pPr marL="1764792" indent="-228600" algn="l" defTabSz="914400" rtl="0" eaLnBrk="1" latinLnBrk="0" hangingPunct="1">
+              <a:lnSpc>
+                <a:spcPct val="90000"/>
+              </a:lnSpc>
+              <a:spcBef>
+                <a:spcPts val="600"/>
+              </a:spcBef>
+              <a:buClr>
+                <a:schemeClr val="tx1"/>
+              </a:buClr>
+              <a:buSzPct val="80000"/>
+              <a:buFont typeface="Arial" pitchFamily="34" charset="0"/>
+              <a:buChar char="•"/>
+              <a:defRPr sz="1800" kern="1200">
+                <a:solidFill>
+                  <a:schemeClr val="tx1"/>
+                </a:solidFill>
+                <a:latin typeface="+mn-lt"/>
+                <a:ea typeface="+mn-ea"/>
+                <a:cs typeface="+mn-cs"/>
+              </a:defRPr>
+            </a:lvl5pPr>
+            <a:lvl6pPr marL="2148840" indent="-283464" algn="l" defTabSz="914400" rtl="0" eaLnBrk="1" latinLnBrk="0" hangingPunct="1">
+              <a:lnSpc>
+                <a:spcPct val="90000"/>
+              </a:lnSpc>
+              <a:spcBef>
+                <a:spcPts val="600"/>
+              </a:spcBef>
+              <a:buFont typeface="Corbel" pitchFamily="34" charset="0"/>
+              <a:buChar char="–"/>
+              <a:defRPr sz="1800" kern="1200" baseline="0">
+                <a:solidFill>
+                  <a:schemeClr val="tx1"/>
+                </a:solidFill>
+                <a:latin typeface="+mn-lt"/>
+                <a:ea typeface="+mn-ea"/>
+                <a:cs typeface="+mn-cs"/>
+              </a:defRPr>
+            </a:lvl6pPr>
+            <a:lvl7pPr marL="2532888" indent="-228600" algn="l" defTabSz="914400" rtl="0" eaLnBrk="1" latinLnBrk="0" hangingPunct="1">
+              <a:lnSpc>
+                <a:spcPct val="90000"/>
+              </a:lnSpc>
+              <a:spcBef>
+                <a:spcPts val="600"/>
+              </a:spcBef>
+              <a:buSzPct val="80000"/>
+              <a:buFont typeface="Arial" pitchFamily="34" charset="0"/>
+              <a:buChar char="•"/>
+              <a:defRPr sz="1800" kern="1200" baseline="0">
+                <a:solidFill>
+                  <a:schemeClr val="tx1"/>
+                </a:solidFill>
+                <a:latin typeface="+mn-lt"/>
+                <a:ea typeface="+mn-ea"/>
+                <a:cs typeface="+mn-cs"/>
+              </a:defRPr>
+            </a:lvl7pPr>
+            <a:lvl8pPr marL="2916936" indent="-283464" algn="l" defTabSz="914400" rtl="0" eaLnBrk="1" latinLnBrk="0" hangingPunct="1">
+              <a:lnSpc>
+                <a:spcPct val="90000"/>
+              </a:lnSpc>
+              <a:spcBef>
+                <a:spcPts val="600"/>
+              </a:spcBef>
+              <a:buFont typeface="Corbel" pitchFamily="34" charset="0"/>
+              <a:buChar char="–"/>
+              <a:defRPr sz="1800" kern="1200" baseline="0">
+                <a:solidFill>
+                  <a:schemeClr val="tx1"/>
+                </a:solidFill>
+                <a:latin typeface="+mn-lt"/>
+                <a:ea typeface="+mn-ea"/>
+                <a:cs typeface="+mn-cs"/>
+              </a:defRPr>
+            </a:lvl8pPr>
+            <a:lvl9pPr marL="3358134" indent="-285750" algn="l" defTabSz="914400" rtl="0" eaLnBrk="1" latinLnBrk="0" hangingPunct="1">
+              <a:lnSpc>
+                <a:spcPct val="90000"/>
+              </a:lnSpc>
+              <a:spcBef>
+                <a:spcPts val="600"/>
+              </a:spcBef>
+              <a:buSzPct val="80000"/>
+              <a:buFont typeface="Arial" panose="020B0604020202020204" pitchFamily="34" charset="0"/>
+              <a:buChar char="•"/>
+              <a:defRPr sz="1800" kern="1200">
+                <a:solidFill>
+                  <a:schemeClr val="tx1"/>
+                </a:solidFill>
+                <a:latin typeface="+mn-lt"/>
+                <a:ea typeface="+mn-ea"/>
+                <a:cs typeface="+mn-cs"/>
+              </a:defRPr>
+            </a:lvl9pPr>
+          </a:lstStyle>
+          <a:p>
+            <a:pPr marL="0" indent="0">
+              <a:buFont typeface="Arial" pitchFamily="34" charset="0"/>
+              <a:buNone/>
+            </a:pPr>
+            <a:r>
+              <a:rPr lang="en-US" dirty="0"/>
+              <a:t>Find all relevant news to the customer’s portfolio assets</a:t>
+            </a:r>
+          </a:p>
+        </p:txBody>
+      </p:sp>
+    </p:spTree>
+    <p:extLst>
+      <p:ext uri="{BB962C8B-B14F-4D97-AF65-F5344CB8AC3E}">
+        <p14:creationId xmlns:p14="http://schemas.microsoft.com/office/powerpoint/2010/main" val="952149358"/>
+      </p:ext>
+    </p:extLst>
+  </p:cSld>
+  <p:clrMapOvr>
+    <a:masterClrMapping/>
+  </p:clrMapOvr>
+  <mc:AlternateContent xmlns:mc="http://schemas.openxmlformats.org/markup-compatibility/2006" xmlns:p14="http://schemas.microsoft.com/office/powerpoint/2010/main">
+    <mc:Choice Requires="p14">
+      <p:transition spd="med" p14:dur="700">
+        <p:fade/>
+      </p:transition>
+    </mc:Choice>
+    <mc:Fallback xmlns="">
+      <p:transition spd="med">
+        <p:fade/>
+      </p:transition>
+    </mc:Fallback>
+  </mc:AlternateContent>
+</p:sld>
+</file>
+
+<file path=ppt/slides/slide19.xml><?xml version="1.0" encoding="utf-8"?>
+<p:sld xmlns:a="http://schemas.openxmlformats.org/drawingml/2006/main" xmlns:r="http://schemas.openxmlformats.org/officeDocument/2006/relationships" xmlns:p="http://schemas.openxmlformats.org/presentationml/2006/main">
+  <p:cSld>
+    <p:spTree>
+      <p:nvGrpSpPr>
+        <p:cNvPr id="1" name=""/>
+        <p:cNvGrpSpPr/>
+        <p:nvPr/>
+      </p:nvGrpSpPr>
+      <p:grpSpPr>
+        <a:xfrm>
+          <a:off x="0" y="0"/>
+          <a:ext cx="0" cy="0"/>
+          <a:chOff x="0" y="0"/>
+          <a:chExt cx="0" cy="0"/>
+        </a:xfrm>
+      </p:grpSpPr>
+      <p:sp>
+        <p:nvSpPr>
+          <p:cNvPr id="3" name="Content Placeholder 2">
+            <a:extLst>
+              <a:ext uri="{FF2B5EF4-FFF2-40B4-BE49-F238E27FC236}">
+                <a16:creationId xmlns:a16="http://schemas.microsoft.com/office/drawing/2014/main" id="{352C789D-F317-4F63-B13E-2AA7418EA9C4}"/>
+              </a:ext>
+            </a:extLst>
+          </p:cNvPr>
+          <p:cNvSpPr>
+            <a:spLocks noGrp="1"/>
+          </p:cNvSpPr>
+          <p:nvPr>
+            <p:ph sz="half" idx="1"/>
+          </p:nvPr>
+        </p:nvSpPr>
+        <p:spPr>
+          <a:xfrm>
+            <a:off x="303212" y="914400"/>
+            <a:ext cx="4038600" cy="457200"/>
+          </a:xfrm>
+        </p:spPr>
+        <p:txBody>
+          <a:bodyPr>
+            <a:normAutofit fontScale="92500" lnSpcReduction="20000"/>
+          </a:bodyPr>
+          <a:lstStyle/>
+          <a:p>
+            <a:pPr marL="0" indent="0">
+              <a:lnSpc>
+                <a:spcPct val="110000"/>
+              </a:lnSpc>
+              <a:buNone/>
+            </a:pPr>
+            <a:r>
+              <a:rPr lang="en-US" dirty="0"/>
+              <a:t>customer_related_news.csv</a:t>
+            </a:r>
+            <a:endParaRPr lang="en-HK" dirty="0"/>
+          </a:p>
+        </p:txBody>
+      </p:sp>
+      <p:sp>
+        <p:nvSpPr>
+          <p:cNvPr id="5" name="Title 5">
+            <a:extLst>
+              <a:ext uri="{FF2B5EF4-FFF2-40B4-BE49-F238E27FC236}">
+                <a16:creationId xmlns:a16="http://schemas.microsoft.com/office/drawing/2014/main" id="{A97B2706-9220-4DB4-9796-8432F15EA374}"/>
+              </a:ext>
+            </a:extLst>
+          </p:cNvPr>
+          <p:cNvSpPr txBox="1">
+            <a:spLocks/>
+          </p:cNvSpPr>
+          <p:nvPr/>
+        </p:nvSpPr>
+        <p:spPr>
+          <a:xfrm>
+            <a:off x="1255710" y="228600"/>
+            <a:ext cx="9677401" cy="609600"/>
+          </a:xfrm>
+          <a:prstGeom prst="rect">
+            <a:avLst/>
+          </a:prstGeom>
+        </p:spPr>
+        <p:txBody>
+          <a:bodyPr vert="horz" lIns="91440" tIns="45720" rIns="91440" bIns="45720" rtlCol="0" anchor="b">
+            <a:normAutofit fontScale="90000"/>
+          </a:bodyPr>
+          <a:lstStyle>
+            <a:lvl1pPr algn="l" defTabSz="914400" rtl="0" eaLnBrk="1" latinLnBrk="0" hangingPunct="1">
+              <a:lnSpc>
+                <a:spcPct val="80000"/>
+              </a:lnSpc>
+              <a:spcBef>
+                <a:spcPct val="0"/>
+              </a:spcBef>
+              <a:buNone/>
+              <a:defRPr sz="3600" kern="1200">
+                <a:solidFill>
+                  <a:schemeClr val="tx2"/>
+                </a:solidFill>
+                <a:latin typeface="+mj-lt"/>
+                <a:ea typeface="+mj-ea"/>
+                <a:cs typeface="+mj-cs"/>
+              </a:defRPr>
+            </a:lvl1pPr>
+          </a:lstStyle>
+          <a:p>
+            <a:r>
+              <a:rPr lang="en-US" b="1" dirty="0">
+                <a:solidFill>
+                  <a:schemeClr val="tx1"/>
+                </a:solidFill>
+              </a:rPr>
+              <a:t>News related to the assets in a customer’s portfolio</a:t>
+            </a:r>
+          </a:p>
+        </p:txBody>
+      </p:sp>
+      <p:graphicFrame>
+        <p:nvGraphicFramePr>
+          <p:cNvPr id="6" name="Object 5">
+            <a:extLst>
+              <a:ext uri="{FF2B5EF4-FFF2-40B4-BE49-F238E27FC236}">
+                <a16:creationId xmlns:a16="http://schemas.microsoft.com/office/drawing/2014/main" id="{2872E699-1C97-40F4-8E9C-4501124142B3}"/>
+              </a:ext>
+            </a:extLst>
+          </p:cNvPr>
+          <p:cNvGraphicFramePr>
+            <a:graphicFrameLocks noChangeAspect="1"/>
+          </p:cNvGraphicFramePr>
+          <p:nvPr/>
+        </p:nvGraphicFramePr>
+        <p:xfrm>
+          <a:off x="5480050" y="3233738"/>
+          <a:ext cx="1228725" cy="390525"/>
+        </p:xfrm>
+        <a:graphic>
+          <a:graphicData uri="http://schemas.openxmlformats.org/presentationml/2006/ole">
+            <mc:AlternateContent xmlns:mc="http://schemas.openxmlformats.org/markup-compatibility/2006">
+              <mc:Choice xmlns:v="urn:schemas-microsoft-com:vml" Requires="v">
+                <p:oleObj spid="_x0000_s2058" name="Worksheet" r:id="rId3" imgW="1228781" imgH="390618" progId="Excel.Sheet.12">
+                  <p:embed/>
+                </p:oleObj>
+              </mc:Choice>
+              <mc:Fallback>
+                <p:oleObj name="Worksheet" r:id="rId3" imgW="1228781" imgH="390618" progId="Excel.Sheet.12">
+                  <p:embed/>
+                  <p:pic>
+                    <p:nvPicPr>
+                      <p:cNvPr id="6" name="Object 5">
+                        <a:extLst>
+                          <a:ext uri="{FF2B5EF4-FFF2-40B4-BE49-F238E27FC236}">
+                            <a16:creationId xmlns:a16="http://schemas.microsoft.com/office/drawing/2014/main" id="{2872E699-1C97-40F4-8E9C-4501124142B3}"/>
+                          </a:ext>
+                        </a:extLst>
+                      </p:cNvPr>
+                      <p:cNvPicPr/>
+                      <p:nvPr/>
+                    </p:nvPicPr>
+                    <p:blipFill>
+                      <a:blip r:embed="rId4"/>
+                      <a:stretch>
+                        <a:fillRect/>
+                      </a:stretch>
+                    </p:blipFill>
+                    <p:spPr>
+                      <a:xfrm>
+                        <a:off x="5480050" y="3233738"/>
+                        <a:ext cx="1228725" cy="390525"/>
+                      </a:xfrm>
+                      <a:prstGeom prst="rect">
+                        <a:avLst/>
+                      </a:prstGeom>
+                    </p:spPr>
+                  </p:pic>
+                </p:oleObj>
+              </mc:Fallback>
+            </mc:AlternateContent>
+          </a:graphicData>
+        </a:graphic>
+      </p:graphicFrame>
+      <p:graphicFrame>
+        <p:nvGraphicFramePr>
+          <p:cNvPr id="2" name="Object 1">
+            <a:extLst>
+              <a:ext uri="{FF2B5EF4-FFF2-40B4-BE49-F238E27FC236}">
+                <a16:creationId xmlns:a16="http://schemas.microsoft.com/office/drawing/2014/main" id="{5459090C-59CB-48B8-BD76-20966A1C4653}"/>
+              </a:ext>
+            </a:extLst>
+          </p:cNvPr>
+          <p:cNvGraphicFramePr>
+            <a:graphicFrameLocks noChangeAspect="1"/>
+          </p:cNvGraphicFramePr>
+          <p:nvPr>
+            <p:extLst>
+              <p:ext uri="{D42A27DB-BD31-4B8C-83A1-F6EECF244321}">
+                <p14:modId xmlns:p14="http://schemas.microsoft.com/office/powerpoint/2010/main" val="2738432772"/>
+              </p:ext>
+            </p:extLst>
+          </p:nvPr>
+        </p:nvGraphicFramePr>
+        <p:xfrm>
+          <a:off x="147043" y="1398977"/>
+          <a:ext cx="11814767" cy="1530350"/>
+        </p:xfrm>
+        <a:graphic>
+          <a:graphicData uri="http://schemas.openxmlformats.org/presentationml/2006/ole">
+            <mc:AlternateContent xmlns:mc="http://schemas.openxmlformats.org/markup-compatibility/2006">
+              <mc:Choice xmlns:v="urn:schemas-microsoft-com:vml" Requires="v">
+                <p:oleObj spid="_x0000_s2059" name="Worksheet" r:id="rId5" imgW="11992113" imgH="1343065" progId="Excel.Sheet.12">
+                  <p:embed/>
+                </p:oleObj>
+              </mc:Choice>
+              <mc:Fallback>
+                <p:oleObj name="Worksheet" r:id="rId5" imgW="11992113" imgH="1343065" progId="Excel.Sheet.12">
+                  <p:embed/>
+                  <p:pic>
+                    <p:nvPicPr>
+                      <p:cNvPr id="0" name=""/>
+                      <p:cNvPicPr/>
+                      <p:nvPr/>
+                    </p:nvPicPr>
+                    <p:blipFill>
+                      <a:blip r:embed="rId6"/>
+                      <a:stretch>
+                        <a:fillRect/>
+                      </a:stretch>
+                    </p:blipFill>
+                    <p:spPr>
+                      <a:xfrm>
+                        <a:off x="147043" y="1398977"/>
+                        <a:ext cx="11814767" cy="1530350"/>
+                      </a:xfrm>
+                      <a:prstGeom prst="rect">
+                        <a:avLst/>
+                      </a:prstGeom>
+                      <a:solidFill>
+                        <a:schemeClr val="bg1"/>
+                      </a:solidFill>
+                    </p:spPr>
+                  </p:pic>
+                </p:oleObj>
+              </mc:Fallback>
+            </mc:AlternateContent>
+          </a:graphicData>
+        </a:graphic>
+      </p:graphicFrame>
+      <p:sp>
+        <p:nvSpPr>
+          <p:cNvPr id="4" name="Rectangle 3">
+            <a:extLst>
+              <a:ext uri="{FF2B5EF4-FFF2-40B4-BE49-F238E27FC236}">
+                <a16:creationId xmlns:a16="http://schemas.microsoft.com/office/drawing/2014/main" id="{5BA8C0AA-2DE7-4795-9E1F-C0995125EF08}"/>
+              </a:ext>
+            </a:extLst>
+          </p:cNvPr>
+          <p:cNvSpPr/>
+          <p:nvPr/>
+        </p:nvSpPr>
+        <p:spPr>
+          <a:xfrm>
+            <a:off x="147043" y="3276600"/>
+            <a:ext cx="11814767" cy="1477328"/>
+          </a:xfrm>
+          <a:prstGeom prst="rect">
+            <a:avLst/>
+          </a:prstGeom>
+        </p:spPr>
+        <p:txBody>
+          <a:bodyPr wrap="square">
+            <a:spAutoFit/>
+          </a:bodyPr>
+          <a:lstStyle/>
+          <a:p>
+            <a:r>
+              <a:rPr lang="en-HK" b="1" dirty="0" err="1"/>
+              <a:t>利福國際</a:t>
+            </a:r>
+            <a:r>
+              <a:rPr lang="en-HK" b="1" dirty="0"/>
+              <a:t>(01212.HK)</a:t>
+            </a:r>
+            <a:r>
+              <a:rPr lang="en-HK" b="1" dirty="0" err="1"/>
+              <a:t>料本港下半年零售銷售增速不如上半年快</a:t>
+            </a:r>
+            <a:r>
+              <a:rPr lang="en-HK" b="1" dirty="0"/>
+              <a:t>:</a:t>
+            </a:r>
+          </a:p>
+          <a:p>
+            <a:r>
+              <a:rPr lang="zh-TW" altLang="en-US" sz="1200" dirty="0"/>
+              <a:t>利福國際</a:t>
+            </a:r>
+            <a:r>
+              <a:rPr lang="en-US" altLang="zh-TW" sz="1200" dirty="0"/>
+              <a:t>(01212.HK) </a:t>
+            </a:r>
+            <a:r>
+              <a:rPr lang="zh-TW" altLang="en-US" sz="1200" dirty="0"/>
+              <a:t>沽空 </a:t>
+            </a:r>
+            <a:r>
+              <a:rPr lang="en-US" altLang="zh-TW" sz="1200" dirty="0"/>
+              <a:t>$44.92</a:t>
+            </a:r>
+            <a:r>
+              <a:rPr lang="zh-TW" altLang="en-US" sz="1200" dirty="0"/>
+              <a:t>萬</a:t>
+            </a:r>
+            <a:r>
+              <a:rPr lang="en-US" altLang="zh-TW" sz="1200" dirty="0"/>
+              <a:t>; </a:t>
+            </a:r>
+            <a:r>
+              <a:rPr lang="zh-TW" altLang="en-US" sz="1200" dirty="0"/>
+              <a:t>比率 </a:t>
+            </a:r>
+            <a:r>
+              <a:rPr lang="en-US" altLang="zh-TW" sz="1200" dirty="0"/>
+              <a:t>4.678%   </a:t>
+            </a:r>
+            <a:r>
+              <a:rPr lang="zh-TW" altLang="en-US" sz="1200" dirty="0"/>
+              <a:t>主席劉鑾鴻在記者會上表示，目前人民幣貶值對香港零售市道影響輕微，看到增長勢頭仍在，但預計下半年本港零售銷售的增幅不如上半年快，料為高單位數至低雙位數增長，主要是由於去年下半年的高基數效應所致。公司上半年盈利按年減少</a:t>
+            </a:r>
+            <a:r>
+              <a:rPr lang="en-US" altLang="zh-TW" sz="1200" dirty="0"/>
+              <a:t>48.7%</a:t>
+            </a:r>
+            <a:r>
+              <a:rPr lang="zh-TW" altLang="en-US" sz="1200" dirty="0"/>
+              <a:t>，主要是受到期內投資收入大幅下跌所拖累。他指出，投資組合中，主要包含股票、債券及投資基金等，預計下半年投資市場會較上半年動盪，因此近月已有將投資組合規模適量減少，但強調沒有可能將規模減至零。劉鑾鴻續指，將投資組合中的現金回流後放在公司，都沒有特別用途，因此計劃將部分資金用於回購，對股東亦有得益。他強調，一直不擔心公司的負債比率，因為目前未動用的現金達</a:t>
+            </a:r>
+            <a:r>
+              <a:rPr lang="en-US" altLang="zh-TW" sz="1200" dirty="0"/>
+              <a:t>40</a:t>
+            </a:r>
+            <a:r>
+              <a:rPr lang="zh-TW" altLang="en-US" sz="1200" dirty="0"/>
+              <a:t>億至</a:t>
+            </a:r>
+            <a:r>
+              <a:rPr lang="en-US" altLang="zh-TW" sz="1200" dirty="0"/>
+              <a:t>50</a:t>
+            </a:r>
+            <a:r>
+              <a:rPr lang="zh-TW" altLang="en-US" sz="1200" dirty="0"/>
+              <a:t>億，隨時可變現的資產達</a:t>
+            </a:r>
+            <a:r>
+              <a:rPr lang="en-US" altLang="zh-TW" sz="1200" dirty="0"/>
+              <a:t>100</a:t>
+            </a:r>
+            <a:r>
+              <a:rPr lang="zh-TW" altLang="en-US" sz="1200" dirty="0"/>
+              <a:t>億元。早前利福國際宣布收購利福中國</a:t>
+            </a:r>
+            <a:r>
+              <a:rPr lang="en-US" altLang="zh-TW" sz="1200" dirty="0"/>
+              <a:t>(02136.HK)  +0.290 (+9.265%)    </a:t>
+            </a:r>
+            <a:r>
+              <a:rPr lang="zh-TW" altLang="en-US" sz="1200" dirty="0"/>
+              <a:t>沽空 </a:t>
+            </a:r>
+            <a:r>
+              <a:rPr lang="en-US" altLang="zh-TW" sz="1200" dirty="0"/>
+              <a:t>$8.99</a:t>
+            </a:r>
+            <a:r>
+              <a:rPr lang="zh-TW" altLang="en-US" sz="1200" dirty="0"/>
+              <a:t>萬</a:t>
+            </a:r>
+            <a:r>
+              <a:rPr lang="en-US" altLang="zh-TW" sz="1200" dirty="0"/>
+              <a:t>; </a:t>
+            </a:r>
+            <a:r>
+              <a:rPr lang="zh-TW" altLang="en-US" sz="1200" dirty="0"/>
+              <a:t>比率 </a:t>
+            </a:r>
+            <a:r>
+              <a:rPr lang="en-US" altLang="zh-TW" sz="1200" dirty="0"/>
+              <a:t>0.777%   </a:t>
+            </a:r>
+            <a:r>
+              <a:rPr lang="zh-TW" altLang="en-US" sz="1200" dirty="0"/>
+              <a:t>日式餐廳「和三味」。劉氏解釋，「和三味」本屬於集團的內地業務，但由於現時內地餐廳業務競爭大，因此只剩下香港區的一家分店，將其撥歸至利福國際旗下會更合適。 </a:t>
+            </a:r>
+            <a:endParaRPr lang="en-HK" sz="1200" dirty="0"/>
+          </a:p>
+        </p:txBody>
+      </p:sp>
+      <p:sp>
+        <p:nvSpPr>
+          <p:cNvPr id="7" name="Rectangle 6">
+            <a:extLst>
+              <a:ext uri="{FF2B5EF4-FFF2-40B4-BE49-F238E27FC236}">
+                <a16:creationId xmlns:a16="http://schemas.microsoft.com/office/drawing/2014/main" id="{97D76F8A-4DE9-4ECA-A060-74D5F46D7305}"/>
+              </a:ext>
+            </a:extLst>
+          </p:cNvPr>
+          <p:cNvSpPr/>
+          <p:nvPr/>
+        </p:nvSpPr>
+        <p:spPr>
+          <a:xfrm>
+            <a:off x="147043" y="5029200"/>
+            <a:ext cx="11814767" cy="1661993"/>
+          </a:xfrm>
+          <a:prstGeom prst="rect">
+            <a:avLst/>
+          </a:prstGeom>
+        </p:spPr>
+        <p:txBody>
+          <a:bodyPr wrap="square">
+            <a:spAutoFit/>
+          </a:bodyPr>
+          <a:lstStyle/>
+          <a:p>
+            <a:r>
+              <a:rPr lang="en-US" altLang="zh-TW" b="1" dirty="0">
+                <a:latin typeface="Calibri (Body)"/>
+              </a:rPr>
+              <a:t>《</a:t>
+            </a:r>
+            <a:r>
+              <a:rPr lang="zh-TW" altLang="en-US" b="1" dirty="0">
+                <a:latin typeface="Calibri (Body)"/>
+              </a:rPr>
+              <a:t>公司業績</a:t>
+            </a:r>
+            <a:r>
+              <a:rPr lang="en-US" altLang="zh-TW" b="1" dirty="0">
+                <a:latin typeface="Calibri (Body)"/>
+              </a:rPr>
+              <a:t>》</a:t>
+            </a:r>
+            <a:r>
+              <a:rPr lang="zh-TW" altLang="en-US" b="1" dirty="0">
+                <a:latin typeface="Calibri (Body)"/>
+              </a:rPr>
+              <a:t>利福國際</a:t>
+            </a:r>
+            <a:r>
+              <a:rPr lang="en-US" altLang="zh-TW" b="1" dirty="0">
+                <a:latin typeface="Calibri (Body)"/>
+              </a:rPr>
+              <a:t>(01212.HK)</a:t>
+            </a:r>
+            <a:r>
+              <a:rPr lang="zh-TW" altLang="en-US" b="1" dirty="0">
+                <a:latin typeface="Calibri (Body)"/>
+              </a:rPr>
+              <a:t>半年純利</a:t>
+            </a:r>
+            <a:r>
+              <a:rPr lang="en-US" altLang="zh-TW" b="1" dirty="0">
+                <a:latin typeface="Calibri (Body)"/>
+              </a:rPr>
+              <a:t>8.83</a:t>
+            </a:r>
+            <a:r>
+              <a:rPr lang="zh-TW" altLang="en-US" b="1" dirty="0">
+                <a:latin typeface="Calibri (Body)"/>
+              </a:rPr>
+              <a:t>億元跌</a:t>
+            </a:r>
+            <a:r>
+              <a:rPr lang="en-US" altLang="zh-TW" b="1" dirty="0">
+                <a:latin typeface="Calibri (Body)"/>
+              </a:rPr>
+              <a:t>48.7%  </a:t>
+            </a:r>
+            <a:r>
+              <a:rPr lang="zh-TW" altLang="en-US" b="1" dirty="0">
+                <a:latin typeface="Calibri (Body)"/>
+              </a:rPr>
+              <a:t>派中期息</a:t>
+            </a:r>
+            <a:r>
+              <a:rPr lang="en-US" altLang="zh-TW" b="1" dirty="0">
+                <a:latin typeface="Calibri (Body)"/>
+              </a:rPr>
+              <a:t>29.5</a:t>
+            </a:r>
+            <a:r>
+              <a:rPr lang="zh-TW" altLang="en-US" b="1" dirty="0">
+                <a:latin typeface="Calibri (Body)"/>
+              </a:rPr>
+              <a:t>仙</a:t>
+            </a:r>
+            <a:r>
+              <a:rPr lang="en-US" altLang="zh-TW" b="1" dirty="0">
+                <a:latin typeface="Calibri (Body)"/>
+              </a:rPr>
+              <a:t>:</a:t>
+            </a:r>
+          </a:p>
+          <a:p>
+            <a:r>
+              <a:rPr lang="zh-TW" altLang="en-US" sz="1200" dirty="0">
+                <a:latin typeface="Calibri (Body)"/>
+              </a:rPr>
+              <a:t>利福國際</a:t>
+            </a:r>
+            <a:r>
+              <a:rPr lang="en-US" altLang="zh-TW" sz="1200" dirty="0">
+                <a:latin typeface="Calibri (Body)"/>
+              </a:rPr>
+              <a:t>(01212.HK) </a:t>
+            </a:r>
+            <a:r>
+              <a:rPr lang="zh-TW" altLang="en-US" sz="1200" dirty="0">
+                <a:latin typeface="Calibri (Body)"/>
+              </a:rPr>
+              <a:t>沽空 </a:t>
+            </a:r>
+            <a:r>
+              <a:rPr lang="en-US" altLang="zh-TW" sz="1200" dirty="0">
+                <a:latin typeface="Calibri (Body)"/>
+              </a:rPr>
+              <a:t>$44.92</a:t>
+            </a:r>
+            <a:r>
+              <a:rPr lang="zh-TW" altLang="en-US" sz="1200" dirty="0">
+                <a:latin typeface="Calibri (Body)"/>
+              </a:rPr>
+              <a:t>萬</a:t>
+            </a:r>
+            <a:r>
+              <a:rPr lang="en-US" altLang="zh-TW" sz="1200" dirty="0">
+                <a:latin typeface="Calibri (Body)"/>
+              </a:rPr>
+              <a:t>; </a:t>
+            </a:r>
+            <a:r>
+              <a:rPr lang="zh-TW" altLang="en-US" sz="1200" dirty="0">
+                <a:latin typeface="Calibri (Body)"/>
+              </a:rPr>
+              <a:t>比率 </a:t>
+            </a:r>
+            <a:r>
+              <a:rPr lang="en-US" altLang="zh-TW" sz="1200" dirty="0">
+                <a:latin typeface="Calibri (Body)"/>
+              </a:rPr>
+              <a:t>4.678%   </a:t>
+            </a:r>
+            <a:r>
+              <a:rPr lang="zh-TW" altLang="en-US" sz="1200" dirty="0">
+                <a:latin typeface="Calibri (Body)"/>
+              </a:rPr>
+              <a:t>公布截至今年</a:t>
+            </a:r>
+            <a:r>
+              <a:rPr lang="en-US" altLang="zh-TW" sz="1200" dirty="0">
+                <a:latin typeface="Calibri (Body)"/>
+              </a:rPr>
+              <a:t>6</a:t>
+            </a:r>
+            <a:r>
+              <a:rPr lang="zh-TW" altLang="en-US" sz="1200" dirty="0">
+                <a:latin typeface="Calibri (Body)"/>
+              </a:rPr>
+              <a:t>月底止中期業績，持續經營業務營業額</a:t>
+            </a:r>
+            <a:r>
+              <a:rPr lang="en-US" altLang="zh-TW" sz="1200" dirty="0">
+                <a:latin typeface="Calibri (Body)"/>
+              </a:rPr>
+              <a:t>21.13</a:t>
+            </a:r>
+            <a:r>
+              <a:rPr lang="zh-TW" altLang="en-US" sz="1200" dirty="0">
+                <a:latin typeface="Calibri (Body)"/>
+              </a:rPr>
+              <a:t>億元，按年升</a:t>
+            </a:r>
+            <a:r>
+              <a:rPr lang="en-US" altLang="zh-TW" sz="1200" dirty="0">
+                <a:latin typeface="Calibri (Body)"/>
+              </a:rPr>
+              <a:t>26.2%</a:t>
+            </a:r>
+            <a:r>
+              <a:rPr lang="zh-TW" altLang="en-US" sz="1200" dirty="0">
+                <a:latin typeface="Calibri (Body)"/>
+              </a:rPr>
+              <a:t>。純利</a:t>
+            </a:r>
+            <a:r>
+              <a:rPr lang="en-US" altLang="zh-TW" sz="1200" dirty="0">
+                <a:latin typeface="Calibri (Body)"/>
+              </a:rPr>
+              <a:t>8.83</a:t>
+            </a:r>
+            <a:r>
+              <a:rPr lang="zh-TW" altLang="en-US" sz="1200" dirty="0">
+                <a:latin typeface="Calibri (Body)"/>
+              </a:rPr>
+              <a:t>億元，按年跌</a:t>
+            </a:r>
+            <a:r>
+              <a:rPr lang="en-US" altLang="zh-TW" sz="1200" dirty="0">
+                <a:latin typeface="Calibri (Body)"/>
+              </a:rPr>
+              <a:t>48.7%</a:t>
+            </a:r>
+            <a:r>
+              <a:rPr lang="zh-TW" altLang="en-US" sz="1200" dirty="0">
+                <a:latin typeface="Calibri (Body)"/>
+              </a:rPr>
+              <a:t>；每股盈利</a:t>
+            </a:r>
+            <a:r>
+              <a:rPr lang="en-US" altLang="zh-TW" sz="1200" dirty="0">
+                <a:latin typeface="Calibri (Body)"/>
+              </a:rPr>
+              <a:t>0.551</a:t>
+            </a:r>
+            <a:r>
+              <a:rPr lang="zh-TW" altLang="en-US" sz="1200" dirty="0">
+                <a:latin typeface="Calibri (Body)"/>
+              </a:rPr>
+              <a:t>元。派中期息</a:t>
+            </a:r>
+            <a:r>
+              <a:rPr lang="en-US" altLang="zh-TW" sz="1200" dirty="0">
+                <a:latin typeface="Calibri (Body)"/>
+              </a:rPr>
+              <a:t>29.5</a:t>
+            </a:r>
+            <a:r>
+              <a:rPr lang="zh-TW" altLang="en-US" sz="1200" dirty="0">
+                <a:latin typeface="Calibri (Body)"/>
+              </a:rPr>
+              <a:t>仙，按年升</a:t>
+            </a:r>
+            <a:r>
+              <a:rPr lang="en-US" altLang="zh-TW" sz="1200" dirty="0">
+                <a:latin typeface="Calibri (Body)"/>
+              </a:rPr>
+              <a:t>2.1%</a:t>
+            </a:r>
+            <a:r>
+              <a:rPr lang="zh-TW" altLang="en-US" sz="1200" dirty="0">
+                <a:latin typeface="Calibri (Body)"/>
+              </a:rPr>
+              <a:t>。公司指，在消費性開支增長動力強勁及入境旅遊業復蘇的帶動下，銅鑼灣崇光於回顧期內的銷售收入錄得</a:t>
+            </a:r>
+            <a:r>
+              <a:rPr lang="en-US" altLang="zh-TW" sz="1200" dirty="0">
+                <a:latin typeface="Calibri (Body)"/>
+              </a:rPr>
+              <a:t>20.1%</a:t>
+            </a:r>
+            <a:r>
+              <a:rPr lang="zh-TW" altLang="en-US" sz="1200" dirty="0">
+                <a:latin typeface="Calibri (Body)"/>
+              </a:rPr>
+              <a:t>的升幅。透過在門店翻新計劃完成後提供更完善的購物體驗，整體客流量增加</a:t>
+            </a:r>
+            <a:r>
+              <a:rPr lang="en-US" altLang="zh-TW" sz="1200" dirty="0">
+                <a:latin typeface="Calibri (Body)"/>
+              </a:rPr>
+              <a:t>7.1%</a:t>
+            </a:r>
+            <a:r>
+              <a:rPr lang="zh-TW" altLang="en-US" sz="1200" dirty="0">
+                <a:latin typeface="Calibri (Body)"/>
+              </a:rPr>
+              <a:t>，逗留購買比率由去年同期上升</a:t>
+            </a:r>
+            <a:r>
+              <a:rPr lang="en-US" altLang="zh-TW" sz="1200" dirty="0">
+                <a:latin typeface="Calibri (Body)"/>
+              </a:rPr>
+              <a:t>2.3</a:t>
+            </a:r>
+            <a:r>
+              <a:rPr lang="zh-TW" altLang="en-US" sz="1200" dirty="0">
+                <a:latin typeface="Calibri (Body)"/>
+              </a:rPr>
+              <a:t>個百分點至</a:t>
+            </a:r>
+            <a:r>
+              <a:rPr lang="en-US" altLang="zh-TW" sz="1200" dirty="0">
+                <a:latin typeface="Calibri (Body)"/>
+              </a:rPr>
+              <a:t>34.7%</a:t>
+            </a:r>
+            <a:r>
+              <a:rPr lang="zh-TW" altLang="en-US" sz="1200" dirty="0">
+                <a:latin typeface="Calibri (Body)"/>
+              </a:rPr>
+              <a:t>，而平均每宗交易額</a:t>
+            </a:r>
+            <a:r>
+              <a:rPr lang="en-US" altLang="zh-TW" sz="1200" dirty="0">
+                <a:latin typeface="Calibri (Body)"/>
+              </a:rPr>
+              <a:t>(</a:t>
+            </a:r>
+            <a:r>
+              <a:rPr lang="zh-TW" altLang="en-US" sz="1200" dirty="0">
+                <a:latin typeface="Calibri (Body)"/>
+              </a:rPr>
+              <a:t>不包括崇光超市超級市場的交易額</a:t>
+            </a:r>
+            <a:r>
+              <a:rPr lang="en-US" altLang="zh-TW" sz="1200" dirty="0">
+                <a:latin typeface="Calibri (Body)"/>
+              </a:rPr>
+              <a:t>)</a:t>
+            </a:r>
+            <a:r>
+              <a:rPr lang="zh-TW" altLang="en-US" sz="1200" dirty="0">
+                <a:latin typeface="Calibri (Body)"/>
+              </a:rPr>
+              <a:t>則由去年的</a:t>
+            </a:r>
+            <a:r>
+              <a:rPr lang="en-US" altLang="zh-TW" sz="1200" dirty="0">
+                <a:latin typeface="Calibri (Body)"/>
+              </a:rPr>
+              <a:t>1,344</a:t>
+            </a:r>
+            <a:r>
+              <a:rPr lang="zh-TW" altLang="en-US" sz="1200" dirty="0">
+                <a:latin typeface="Calibri (Body)"/>
+              </a:rPr>
+              <a:t>元增加至</a:t>
+            </a:r>
+            <a:r>
+              <a:rPr lang="en-US" altLang="zh-TW" sz="1200" dirty="0">
+                <a:latin typeface="Calibri (Body)"/>
+              </a:rPr>
+              <a:t>1,482</a:t>
+            </a:r>
+            <a:r>
+              <a:rPr lang="zh-TW" altLang="en-US" sz="1200" dirty="0">
+                <a:latin typeface="Calibri (Body)"/>
+              </a:rPr>
+              <a:t>元。於</a:t>
+            </a:r>
+            <a:r>
+              <a:rPr lang="en-US" altLang="zh-TW" sz="1200" dirty="0">
+                <a:latin typeface="Calibri (Body)"/>
+              </a:rPr>
+              <a:t>5</a:t>
+            </a:r>
+            <a:r>
+              <a:rPr lang="zh-TW" altLang="en-US" sz="1200" dirty="0">
+                <a:latin typeface="Calibri (Body)"/>
+              </a:rPr>
+              <a:t>月舉行之半年一度的崇光「感謝周」再次廣受顧客歡迎，並錄得破記錄的銷售收入，由去年</a:t>
+            </a:r>
+            <a:r>
+              <a:rPr lang="en-US" altLang="zh-TW" sz="1200" dirty="0">
+                <a:latin typeface="Calibri (Body)"/>
+              </a:rPr>
+              <a:t>5</a:t>
+            </a:r>
+            <a:r>
+              <a:rPr lang="zh-TW" altLang="en-US" sz="1200" dirty="0">
+                <a:latin typeface="Calibri (Body)"/>
+              </a:rPr>
+              <a:t>月同期舉行的「感謝周」之</a:t>
+            </a:r>
+            <a:r>
+              <a:rPr lang="en-US" altLang="zh-TW" sz="1200" dirty="0">
+                <a:latin typeface="Calibri (Body)"/>
+              </a:rPr>
+              <a:t>10.92</a:t>
+            </a:r>
+            <a:r>
+              <a:rPr lang="zh-TW" altLang="en-US" sz="1200" dirty="0">
+                <a:latin typeface="Calibri (Body)"/>
+              </a:rPr>
+              <a:t>億元，上升</a:t>
+            </a:r>
+            <a:r>
+              <a:rPr lang="en-US" altLang="zh-TW" sz="1200" dirty="0">
+                <a:latin typeface="Calibri (Body)"/>
+              </a:rPr>
+              <a:t>19.7%</a:t>
+            </a:r>
+            <a:r>
+              <a:rPr lang="zh-TW" altLang="en-US" sz="1200" dirty="0">
+                <a:latin typeface="Calibri (Body)"/>
+              </a:rPr>
+              <a:t>至</a:t>
+            </a:r>
+            <a:r>
+              <a:rPr lang="en-US" altLang="zh-TW" sz="1200" dirty="0">
+                <a:latin typeface="Calibri (Body)"/>
+              </a:rPr>
+              <a:t>13.07</a:t>
+            </a:r>
+            <a:r>
+              <a:rPr lang="zh-TW" altLang="en-US" sz="1200" dirty="0">
+                <a:latin typeface="Calibri (Body)"/>
+              </a:rPr>
+              <a:t>億元。尖沙咀崇光於期內銷售收入增加</a:t>
+            </a:r>
+            <a:r>
+              <a:rPr lang="en-US" altLang="zh-TW" sz="1200" dirty="0">
+                <a:latin typeface="Calibri (Body)"/>
+              </a:rPr>
+              <a:t>42.8%</a:t>
+            </a:r>
+            <a:r>
+              <a:rPr lang="zh-TW" altLang="en-US" sz="1200" dirty="0">
+                <a:latin typeface="Calibri (Body)"/>
+              </a:rPr>
+              <a:t>。化妝品及護膚產品繼續為尖沙咀店的主要增長動力，銷售額於回顧期內增加</a:t>
+            </a:r>
+            <a:r>
+              <a:rPr lang="en-US" altLang="zh-TW" sz="1200" dirty="0">
+                <a:latin typeface="Calibri (Body)"/>
+              </a:rPr>
+              <a:t>55.4%</a:t>
+            </a:r>
+            <a:r>
+              <a:rPr lang="zh-TW" altLang="en-US" sz="1200" dirty="0">
+                <a:latin typeface="Calibri (Body)"/>
+              </a:rPr>
+              <a:t>。受惠於入境旅遊業及本地需求回勇，尖沙咀崇光延續強勁增長勢頭，平均每宗交易額及客流量均較去年同期有所增加。與銅鑼灣店情況相若，尖沙咀崇光的</a:t>
+            </a:r>
+            <a:r>
+              <a:rPr lang="en-US" altLang="zh-TW" sz="1200" dirty="0">
+                <a:latin typeface="Calibri (Body)"/>
+              </a:rPr>
+              <a:t>5</a:t>
+            </a:r>
+            <a:r>
+              <a:rPr lang="zh-TW" altLang="en-US" sz="1200" dirty="0">
+                <a:latin typeface="Calibri (Body)"/>
+              </a:rPr>
+              <a:t>月「感謝周」活動廣受歡迎，取得破記錄的銷售收入</a:t>
+            </a:r>
+            <a:r>
+              <a:rPr lang="en-US" altLang="zh-TW" sz="1200" dirty="0">
+                <a:latin typeface="Calibri (Body)"/>
+              </a:rPr>
+              <a:t>4.29</a:t>
+            </a:r>
+            <a:r>
+              <a:rPr lang="zh-TW" altLang="en-US" sz="1200" dirty="0">
+                <a:latin typeface="Calibri (Body)"/>
+              </a:rPr>
+              <a:t>億元，較去年同一活動上升</a:t>
+            </a:r>
+            <a:r>
+              <a:rPr lang="en-US" altLang="zh-TW" sz="1200" dirty="0">
+                <a:latin typeface="Calibri (Body)"/>
+              </a:rPr>
+              <a:t>41.9%</a:t>
+            </a:r>
+            <a:r>
+              <a:rPr lang="zh-TW" altLang="en-US" sz="1200" dirty="0">
+                <a:latin typeface="Calibri (Body)"/>
+              </a:rPr>
+              <a:t>。</a:t>
+            </a:r>
+            <a:endParaRPr lang="en-HK" sz="1200" dirty="0">
+              <a:latin typeface="Calibri (Body)"/>
+            </a:endParaRPr>
+          </a:p>
+        </p:txBody>
+      </p:sp>
+      <p:sp>
+        <p:nvSpPr>
+          <p:cNvPr id="11" name="Rectangle 10">
+            <a:extLst>
+              <a:ext uri="{FF2B5EF4-FFF2-40B4-BE49-F238E27FC236}">
+                <a16:creationId xmlns:a16="http://schemas.microsoft.com/office/drawing/2014/main" id="{F3366E09-07F9-4475-9981-52F92C369EF9}"/>
+              </a:ext>
+            </a:extLst>
+          </p:cNvPr>
+          <p:cNvSpPr/>
+          <p:nvPr/>
+        </p:nvSpPr>
+        <p:spPr>
+          <a:xfrm rot="5400000">
+            <a:off x="5595342" y="-3409204"/>
+            <a:ext cx="457202" cy="11353800"/>
+          </a:xfrm>
+          <a:prstGeom prst="rect">
+            <a:avLst/>
+          </a:prstGeom>
+          <a:noFill/>
+          <a:ln w="28575">
+            <a:solidFill>
+              <a:srgbClr val="FF0000"/>
+            </a:solidFill>
+          </a:ln>
+        </p:spPr>
+        <p:style>
+          <a:lnRef idx="3">
+            <a:schemeClr val="lt1"/>
+          </a:lnRef>
+          <a:fillRef idx="1">
+            <a:schemeClr val="accent2"/>
+          </a:fillRef>
+          <a:effectRef idx="1">
+            <a:schemeClr val="accent2"/>
+          </a:effectRef>
+          <a:fontRef idx="minor">
+            <a:schemeClr val="lt1"/>
+          </a:fontRef>
+        </p:style>
+        <p:txBody>
+          <a:bodyPr rtlCol="0" anchor="ctr"/>
+          <a:lstStyle/>
+          <a:p>
+            <a:pPr algn="ctr"/>
+            <a:endParaRPr lang="en-HK" dirty="0"/>
+          </a:p>
+        </p:txBody>
+      </p:sp>
+    </p:spTree>
+    <p:extLst>
+      <p:ext uri="{BB962C8B-B14F-4D97-AF65-F5344CB8AC3E}">
+        <p14:creationId xmlns:p14="http://schemas.microsoft.com/office/powerpoint/2010/main" val="1238014428"/>
+      </p:ext>
+    </p:extLst>
+  </p:cSld>
+  <p:clrMapOvr>
+    <a:masterClrMapping/>
+  </p:clrMapOvr>
+  <mc:AlternateContent xmlns:mc="http://schemas.openxmlformats.org/markup-compatibility/2006" xmlns:p14="http://schemas.microsoft.com/office/powerpoint/2010/main">
+    <mc:Choice Requires="p14">
+      <p:transition spd="med" p14:dur="700">
+        <p:fade/>
+      </p:transition>
+    </mc:Choice>
+    <mc:Fallback xmlns="">
+      <p:transition spd="med">
+        <p:fade/>
+      </p:transition>
+    </mc:Fallback>
+  </mc:AlternateContent>
+</p:sld>
+</file>
+
+<file path=ppt/slides/slide2.xml><?xml version="1.0" encoding="utf-8"?>
+<p:sld xmlns:a="http://schemas.openxmlformats.org/drawingml/2006/main" xmlns:r="http://schemas.openxmlformats.org/officeDocument/2006/relationships" xmlns:p="http://schemas.openxmlformats.org/presentationml/2006/main">
+  <p:cSld>
+    <p:bg>
+      <p:bgPr>
+        <a:gradFill flip="none" rotWithShape="1">
+          <a:gsLst>
+            <a:gs pos="0">
+              <a:schemeClr val="bg2">
+                <a:lumMod val="20000"/>
+                <a:lumOff val="80000"/>
+              </a:schemeClr>
+            </a:gs>
+            <a:gs pos="58000">
+              <a:schemeClr val="bg2">
+                <a:lumMod val="40000"/>
+                <a:lumOff val="60000"/>
+              </a:schemeClr>
+            </a:gs>
+            <a:gs pos="100000">
+              <a:schemeClr val="bg2"/>
+            </a:gs>
+          </a:gsLst>
+          <a:lin ang="17400000" scaled="0"/>
+          <a:tileRect/>
+        </a:gradFill>
+        <a:effectLst/>
+      </p:bgPr>
+    </p:bg>
+    <p:spTree>
+      <p:nvGrpSpPr>
+        <p:cNvPr id="1" name=""/>
+        <p:cNvGrpSpPr/>
+        <p:nvPr/>
+      </p:nvGrpSpPr>
+      <p:grpSpPr>
+        <a:xfrm>
+          <a:off x="0" y="0"/>
+          <a:ext cx="0" cy="0"/>
+          <a:chOff x="0" y="0"/>
+          <a:chExt cx="0" cy="0"/>
+        </a:xfrm>
+      </p:grpSpPr>
+      <p:sp>
+        <p:nvSpPr>
+          <p:cNvPr id="2" name="Title 1"/>
+          <p:cNvSpPr>
+            <a:spLocks noGrp="1"/>
+          </p:cNvSpPr>
+          <p:nvPr>
+            <p:ph type="title"/>
+          </p:nvPr>
+        </p:nvSpPr>
+        <p:spPr>
+          <a:xfrm>
+            <a:off x="531812" y="1142999"/>
+            <a:ext cx="2667000" cy="666751"/>
+          </a:xfrm>
+        </p:spPr>
+        <p:txBody>
+          <a:bodyPr/>
+          <a:lstStyle/>
+          <a:p>
+            <a:r>
+              <a:rPr lang="en-US" b="1" dirty="0">
+                <a:solidFill>
+                  <a:schemeClr val="tx1"/>
+                </a:solidFill>
+              </a:rPr>
+              <a:t>Objectives</a:t>
+            </a:r>
+          </a:p>
+        </p:txBody>
+      </p:sp>
+      <p:sp>
+        <p:nvSpPr>
+          <p:cNvPr id="3" name="Content Placeholder 2"/>
+          <p:cNvSpPr>
+            <a:spLocks noGrp="1"/>
+          </p:cNvSpPr>
+          <p:nvPr>
+            <p:ph idx="13"/>
+          </p:nvPr>
+        </p:nvSpPr>
+        <p:spPr>
+          <a:xfrm>
+            <a:off x="379412" y="2438401"/>
+            <a:ext cx="10287000" cy="4190999"/>
+          </a:xfrm>
+        </p:spPr>
+        <p:txBody>
+          <a:bodyPr>
+            <a:normAutofit lnSpcReduction="10000"/>
+          </a:bodyPr>
+          <a:lstStyle/>
+          <a:p>
+            <a:r>
+              <a:rPr lang="en-US" dirty="0"/>
+              <a:t>Provide prevailing financial information to the customers and RMs</a:t>
+            </a:r>
+          </a:p>
+          <a:p>
+            <a:pPr marL="0" indent="0">
+              <a:buNone/>
+            </a:pPr>
+            <a:endParaRPr lang="en-US" dirty="0"/>
+          </a:p>
+          <a:p>
+            <a:r>
+              <a:rPr lang="en-US" dirty="0"/>
+              <a:t>Expedite analyzing process carried out by the RMs, and accelerate information access by and disclosure to the customers as well as the RMs</a:t>
+            </a:r>
+            <a:br>
+              <a:rPr lang="en-US" dirty="0"/>
+            </a:br>
+            <a:endParaRPr lang="en-US" dirty="0"/>
+          </a:p>
+          <a:p>
+            <a:r>
+              <a:rPr lang="en-US" dirty="0"/>
+              <a:t>Facilitate security transactions, and thus rally the earned Brokerage, Custody Fee, Subscription for New Issues</a:t>
+            </a:r>
+          </a:p>
+          <a:p>
+            <a:pPr marL="0" indent="0">
+              <a:buNone/>
+            </a:pPr>
+            <a:r>
+              <a:rPr lang="en-US" dirty="0"/>
+              <a:t>	(Shanghai and Shenzhen Connect &amp; US Listed)</a:t>
+            </a:r>
+          </a:p>
+        </p:txBody>
+      </p:sp>
+      <p:sp>
+        <p:nvSpPr>
+          <p:cNvPr id="6" name="Rectangle 5">
+            <a:extLst>
+              <a:ext uri="{FF2B5EF4-FFF2-40B4-BE49-F238E27FC236}">
+                <a16:creationId xmlns:a16="http://schemas.microsoft.com/office/drawing/2014/main" id="{19E9D63E-F59D-45AD-A691-64BF66F27576}"/>
+              </a:ext>
+            </a:extLst>
+          </p:cNvPr>
+          <p:cNvSpPr/>
+          <p:nvPr/>
+        </p:nvSpPr>
+        <p:spPr>
+          <a:xfrm>
+            <a:off x="5332412" y="228600"/>
+            <a:ext cx="6629400" cy="2019300"/>
+          </a:xfrm>
+          <a:prstGeom prst="rect">
+            <a:avLst/>
+          </a:prstGeom>
+          <a:blipFill dpi="0" rotWithShape="1">
+            <a:blip r:embed="rId3">
+              <a:alphaModFix amt="98000"/>
+            </a:blip>
+            <a:srcRect/>
+            <a:stretch>
+              <a:fillRect/>
+            </a:stretch>
+          </a:blipFill>
+          <a:ln>
+            <a:noFill/>
+          </a:ln>
+        </p:spPr>
+        <p:style>
+          <a:lnRef idx="3">
+            <a:schemeClr val="lt1"/>
+          </a:lnRef>
+          <a:fillRef idx="1">
+            <a:schemeClr val="accent2"/>
+          </a:fillRef>
+          <a:effectRef idx="1">
+            <a:schemeClr val="accent2"/>
+          </a:effectRef>
+          <a:fontRef idx="minor">
+            <a:schemeClr val="lt1"/>
+          </a:fontRef>
+        </p:style>
+        <p:txBody>
+          <a:bodyPr rtlCol="0" anchor="ctr"/>
+          <a:lstStyle/>
+          <a:p>
+            <a:pPr algn="ctr"/>
+            <a:endParaRPr lang="en-HK" dirty="0"/>
+          </a:p>
+        </p:txBody>
+      </p:sp>
+    </p:spTree>
+    <p:extLst>
+      <p:ext uri="{BB962C8B-B14F-4D97-AF65-F5344CB8AC3E}">
+        <p14:creationId xmlns:p14="http://schemas.microsoft.com/office/powerpoint/2010/main" val="379348850"/>
+      </p:ext>
+    </p:extLst>
+  </p:cSld>
+  <p:clrMapOvr>
+    <a:masterClrMapping/>
+  </p:clrMapOvr>
+  <mc:AlternateContent xmlns:mc="http://schemas.openxmlformats.org/markup-compatibility/2006" xmlns:p14="http://schemas.microsoft.com/office/powerpoint/2010/main">
+    <mc:Choice Requires="p14">
+      <p:transition spd="med" p14:dur="700">
+        <p:fade/>
+      </p:transition>
+    </mc:Choice>
+    <mc:Fallback xmlns="">
+      <p:transition spd="med">
+        <p:fade/>
+      </p:transition>
+    </mc:Fallback>
+  </mc:AlternateContent>
+</p:sld>
+</file>
+
+<file path=ppt/slides/slide20.xml><?xml version="1.0" encoding="utf-8"?>
 <p:sld xmlns:a="http://schemas.openxmlformats.org/drawingml/2006/main" xmlns:r="http://schemas.openxmlformats.org/officeDocument/2006/relationships" xmlns:p="http://schemas.openxmlformats.org/presentationml/2006/main">
   <p:cSld>
     <p:spTree>
@@ -18438,217 +21008,6 @@
 </p:sld>
 </file>
 
-<file path=ppt/slides/slide2.xml><?xml version="1.0" encoding="utf-8"?>
-<p:sld xmlns:a="http://schemas.openxmlformats.org/drawingml/2006/main" xmlns:r="http://schemas.openxmlformats.org/officeDocument/2006/relationships" xmlns:p="http://schemas.openxmlformats.org/presentationml/2006/main">
-  <p:cSld>
-    <p:bg>
-      <p:bgPr>
-        <a:gradFill flip="none" rotWithShape="1">
-          <a:gsLst>
-            <a:gs pos="0">
-              <a:schemeClr val="bg2">
-                <a:lumMod val="20000"/>
-                <a:lumOff val="80000"/>
-              </a:schemeClr>
-            </a:gs>
-            <a:gs pos="58000">
-              <a:schemeClr val="bg2">
-                <a:lumMod val="40000"/>
-                <a:lumOff val="60000"/>
-              </a:schemeClr>
-            </a:gs>
-            <a:gs pos="100000">
-              <a:schemeClr val="bg2"/>
-            </a:gs>
-          </a:gsLst>
-          <a:lin ang="17400000" scaled="0"/>
-          <a:tileRect/>
-        </a:gradFill>
-        <a:effectLst/>
-      </p:bgPr>
-    </p:bg>
-    <p:spTree>
-      <p:nvGrpSpPr>
-        <p:cNvPr id="1" name=""/>
-        <p:cNvGrpSpPr/>
-        <p:nvPr/>
-      </p:nvGrpSpPr>
-      <p:grpSpPr>
-        <a:xfrm>
-          <a:off x="0" y="0"/>
-          <a:ext cx="0" cy="0"/>
-          <a:chOff x="0" y="0"/>
-          <a:chExt cx="0" cy="0"/>
-        </a:xfrm>
-      </p:grpSpPr>
-      <p:sp>
-        <p:nvSpPr>
-          <p:cNvPr id="2" name="Title 1"/>
-          <p:cNvSpPr>
-            <a:spLocks noGrp="1"/>
-          </p:cNvSpPr>
-          <p:nvPr>
-            <p:ph type="title"/>
-          </p:nvPr>
-        </p:nvSpPr>
-        <p:spPr>
-          <a:xfrm>
-            <a:off x="531812" y="742951"/>
-            <a:ext cx="10971372" cy="1066800"/>
-          </a:xfrm>
-        </p:spPr>
-        <p:txBody>
-          <a:bodyPr/>
-          <a:lstStyle/>
-          <a:p>
-            <a:r>
-              <a:rPr lang="en-US" b="1" dirty="0"/>
-              <a:t>Objectives</a:t>
-            </a:r>
-          </a:p>
-        </p:txBody>
-      </p:sp>
-      <p:sp>
-        <p:nvSpPr>
-          <p:cNvPr id="3" name="Content Placeholder 2"/>
-          <p:cNvSpPr>
-            <a:spLocks noGrp="1"/>
-          </p:cNvSpPr>
-          <p:nvPr>
-            <p:ph idx="13"/>
-          </p:nvPr>
-        </p:nvSpPr>
-        <p:spPr>
-          <a:xfrm>
-            <a:off x="379412" y="2438401"/>
-            <a:ext cx="10287000" cy="4190999"/>
-          </a:xfrm>
-        </p:spPr>
-        <p:txBody>
-          <a:bodyPr>
-            <a:normAutofit lnSpcReduction="10000"/>
-          </a:bodyPr>
-          <a:lstStyle/>
-          <a:p>
-            <a:r>
-              <a:rPr lang="en-US" dirty="0"/>
-              <a:t>Provide prevailing financial information to the customers and RMs</a:t>
-            </a:r>
-          </a:p>
-          <a:p>
-            <a:pPr marL="0" indent="0">
-              <a:buNone/>
-            </a:pPr>
-            <a:endParaRPr lang="en-US" dirty="0"/>
-          </a:p>
-          <a:p>
-            <a:r>
-              <a:rPr lang="en-US" dirty="0"/>
-              <a:t>Expedite analyzing process carried out by the RMs, and accelerate information access by and disclosure to the customers as well as the RMs</a:t>
-            </a:r>
-            <a:br>
-              <a:rPr lang="en-US" dirty="0"/>
-            </a:br>
-            <a:endParaRPr lang="en-US" dirty="0"/>
-          </a:p>
-          <a:p>
-            <a:r>
-              <a:rPr lang="en-US" dirty="0"/>
-              <a:t>Facilitate security transactions, and thus rally the earned Brokerage, Custody Fee, Subscription for New Issues</a:t>
-            </a:r>
-          </a:p>
-          <a:p>
-            <a:pPr marL="0" indent="0">
-              <a:buNone/>
-            </a:pPr>
-            <a:r>
-              <a:rPr lang="en-US" dirty="0"/>
-              <a:t>	(Shanghai and Shenzhen Connect &amp; US Listed)</a:t>
-            </a:r>
-          </a:p>
-        </p:txBody>
-      </p:sp>
-      <p:sp>
-        <p:nvSpPr>
-          <p:cNvPr id="6" name="Rectangle 5">
-            <a:extLst>
-              <a:ext uri="{FF2B5EF4-FFF2-40B4-BE49-F238E27FC236}">
-                <a16:creationId xmlns:a16="http://schemas.microsoft.com/office/drawing/2014/main" id="{19E9D63E-F59D-45AD-A691-64BF66F27576}"/>
-              </a:ext>
-            </a:extLst>
-          </p:cNvPr>
-          <p:cNvSpPr/>
-          <p:nvPr/>
-        </p:nvSpPr>
-        <p:spPr>
-          <a:xfrm>
-            <a:off x="5332412" y="228600"/>
-            <a:ext cx="6629400" cy="2019300"/>
-          </a:xfrm>
-          <a:prstGeom prst="rect">
-            <a:avLst/>
-          </a:prstGeom>
-          <a:blipFill dpi="0" rotWithShape="1">
-            <a:blip r:embed="rId3">
-              <a:alphaModFix amt="98000"/>
-            </a:blip>
-            <a:srcRect/>
-            <a:stretch>
-              <a:fillRect/>
-            </a:stretch>
-          </a:blipFill>
-          <a:ln>
-            <a:noFill/>
-          </a:ln>
-        </p:spPr>
-        <p:style>
-          <a:lnRef idx="3">
-            <a:schemeClr val="lt1"/>
-          </a:lnRef>
-          <a:fillRef idx="1">
-            <a:schemeClr val="accent2"/>
-          </a:fillRef>
-          <a:effectRef idx="1">
-            <a:schemeClr val="accent2"/>
-          </a:effectRef>
-          <a:fontRef idx="minor">
-            <a:schemeClr val="lt1"/>
-          </a:fontRef>
-        </p:style>
-        <p:txBody>
-          <a:bodyPr rtlCol="0" anchor="ctr"/>
-          <a:lstStyle/>
-          <a:p>
-            <a:pPr algn="ctr"/>
-            <a:endParaRPr lang="en-HK" dirty="0"/>
-          </a:p>
-        </p:txBody>
-      </p:sp>
-    </p:spTree>
-    <p:extLst>
-      <p:ext uri="{BB962C8B-B14F-4D97-AF65-F5344CB8AC3E}">
-        <p14:creationId xmlns:p14="http://schemas.microsoft.com/office/powerpoint/2010/main" val="379348850"/>
-      </p:ext>
-    </p:extLst>
-  </p:cSld>
-  <p:clrMapOvr>
-    <a:masterClrMapping/>
-  </p:clrMapOvr>
-  <mc:AlternateContent xmlns:mc="http://schemas.openxmlformats.org/markup-compatibility/2006" xmlns:p14="http://schemas.microsoft.com/office/powerpoint/2010/main">
-    <mc:Choice Requires="p14">
-      <p:transition spd="med" p14:dur="700">
-        <p:fade/>
-      </p:transition>
-    </mc:Choice>
-    <mc:Fallback xmlns="">
-      <p:transition spd="med">
-        <p:fade/>
-      </p:transition>
-    </mc:Fallback>
-  </mc:AlternateContent>
-</p:sld>
-</file>
-
 <file path=ppt/slides/slide3.xml><?xml version="1.0" encoding="utf-8"?>
 <p:sld xmlns:a="http://schemas.openxmlformats.org/drawingml/2006/main" xmlns:r="http://schemas.openxmlformats.org/officeDocument/2006/relationships" xmlns:p="http://schemas.openxmlformats.org/presentationml/2006/main">
   <p:cSld>
@@ -18689,21 +21048,41 @@
           <a:lstStyle/>
           <a:p>
             <a:r>
-              <a:rPr lang="en-US" b="1" dirty="0"/>
+              <a:rPr lang="en-US" b="1" dirty="0">
+                <a:solidFill>
+                  <a:schemeClr val="tx1"/>
+                </a:solidFill>
+              </a:rPr>
               <a:t>Use</a:t>
             </a:r>
             <a:br>
-              <a:rPr lang="en-US" b="1" dirty="0"/>
+              <a:rPr lang="en-US" b="1" dirty="0">
+                <a:solidFill>
+                  <a:schemeClr val="tx1"/>
+                </a:solidFill>
+              </a:rPr>
             </a:br>
             <a:r>
-              <a:rPr lang="en-US" b="1" dirty="0"/>
+              <a:rPr lang="en-US" b="1" dirty="0">
+                <a:solidFill>
+                  <a:schemeClr val="tx1"/>
+                </a:solidFill>
+              </a:rPr>
               <a:t>Case</a:t>
             </a:r>
             <a:br>
-              <a:rPr lang="en-US" b="1" dirty="0"/>
+              <a:rPr lang="en-US" b="1" dirty="0">
+                <a:solidFill>
+                  <a:schemeClr val="tx1"/>
+                </a:solidFill>
+              </a:rPr>
             </a:br>
             <a:r>
-              <a:rPr lang="en-US" b="1" dirty="0"/>
+              <a:rPr lang="en-US" b="1" dirty="0">
+                <a:solidFill>
+                  <a:schemeClr val="tx1"/>
+                </a:solidFill>
+              </a:rPr>
               <a:t>Diagram</a:t>
             </a:r>
           </a:p>
@@ -18810,10 +21189,18 @@
           <a:lstStyle/>
           <a:p>
             <a:r>
-              <a:rPr lang="en-HK" b="1" dirty="0"/>
+              <a:rPr lang="en-HK" b="1" dirty="0">
+                <a:solidFill>
+                  <a:schemeClr val="tx1"/>
+                </a:solidFill>
+              </a:rPr>
               <a:t>Methodology</a:t>
             </a:r>
-            <a:endParaRPr lang="en-US" b="1" dirty="0"/>
+            <a:endParaRPr lang="en-US" b="1" dirty="0">
+              <a:solidFill>
+                <a:schemeClr val="tx1"/>
+              </a:solidFill>
+            </a:endParaRPr>
           </a:p>
         </p:txBody>
       </p:sp>
@@ -18839,7 +21226,7 @@
           <a:p>
             <a:r>
               <a:rPr lang="en-US" dirty="0"/>
-              <a:t>Mainly encompass 3 parts</a:t>
+              <a:t>Mainly encompasses 3 parts</a:t>
             </a:r>
             <a:br>
               <a:rPr lang="en-US" dirty="0"/>
@@ -18849,7 +21236,7 @@
           <a:p>
             <a:r>
               <a:rPr lang="en-US" dirty="0"/>
-              <a:t>Machine learning and Deep learning</a:t>
+              <a:t>Machine learning and Deep learning involved</a:t>
             </a:r>
           </a:p>
         </p:txBody>
@@ -18971,8 +21358,8 @@
         </p:nvSpPr>
         <p:spPr>
           <a:xfrm>
-            <a:off x="303212" y="342900"/>
-            <a:ext cx="11658600" cy="6286500"/>
+            <a:off x="-1" y="0"/>
+            <a:ext cx="12188825" cy="6858000"/>
           </a:xfrm>
           <a:prstGeom prst="rect">
             <a:avLst/>
@@ -19049,8 +21436,13 @@
           </a:bodyPr>
           <a:lstStyle/>
           <a:p>
+            <a:pPr algn="ctr"/>
             <a:r>
-              <a:rPr lang="en-US" sz="6000" b="1" dirty="0"/>
+              <a:rPr lang="en-US" sz="6000" b="1" dirty="0">
+                <a:solidFill>
+                  <a:schemeClr val="tx1"/>
+                </a:solidFill>
+              </a:rPr>
               <a:t>Technical Analysis</a:t>
             </a:r>
           </a:p>
@@ -23958,24 +26350,48 @@
           <a:lstStyle/>
           <a:p>
             <a:r>
-              <a:rPr lang="en-US" b="1" dirty="0"/>
+              <a:rPr lang="en-US" b="1" dirty="0">
+                <a:solidFill>
+                  <a:schemeClr val="tx1"/>
+                </a:solidFill>
+              </a:rPr>
               <a:t>Bollinger </a:t>
             </a:r>
             <a:br>
-              <a:rPr lang="en-US" b="1" dirty="0"/>
+              <a:rPr lang="en-US" b="1" dirty="0">
+                <a:solidFill>
+                  <a:schemeClr val="tx1"/>
+                </a:solidFill>
+              </a:rPr>
             </a:br>
             <a:r>
-              <a:rPr lang="en-US" b="1" dirty="0"/>
+              <a:rPr lang="en-US" b="1" dirty="0">
+                <a:solidFill>
+                  <a:schemeClr val="tx1"/>
+                </a:solidFill>
+              </a:rPr>
               <a:t>Bands –</a:t>
             </a:r>
             <a:br>
-              <a:rPr lang="en-US" b="1" dirty="0"/>
+              <a:rPr lang="en-US" b="1" dirty="0">
+                <a:solidFill>
+                  <a:schemeClr val="tx1"/>
+                </a:solidFill>
+              </a:rPr>
             </a:br>
             <a:r>
-              <a:rPr lang="en-US" b="1" dirty="0" err="1"/>
+              <a:rPr lang="en-US" b="1" dirty="0" err="1">
+                <a:solidFill>
+                  <a:schemeClr val="tx1"/>
+                </a:solidFill>
+              </a:rPr>
               <a:t>BBands</a:t>
             </a:r>
-            <a:endParaRPr lang="en-US" b="1" dirty="0"/>
+            <a:endParaRPr lang="en-US" b="1" dirty="0">
+              <a:solidFill>
+                <a:schemeClr val="tx1"/>
+              </a:solidFill>
+            </a:endParaRPr>
           </a:p>
         </p:txBody>
       </p:sp>
@@ -24122,7 +26538,11 @@
           <a:lstStyle/>
           <a:p>
             <a:r>
-              <a:rPr lang="en-US" b="1" dirty="0"/>
+              <a:rPr lang="en-US" b="1" dirty="0">
+                <a:solidFill>
+                  <a:schemeClr val="tx1"/>
+                </a:solidFill>
+              </a:rPr>
               <a:t>Commodity Channel Index - CCI</a:t>
             </a:r>
           </a:p>
@@ -24235,7 +26655,11 @@
           <a:lstStyle/>
           <a:p>
             <a:r>
-              <a:rPr lang="en-US" b="1" dirty="0"/>
+              <a:rPr lang="en-US" b="1" dirty="0">
+                <a:solidFill>
+                  <a:schemeClr val="tx1"/>
+                </a:solidFill>
+              </a:rPr>
               <a:t>(Slow) Stochastic Oscillator with J Line - KDJ</a:t>
             </a:r>
           </a:p>

</xml_diff>